<commit_message>
Modified COA texts and PPTs; corrected printing mistakes
</commit_message>
<xml_diff>
--- a/S4/02. COA/Notes & PPTs/Module 6.1 - Control logic design.pptx
+++ b/S4/02. COA/Notes & PPTs/Module 6.1 - Control logic design.pptx
@@ -150,6 +150,22 @@
       </a:defRPr>
     </a:lvl9pPr>
   </p:defaultTextStyle>
+  <p:extLst>
+    <p:ext uri="{EFAFB233-063F-42B5-8137-9DF3F51BA10A}">
+      <p15:sldGuideLst xmlns:p15="http://schemas.microsoft.com/office/powerpoint/2012/main">
+        <p15:guide id="1" orient="horz" pos="2160">
+          <p15:clr>
+            <a:srgbClr val="A4A3A4"/>
+          </p15:clr>
+        </p15:guide>
+        <p15:guide id="2" pos="2880">
+          <p15:clr>
+            <a:srgbClr val="A4A3A4"/>
+          </p15:clr>
+        </p15:guide>
+      </p15:sldGuideLst>
+    </p:ext>
+  </p:extLst>
 </p:presentation>
 </file>
 
@@ -236,7 +252,7 @@
             <a:fld id="{9AD71B5D-8126-4DA1-8243-A3CB3F98DD4B}" type="datetimeFigureOut">
               <a:rPr lang="en-IN" smtClean="0"/>
               <a:pPr/>
-              <a:t>04-05-2019</a:t>
+              <a:t>23-05-2019</a:t>
             </a:fld>
             <a:endParaRPr lang="en-IN"/>
           </a:p>
@@ -300,35 +316,35 @@
           <a:p>
             <a:pPr lvl="0"/>
             <a:r>
-              <a:rPr lang="en-US" smtClean="0"/>
+              <a:rPr lang="en-US"/>
               <a:t>Click to edit Master text styles</a:t>
             </a:r>
           </a:p>
           <a:p>
             <a:pPr lvl="1"/>
             <a:r>
-              <a:rPr lang="en-US" smtClean="0"/>
+              <a:rPr lang="en-US"/>
               <a:t>Second level</a:t>
             </a:r>
           </a:p>
           <a:p>
             <a:pPr lvl="2"/>
             <a:r>
-              <a:rPr lang="en-US" smtClean="0"/>
+              <a:rPr lang="en-US"/>
               <a:t>Third level</a:t>
             </a:r>
           </a:p>
           <a:p>
             <a:pPr lvl="3"/>
             <a:r>
-              <a:rPr lang="en-US" smtClean="0"/>
+              <a:rPr lang="en-US"/>
               <a:t>Fourth level</a:t>
             </a:r>
           </a:p>
           <a:p>
             <a:pPr lvl="4"/>
             <a:r>
-              <a:rPr lang="en-US" smtClean="0"/>
+              <a:rPr lang="en-US"/>
               <a:t>Fifth level</a:t>
             </a:r>
             <a:endParaRPr lang="en-IN"/>
@@ -405,7 +421,7 @@
     </p:spTree>
     <p:extLst>
       <p:ext uri="{BB962C8B-B14F-4D97-AF65-F5344CB8AC3E}">
-        <p14:creationId xmlns:p14="http://schemas.microsoft.com/office/powerpoint/2010/main" xmlns="" val="279643647"/>
+        <p14:creationId xmlns:p14="http://schemas.microsoft.com/office/powerpoint/2010/main" val="279643647"/>
       </p:ext>
     </p:extLst>
   </p:cSld>
@@ -535,14 +551,14 @@
         <p:spPr>
           <a:extLst>
             <a:ext uri="{909E8E84-426E-40DD-AFC4-6F175D3DCCD1}">
-              <a14:hiddenFill xmlns:a14="http://schemas.microsoft.com/office/drawing/2010/main" xmlns="">
+              <a14:hiddenFill xmlns:a14="http://schemas.microsoft.com/office/drawing/2010/main">
                 <a:solidFill>
                   <a:srgbClr val="FFFFFF"/>
                 </a:solidFill>
               </a14:hiddenFill>
             </a:ext>
             <a:ext uri="{91240B29-F687-4F45-9708-019B960494DF}">
-              <a14:hiddenLine xmlns:a14="http://schemas.microsoft.com/office/drawing/2010/main" xmlns="" w="9525">
+              <a14:hiddenLine xmlns:a14="http://schemas.microsoft.com/office/drawing/2010/main" w="9525">
                 <a:solidFill>
                   <a:srgbClr val="000000"/>
                 </a:solidFill>
@@ -685,7 +701,7 @@
               </a:pPr>
               <a:t>29</a:t>
             </a:fld>
-            <a:endParaRPr lang="en-US" altLang="en-US" smtClean="0"/>
+            <a:endParaRPr lang="en-US" altLang="en-US"/>
           </a:p>
         </p:txBody>
       </p:sp>
@@ -718,14 +734,14 @@
           <a:ln/>
           <a:extLst>
             <a:ext uri="{909E8E84-426E-40DD-AFC4-6F175D3DCCD1}">
-              <a14:hiddenFill xmlns:a14="http://schemas.microsoft.com/office/drawing/2010/main" xmlns="">
+              <a14:hiddenFill xmlns:a14="http://schemas.microsoft.com/office/drawing/2010/main">
                 <a:solidFill>
                   <a:srgbClr val="FFFFFF"/>
                 </a:solidFill>
               </a14:hiddenFill>
             </a:ext>
             <a:ext uri="{91240B29-F687-4F45-9708-019B960494DF}">
-              <a14:hiddenLine xmlns:a14="http://schemas.microsoft.com/office/drawing/2010/main" xmlns="" w="9525">
+              <a14:hiddenLine xmlns:a14="http://schemas.microsoft.com/office/drawing/2010/main" w="9525">
                 <a:solidFill>
                   <a:srgbClr val="000000"/>
                 </a:solidFill>
@@ -741,7 +757,7 @@
           <a:lstStyle/>
           <a:p>
             <a:pPr eaLnBrk="1" hangingPunct="1"/>
-            <a:endParaRPr lang="en-US" altLang="en-US" smtClean="0"/>
+            <a:endParaRPr lang="en-US" altLang="en-US"/>
           </a:p>
         </p:txBody>
       </p:sp>
@@ -802,7 +818,7 @@
           </a:lstStyle>
           <a:p>
             <a:r>
-              <a:rPr lang="en-US" smtClean="0"/>
+              <a:rPr lang="en-US"/>
               <a:t>Click to edit Master title style</a:t>
             </a:r>
             <a:endParaRPr lang="en-US" dirty="0"/>
@@ -923,7 +939,7 @@
           </a:lstStyle>
           <a:p>
             <a:r>
-              <a:rPr lang="en-US" smtClean="0"/>
+              <a:rPr lang="en-US"/>
               <a:t>Click to edit Master subtitle style</a:t>
             </a:r>
             <a:endParaRPr lang="en-US" dirty="0"/>
@@ -948,7 +964,7 @@
             <a:fld id="{04AF466F-BDA4-4F18-9C7B-FF0A9A1B0E80}" type="datetime1">
               <a:rPr lang="en-US" smtClean="0"/>
               <a:pPr/>
-              <a:t>5/4/2019</a:t>
+              <a:t>5/23/2019</a:t>
             </a:fld>
             <a:endParaRPr lang="en-US"/>
           </a:p>
@@ -1038,10 +1054,9 @@
           <a:lstStyle/>
           <a:p>
             <a:r>
-              <a:rPr lang="en-US" smtClean="0"/>
+              <a:rPr lang="en-US"/>
               <a:t>Click to edit Master title style</a:t>
             </a:r>
-            <a:endParaRPr lang="en-US"/>
           </a:p>
         </p:txBody>
       </p:sp>
@@ -1062,38 +1077,37 @@
           <a:p>
             <a:pPr lvl="0"/>
             <a:r>
-              <a:rPr lang="en-US" smtClean="0"/>
+              <a:rPr lang="en-US"/>
               <a:t>Click to edit Master text styles</a:t>
             </a:r>
           </a:p>
           <a:p>
             <a:pPr lvl="1"/>
             <a:r>
-              <a:rPr lang="en-US" smtClean="0"/>
+              <a:rPr lang="en-US"/>
               <a:t>Second level</a:t>
             </a:r>
           </a:p>
           <a:p>
             <a:pPr lvl="2"/>
             <a:r>
-              <a:rPr lang="en-US" smtClean="0"/>
+              <a:rPr lang="en-US"/>
               <a:t>Third level</a:t>
             </a:r>
           </a:p>
           <a:p>
             <a:pPr lvl="3"/>
             <a:r>
-              <a:rPr lang="en-US" smtClean="0"/>
+              <a:rPr lang="en-US"/>
               <a:t>Fourth level</a:t>
             </a:r>
           </a:p>
           <a:p>
             <a:pPr lvl="4"/>
             <a:r>
-              <a:rPr lang="en-US" smtClean="0"/>
+              <a:rPr lang="en-US"/>
               <a:t>Fifth level</a:t>
             </a:r>
-            <a:endParaRPr lang="en-US"/>
           </a:p>
         </p:txBody>
       </p:sp>
@@ -1115,7 +1129,7 @@
             <a:fld id="{58FB4290-6522-4139-852E-05BD9E7F0D2E}" type="datetime1">
               <a:rPr lang="en-US" smtClean="0"/>
               <a:pPr/>
-              <a:t>5/4/2019</a:t>
+              <a:t>5/23/2019</a:t>
             </a:fld>
             <a:endParaRPr lang="en-US"/>
           </a:p>
@@ -1210,7 +1224,7 @@
           <a:lstStyle/>
           <a:p>
             <a:r>
-              <a:rPr lang="en-US" smtClean="0"/>
+              <a:rPr lang="en-US"/>
               <a:t>Click to edit Master title style</a:t>
             </a:r>
             <a:endParaRPr lang="en-US" dirty="0"/>
@@ -1239,38 +1253,37 @@
           <a:p>
             <a:pPr lvl="0"/>
             <a:r>
-              <a:rPr lang="en-US" smtClean="0"/>
+              <a:rPr lang="en-US"/>
               <a:t>Click to edit Master text styles</a:t>
             </a:r>
           </a:p>
           <a:p>
             <a:pPr lvl="1"/>
             <a:r>
-              <a:rPr lang="en-US" smtClean="0"/>
+              <a:rPr lang="en-US"/>
               <a:t>Second level</a:t>
             </a:r>
           </a:p>
           <a:p>
             <a:pPr lvl="2"/>
             <a:r>
-              <a:rPr lang="en-US" smtClean="0"/>
+              <a:rPr lang="en-US"/>
               <a:t>Third level</a:t>
             </a:r>
           </a:p>
           <a:p>
             <a:pPr lvl="3"/>
             <a:r>
-              <a:rPr lang="en-US" smtClean="0"/>
+              <a:rPr lang="en-US"/>
               <a:t>Fourth level</a:t>
             </a:r>
           </a:p>
           <a:p>
             <a:pPr lvl="4"/>
             <a:r>
-              <a:rPr lang="en-US" smtClean="0"/>
+              <a:rPr lang="en-US"/>
               <a:t>Fifth level</a:t>
             </a:r>
-            <a:endParaRPr lang="en-US"/>
           </a:p>
         </p:txBody>
       </p:sp>
@@ -1292,7 +1305,7 @@
             <a:fld id="{AAB955F9-81EA-47C5-8059-9E5C2B437C70}" type="datetime1">
               <a:rPr lang="en-US" smtClean="0"/>
               <a:pPr/>
-              <a:t>5/4/2019</a:t>
+              <a:t>5/23/2019</a:t>
             </a:fld>
             <a:endParaRPr lang="en-US"/>
           </a:p>
@@ -1382,10 +1395,9 @@
           <a:lstStyle/>
           <a:p>
             <a:r>
-              <a:rPr lang="en-US" smtClean="0"/>
+              <a:rPr lang="en-US"/>
               <a:t>Click to edit Master title style</a:t>
             </a:r>
-            <a:endParaRPr lang="en-US"/>
           </a:p>
         </p:txBody>
       </p:sp>
@@ -1406,38 +1418,37 @@
           <a:p>
             <a:pPr lvl="0"/>
             <a:r>
-              <a:rPr lang="en-US" smtClean="0"/>
+              <a:rPr lang="en-US"/>
               <a:t>Click to edit Master text styles</a:t>
             </a:r>
           </a:p>
           <a:p>
             <a:pPr lvl="1"/>
             <a:r>
-              <a:rPr lang="en-US" smtClean="0"/>
+              <a:rPr lang="en-US"/>
               <a:t>Second level</a:t>
             </a:r>
           </a:p>
           <a:p>
             <a:pPr lvl="2"/>
             <a:r>
-              <a:rPr lang="en-US" smtClean="0"/>
+              <a:rPr lang="en-US"/>
               <a:t>Third level</a:t>
             </a:r>
           </a:p>
           <a:p>
             <a:pPr lvl="3"/>
             <a:r>
-              <a:rPr lang="en-US" smtClean="0"/>
+              <a:rPr lang="en-US"/>
               <a:t>Fourth level</a:t>
             </a:r>
           </a:p>
           <a:p>
             <a:pPr lvl="4"/>
             <a:r>
-              <a:rPr lang="en-US" smtClean="0"/>
+              <a:rPr lang="en-US"/>
               <a:t>Fifth level</a:t>
             </a:r>
-            <a:endParaRPr lang="en-US"/>
           </a:p>
         </p:txBody>
       </p:sp>
@@ -1459,7 +1470,7 @@
             <a:fld id="{1CEF607B-A47E-422C-9BEF-122CCDB7C526}" type="datetime1">
               <a:rPr lang="en-US" smtClean="0"/>
               <a:pPr/>
-              <a:t>5/4/2019</a:t>
+              <a:t>5/23/2019</a:t>
             </a:fld>
             <a:endParaRPr lang="en-US"/>
           </a:p>
@@ -1558,7 +1569,7 @@
           </a:lstStyle>
           <a:p>
             <a:r>
-              <a:rPr lang="en-US" smtClean="0"/>
+              <a:rPr lang="en-US"/>
               <a:t>Click to edit Master title style</a:t>
             </a:r>
             <a:endParaRPr lang="en-US" dirty="0"/>
@@ -1678,7 +1689,7 @@
           <a:p>
             <a:pPr lvl="0"/>
             <a:r>
-              <a:rPr lang="en-US" smtClean="0"/>
+              <a:rPr lang="en-US"/>
               <a:t>Click to edit Master text styles</a:t>
             </a:r>
           </a:p>
@@ -1702,7 +1713,7 @@
             <a:fld id="{63A9A7CB-BEE6-4F99-898E-913F06E8E125}" type="datetime1">
               <a:rPr lang="en-US" smtClean="0"/>
               <a:pPr/>
-              <a:t>5/4/2019</a:t>
+              <a:t>5/23/2019</a:t>
             </a:fld>
             <a:endParaRPr lang="en-US"/>
           </a:p>
@@ -1792,10 +1803,9 @@
           <a:lstStyle/>
           <a:p>
             <a:r>
-              <a:rPr lang="en-US" smtClean="0"/>
+              <a:rPr lang="en-US"/>
               <a:t>Click to edit Master title style</a:t>
             </a:r>
-            <a:endParaRPr lang="en-US"/>
           </a:p>
         </p:txBody>
       </p:sp>
@@ -1849,35 +1859,35 @@
           <a:p>
             <a:pPr lvl="0"/>
             <a:r>
-              <a:rPr lang="en-US" smtClean="0"/>
+              <a:rPr lang="en-US"/>
               <a:t>Click to edit Master text styles</a:t>
             </a:r>
           </a:p>
           <a:p>
             <a:pPr lvl="1"/>
             <a:r>
-              <a:rPr lang="en-US" smtClean="0"/>
+              <a:rPr lang="en-US"/>
               <a:t>Second level</a:t>
             </a:r>
           </a:p>
           <a:p>
             <a:pPr lvl="2"/>
             <a:r>
-              <a:rPr lang="en-US" smtClean="0"/>
+              <a:rPr lang="en-US"/>
               <a:t>Third level</a:t>
             </a:r>
           </a:p>
           <a:p>
             <a:pPr lvl="3"/>
             <a:r>
-              <a:rPr lang="en-US" smtClean="0"/>
+              <a:rPr lang="en-US"/>
               <a:t>Fourth level</a:t>
             </a:r>
           </a:p>
           <a:p>
             <a:pPr lvl="4"/>
             <a:r>
-              <a:rPr lang="en-US" smtClean="0"/>
+              <a:rPr lang="en-US"/>
               <a:t>Fifth level</a:t>
             </a:r>
             <a:endParaRPr lang="en-US" dirty="0"/>
@@ -1934,35 +1944,35 @@
           <a:p>
             <a:pPr lvl="0"/>
             <a:r>
-              <a:rPr lang="en-US" smtClean="0"/>
+              <a:rPr lang="en-US"/>
               <a:t>Click to edit Master text styles</a:t>
             </a:r>
           </a:p>
           <a:p>
             <a:pPr lvl="1"/>
             <a:r>
-              <a:rPr lang="en-US" smtClean="0"/>
+              <a:rPr lang="en-US"/>
               <a:t>Second level</a:t>
             </a:r>
           </a:p>
           <a:p>
             <a:pPr lvl="2"/>
             <a:r>
-              <a:rPr lang="en-US" smtClean="0"/>
+              <a:rPr lang="en-US"/>
               <a:t>Third level</a:t>
             </a:r>
           </a:p>
           <a:p>
             <a:pPr lvl="3"/>
             <a:r>
-              <a:rPr lang="en-US" smtClean="0"/>
+              <a:rPr lang="en-US"/>
               <a:t>Fourth level</a:t>
             </a:r>
           </a:p>
           <a:p>
             <a:pPr lvl="4"/>
             <a:r>
-              <a:rPr lang="en-US" smtClean="0"/>
+              <a:rPr lang="en-US"/>
               <a:t>Fifth level</a:t>
             </a:r>
             <a:endParaRPr lang="en-US" dirty="0"/>
@@ -1987,7 +1997,7 @@
             <a:fld id="{B6EE300C-6FC5-4FC3-AF1A-075E4F50620D}" type="datetime1">
               <a:rPr lang="en-US" smtClean="0"/>
               <a:pPr/>
-              <a:t>5/4/2019</a:t>
+              <a:t>5/23/2019</a:t>
             </a:fld>
             <a:endParaRPr lang="en-US"/>
           </a:p>
@@ -2081,10 +2091,9 @@
           </a:lstStyle>
           <a:p>
             <a:r>
-              <a:rPr lang="en-US" smtClean="0"/>
+              <a:rPr lang="en-US"/>
               <a:t>Click to edit Master title style</a:t>
             </a:r>
-            <a:endParaRPr lang="en-US"/>
           </a:p>
         </p:txBody>
       </p:sp>
@@ -2153,7 +2162,7 @@
           <a:p>
             <a:pPr lvl="0"/>
             <a:r>
-              <a:rPr lang="en-US" smtClean="0"/>
+              <a:rPr lang="en-US"/>
               <a:t>Click to edit Master text styles</a:t>
             </a:r>
           </a:p>
@@ -2209,35 +2218,35 @@
           <a:p>
             <a:pPr lvl="0"/>
             <a:r>
-              <a:rPr lang="en-US" smtClean="0"/>
+              <a:rPr lang="en-US"/>
               <a:t>Click to edit Master text styles</a:t>
             </a:r>
           </a:p>
           <a:p>
             <a:pPr lvl="1"/>
             <a:r>
-              <a:rPr lang="en-US" smtClean="0"/>
+              <a:rPr lang="en-US"/>
               <a:t>Second level</a:t>
             </a:r>
           </a:p>
           <a:p>
             <a:pPr lvl="2"/>
             <a:r>
-              <a:rPr lang="en-US" smtClean="0"/>
+              <a:rPr lang="en-US"/>
               <a:t>Third level</a:t>
             </a:r>
           </a:p>
           <a:p>
             <a:pPr lvl="3"/>
             <a:r>
-              <a:rPr lang="en-US" smtClean="0"/>
+              <a:rPr lang="en-US"/>
               <a:t>Fourth level</a:t>
             </a:r>
           </a:p>
           <a:p>
             <a:pPr lvl="4"/>
             <a:r>
-              <a:rPr lang="en-US" smtClean="0"/>
+              <a:rPr lang="en-US"/>
               <a:t>Fifth level</a:t>
             </a:r>
             <a:endParaRPr lang="en-US" dirty="0"/>
@@ -2309,7 +2318,7 @@
           <a:p>
             <a:pPr lvl="0"/>
             <a:r>
-              <a:rPr lang="en-US" smtClean="0"/>
+              <a:rPr lang="en-US"/>
               <a:t>Click to edit Master text styles</a:t>
             </a:r>
           </a:p>
@@ -2365,38 +2374,37 @@
           <a:p>
             <a:pPr lvl="0"/>
             <a:r>
-              <a:rPr lang="en-US" smtClean="0"/>
+              <a:rPr lang="en-US"/>
               <a:t>Click to edit Master text styles</a:t>
             </a:r>
           </a:p>
           <a:p>
             <a:pPr lvl="1"/>
             <a:r>
-              <a:rPr lang="en-US" smtClean="0"/>
+              <a:rPr lang="en-US"/>
               <a:t>Second level</a:t>
             </a:r>
           </a:p>
           <a:p>
             <a:pPr lvl="2"/>
             <a:r>
-              <a:rPr lang="en-US" smtClean="0"/>
+              <a:rPr lang="en-US"/>
               <a:t>Third level</a:t>
             </a:r>
           </a:p>
           <a:p>
             <a:pPr lvl="3"/>
             <a:r>
-              <a:rPr lang="en-US" smtClean="0"/>
+              <a:rPr lang="en-US"/>
               <a:t>Fourth level</a:t>
             </a:r>
           </a:p>
           <a:p>
             <a:pPr lvl="4"/>
             <a:r>
-              <a:rPr lang="en-US" smtClean="0"/>
+              <a:rPr lang="en-US"/>
               <a:t>Fifth level</a:t>
             </a:r>
-            <a:endParaRPr lang="en-US"/>
           </a:p>
         </p:txBody>
       </p:sp>
@@ -2418,7 +2426,7 @@
             <a:fld id="{F50D295D-4A77-4DEB-B04C-9F4282A8BC04}" type="datetime1">
               <a:rPr lang="en-US" smtClean="0"/>
               <a:pPr/>
-              <a:t>5/4/2019</a:t>
+              <a:t>5/23/2019</a:t>
             </a:fld>
             <a:endParaRPr lang="en-US"/>
           </a:p>
@@ -2508,10 +2516,9 @@
           <a:lstStyle/>
           <a:p>
             <a:r>
-              <a:rPr lang="en-US" smtClean="0"/>
+              <a:rPr lang="en-US"/>
               <a:t>Click to edit Master title style</a:t>
             </a:r>
-            <a:endParaRPr lang="en-US"/>
           </a:p>
         </p:txBody>
       </p:sp>
@@ -2533,7 +2540,7 @@
             <a:fld id="{02B28685-4D0C-42D5-8013-B5904CD1FCBC}" type="datetime1">
               <a:rPr lang="en-US" smtClean="0"/>
               <a:pPr/>
-              <a:t>5/4/2019</a:t>
+              <a:t>5/23/2019</a:t>
             </a:fld>
             <a:endParaRPr lang="en-US"/>
           </a:p>
@@ -2625,7 +2632,7 @@
             <a:fld id="{FDF226C0-9885-4BA9-BBFA-A52CBFEBB775}" type="datetime1">
               <a:rPr lang="en-US" smtClean="0"/>
               <a:pPr/>
-              <a:t>5/4/2019</a:t>
+              <a:t>5/23/2019</a:t>
             </a:fld>
             <a:endParaRPr lang="en-US"/>
           </a:p>
@@ -2724,7 +2731,7 @@
           </a:lstStyle>
           <a:p>
             <a:r>
-              <a:rPr lang="en-US" smtClean="0"/>
+              <a:rPr lang="en-US"/>
               <a:t>Click to edit Master title style</a:t>
             </a:r>
             <a:endParaRPr lang="en-US" dirty="0"/>
@@ -2792,7 +2799,7 @@
           <a:p>
             <a:pPr lvl="0"/>
             <a:r>
-              <a:rPr lang="en-US" smtClean="0"/>
+              <a:rPr lang="en-US"/>
               <a:t>Click to edit Master text styles</a:t>
             </a:r>
           </a:p>
@@ -2816,7 +2823,7 @@
             <a:fld id="{EBEE1B38-C5EB-4D66-9137-0AFE9CDEDE8F}" type="datetime1">
               <a:rPr lang="en-US" smtClean="0"/>
               <a:pPr/>
-              <a:t>5/4/2019</a:t>
+              <a:t>5/23/2019</a:t>
             </a:fld>
             <a:endParaRPr lang="en-US"/>
           </a:p>
@@ -2887,38 +2894,37 @@
           <a:p>
             <a:pPr lvl="0"/>
             <a:r>
-              <a:rPr lang="en-US" smtClean="0"/>
+              <a:rPr lang="en-US"/>
               <a:t>Click to edit Master text styles</a:t>
             </a:r>
           </a:p>
           <a:p>
             <a:pPr lvl="1"/>
             <a:r>
-              <a:rPr lang="en-US" smtClean="0"/>
+              <a:rPr lang="en-US"/>
               <a:t>Second level</a:t>
             </a:r>
           </a:p>
           <a:p>
             <a:pPr lvl="2"/>
             <a:r>
-              <a:rPr lang="en-US" smtClean="0"/>
+              <a:rPr lang="en-US"/>
               <a:t>Third level</a:t>
             </a:r>
           </a:p>
           <a:p>
             <a:pPr lvl="3"/>
             <a:r>
-              <a:rPr lang="en-US" smtClean="0"/>
+              <a:rPr lang="en-US"/>
               <a:t>Fourth level</a:t>
             </a:r>
           </a:p>
           <a:p>
             <a:pPr lvl="4"/>
             <a:r>
-              <a:rPr lang="en-US" smtClean="0"/>
+              <a:rPr lang="en-US"/>
               <a:t>Fifth level</a:t>
             </a:r>
-            <a:endParaRPr lang="en-US"/>
           </a:p>
         </p:txBody>
       </p:sp>
@@ -2979,7 +2985,7 @@
           </a:lstStyle>
           <a:p>
             <a:r>
-              <a:rPr lang="en-US" smtClean="0"/>
+              <a:rPr lang="en-US"/>
               <a:t>Click to edit Master title style</a:t>
             </a:r>
             <a:endParaRPr lang="en-US" dirty="0"/>
@@ -3044,7 +3050,7 @@
           </a:lstStyle>
           <a:p>
             <a:r>
-              <a:rPr lang="en-US" smtClean="0"/>
+              <a:rPr lang="en-US"/>
               <a:t>Click icon to add picture</a:t>
             </a:r>
             <a:endParaRPr lang="en-US" dirty="0"/>
@@ -3112,7 +3118,7 @@
           <a:p>
             <a:pPr lvl="0"/>
             <a:r>
-              <a:rPr lang="en-US" smtClean="0"/>
+              <a:rPr lang="en-US"/>
               <a:t>Click to edit Master text styles</a:t>
             </a:r>
           </a:p>
@@ -3136,7 +3142,7 @@
             <a:fld id="{327B613C-1AD7-49D3-885D-F654C5CDBAA6}" type="datetime1">
               <a:rPr lang="en-US" smtClean="0"/>
               <a:pPr/>
-              <a:t>5/4/2019</a:t>
+              <a:t>5/23/2019</a:t>
             </a:fld>
             <a:endParaRPr lang="en-US" dirty="0"/>
           </a:p>
@@ -3241,7 +3247,7 @@
           <a:lstStyle/>
           <a:p>
             <a:r>
-              <a:rPr lang="en-US" smtClean="0"/>
+              <a:rPr lang="en-US"/>
               <a:t>Click to edit Master title style</a:t>
             </a:r>
             <a:endParaRPr lang="en-US" dirty="0"/>
@@ -3275,35 +3281,35 @@
           <a:p>
             <a:pPr lvl="0"/>
             <a:r>
-              <a:rPr lang="en-US" smtClean="0"/>
+              <a:rPr lang="en-US"/>
               <a:t>Click to edit Master text styles</a:t>
             </a:r>
           </a:p>
           <a:p>
             <a:pPr lvl="1"/>
             <a:r>
-              <a:rPr lang="en-US" smtClean="0"/>
+              <a:rPr lang="en-US"/>
               <a:t>Second level</a:t>
             </a:r>
           </a:p>
           <a:p>
             <a:pPr lvl="2"/>
             <a:r>
-              <a:rPr lang="en-US" smtClean="0"/>
+              <a:rPr lang="en-US"/>
               <a:t>Third level</a:t>
             </a:r>
           </a:p>
           <a:p>
             <a:pPr lvl="3"/>
             <a:r>
-              <a:rPr lang="en-US" smtClean="0"/>
+              <a:rPr lang="en-US"/>
               <a:t>Fourth level</a:t>
             </a:r>
           </a:p>
           <a:p>
             <a:pPr lvl="4"/>
             <a:r>
-              <a:rPr lang="en-US" smtClean="0"/>
+              <a:rPr lang="en-US"/>
               <a:t>Fifth level</a:t>
             </a:r>
             <a:endParaRPr lang="en-US" dirty="0"/>
@@ -3518,7 +3524,7 @@
             <a:fld id="{327B613C-1AD7-49D3-885D-F654C5CDBAA6}" type="datetime1">
               <a:rPr lang="en-US" smtClean="0"/>
               <a:pPr/>
-              <a:t>5/4/2019</a:t>
+              <a:t>5/23/2019</a:t>
             </a:fld>
             <a:endParaRPr lang="en-US" dirty="0"/>
           </a:p>
@@ -3858,10 +3864,9 @@
           <a:lstStyle/>
           <a:p>
             <a:r>
-              <a:rPr lang="en-IN" dirty="0" smtClean="0"/>
+              <a:rPr lang="en-IN" dirty="0"/>
               <a:t>Control logic design</a:t>
             </a:r>
-            <a:endParaRPr lang="en-IN" dirty="0"/>
           </a:p>
         </p:txBody>
       </p:sp>
@@ -3881,10 +3886,9 @@
           <a:lstStyle/>
           <a:p>
             <a:r>
-              <a:rPr lang="en-IN" dirty="0" smtClean="0"/>
+              <a:rPr lang="en-IN" dirty="0"/>
               <a:t>Module 6</a:t>
             </a:r>
-            <a:endParaRPr lang="en-IN" dirty="0"/>
           </a:p>
         </p:txBody>
       </p:sp>
@@ -3915,20 +3919,13 @@
     </p:spTree>
     <p:extLst>
       <p:ext uri="{BB962C8B-B14F-4D97-AF65-F5344CB8AC3E}">
-        <p14:creationId xmlns:p14="http://schemas.microsoft.com/office/powerpoint/2010/main" xmlns="" val="3284870402"/>
+        <p14:creationId xmlns:p14="http://schemas.microsoft.com/office/powerpoint/2010/main" val="3284870402"/>
       </p:ext>
     </p:extLst>
   </p:cSld>
   <p:clrMapOvr>
     <a:masterClrMapping/>
   </p:clrMapOvr>
-  <p:timing>
-    <p:tnLst>
-      <p:par>
-        <p:cTn id="1" dur="indefinite" restart="never" nodeType="tmRoot"/>
-      </p:par>
-    </p:tnLst>
-  </p:timing>
 </p:sld>
 </file>
 
@@ -3970,10 +3967,9 @@
           <a:lstStyle/>
           <a:p>
             <a:r>
-              <a:rPr lang="en-IN" dirty="0" smtClean="0"/>
+              <a:rPr lang="en-IN" dirty="0"/>
               <a:t>Algorithm:</a:t>
             </a:r>
-            <a:endParaRPr lang="en-IN" dirty="0"/>
           </a:p>
         </p:txBody>
       </p:sp>
@@ -4013,7 +4009,7 @@
           <a:blip r:embed="rId2">
             <a:extLst>
               <a:ext uri="{28A0092B-C50C-407E-A947-70E740481C1C}">
-                <a14:useLocalDpi xmlns:a14="http://schemas.microsoft.com/office/drawing/2010/main" xmlns="" val="0"/>
+                <a14:useLocalDpi xmlns:a14="http://schemas.microsoft.com/office/drawing/2010/main" val="0"/>
               </a:ext>
             </a:extLst>
           </a:blip>
@@ -4036,14 +4032,14 @@
           </a:ln>
           <a:extLst>
             <a:ext uri="{909E8E84-426E-40DD-AFC4-6F175D3DCCD1}">
-              <a14:hiddenFill xmlns:a14="http://schemas.microsoft.com/office/drawing/2010/main" xmlns="">
+              <a14:hiddenFill xmlns:a14="http://schemas.microsoft.com/office/drawing/2010/main">
                 <a:solidFill>
                   <a:schemeClr val="accent1"/>
                 </a:solidFill>
               </a14:hiddenFill>
             </a:ext>
             <a:ext uri="{91240B29-F687-4F45-9708-019B960494DF}">
-              <a14:hiddenLine xmlns:a14="http://schemas.microsoft.com/office/drawing/2010/main" xmlns="" w="9525">
+              <a14:hiddenLine xmlns:a14="http://schemas.microsoft.com/office/drawing/2010/main" w="9525">
                 <a:solidFill>
                   <a:schemeClr val="tx1"/>
                 </a:solidFill>
@@ -4058,20 +4054,13 @@
     </p:spTree>
     <p:extLst>
       <p:ext uri="{BB962C8B-B14F-4D97-AF65-F5344CB8AC3E}">
-        <p14:creationId xmlns:p14="http://schemas.microsoft.com/office/powerpoint/2010/main" xmlns="" val="2980808692"/>
+        <p14:creationId xmlns:p14="http://schemas.microsoft.com/office/powerpoint/2010/main" val="2980808692"/>
       </p:ext>
     </p:extLst>
   </p:cSld>
   <p:clrMapOvr>
     <a:masterClrMapping/>
   </p:clrMapOvr>
-  <p:timing>
-    <p:tnLst>
-      <p:par>
-        <p:cTn id="1" dur="indefinite" restart="never" nodeType="tmRoot"/>
-      </p:par>
-    </p:tnLst>
-  </p:timing>
 </p:sld>
 </file>
 
@@ -4113,10 +4102,9 @@
           <a:lstStyle/>
           <a:p>
             <a:r>
-              <a:rPr lang="en-IN" dirty="0" smtClean="0"/>
+              <a:rPr lang="en-IN" dirty="0"/>
               <a:t>Control state diagram</a:t>
             </a:r>
-            <a:endParaRPr lang="en-IN" dirty="0"/>
           </a:p>
         </p:txBody>
       </p:sp>
@@ -4156,7 +4144,7 @@
           <a:blip r:embed="rId2">
             <a:extLst>
               <a:ext uri="{28A0092B-C50C-407E-A947-70E740481C1C}">
-                <a14:useLocalDpi xmlns:a14="http://schemas.microsoft.com/office/drawing/2010/main" xmlns="" val="0"/>
+                <a14:useLocalDpi xmlns:a14="http://schemas.microsoft.com/office/drawing/2010/main" val="0"/>
               </a:ext>
             </a:extLst>
           </a:blip>
@@ -4179,14 +4167,14 @@
           </a:ln>
           <a:extLst>
             <a:ext uri="{909E8E84-426E-40DD-AFC4-6F175D3DCCD1}">
-              <a14:hiddenFill xmlns:a14="http://schemas.microsoft.com/office/drawing/2010/main" xmlns="">
+              <a14:hiddenFill xmlns:a14="http://schemas.microsoft.com/office/drawing/2010/main">
                 <a:solidFill>
                   <a:schemeClr val="accent1"/>
                 </a:solidFill>
               </a14:hiddenFill>
             </a:ext>
             <a:ext uri="{91240B29-F687-4F45-9708-019B960494DF}">
-              <a14:hiddenLine xmlns:a14="http://schemas.microsoft.com/office/drawing/2010/main" xmlns="" w="9525">
+              <a14:hiddenLine xmlns:a14="http://schemas.microsoft.com/office/drawing/2010/main" w="9525">
                 <a:solidFill>
                   <a:schemeClr val="tx1"/>
                 </a:solidFill>
@@ -4201,20 +4189,13 @@
     </p:spTree>
     <p:extLst>
       <p:ext uri="{BB962C8B-B14F-4D97-AF65-F5344CB8AC3E}">
-        <p14:creationId xmlns:p14="http://schemas.microsoft.com/office/powerpoint/2010/main" xmlns="" val="849307035"/>
+        <p14:creationId xmlns:p14="http://schemas.microsoft.com/office/powerpoint/2010/main" val="849307035"/>
       </p:ext>
     </p:extLst>
   </p:cSld>
   <p:clrMapOvr>
     <a:masterClrMapping/>
   </p:clrMapOvr>
-  <p:timing>
-    <p:tnLst>
-      <p:par>
-        <p:cTn id="1" dur="indefinite" restart="never" nodeType="tmRoot"/>
-      </p:par>
-    </p:tnLst>
-  </p:timing>
 </p:sld>
 </file>
 
@@ -4309,7 +4290,7 @@
           <a:blip r:embed="rId2">
             <a:extLst>
               <a:ext uri="{28A0092B-C50C-407E-A947-70E740481C1C}">
-                <a14:useLocalDpi xmlns:a14="http://schemas.microsoft.com/office/drawing/2010/main" xmlns="" val="0"/>
+                <a14:useLocalDpi xmlns:a14="http://schemas.microsoft.com/office/drawing/2010/main" val="0"/>
               </a:ext>
             </a:extLst>
           </a:blip>
@@ -4332,14 +4313,14 @@
           </a:ln>
           <a:extLst>
             <a:ext uri="{909E8E84-426E-40DD-AFC4-6F175D3DCCD1}">
-              <a14:hiddenFill xmlns:a14="http://schemas.microsoft.com/office/drawing/2010/main" xmlns="">
+              <a14:hiddenFill xmlns:a14="http://schemas.microsoft.com/office/drawing/2010/main">
                 <a:solidFill>
                   <a:schemeClr val="accent1"/>
                 </a:solidFill>
               </a14:hiddenFill>
             </a:ext>
             <a:ext uri="{91240B29-F687-4F45-9708-019B960494DF}">
-              <a14:hiddenLine xmlns:a14="http://schemas.microsoft.com/office/drawing/2010/main" xmlns="" w="9525">
+              <a14:hiddenLine xmlns:a14="http://schemas.microsoft.com/office/drawing/2010/main" w="9525">
                 <a:solidFill>
                   <a:schemeClr val="tx1"/>
                 </a:solidFill>
@@ -4354,20 +4335,13 @@
     </p:spTree>
     <p:extLst>
       <p:ext uri="{BB962C8B-B14F-4D97-AF65-F5344CB8AC3E}">
-        <p14:creationId xmlns:p14="http://schemas.microsoft.com/office/powerpoint/2010/main" xmlns="" val="2696008052"/>
+        <p14:creationId xmlns:p14="http://schemas.microsoft.com/office/powerpoint/2010/main" val="2696008052"/>
       </p:ext>
     </p:extLst>
   </p:cSld>
   <p:clrMapOvr>
     <a:masterClrMapping/>
   </p:clrMapOvr>
-  <p:timing>
-    <p:tnLst>
-      <p:par>
-        <p:cTn id="1" dur="indefinite" restart="never" nodeType="tmRoot"/>
-      </p:par>
-    </p:tnLst>
-  </p:timing>
 </p:sld>
 </file>
 
@@ -4409,64 +4383,64 @@
           <a:lstStyle/>
           <a:p>
             <a:r>
-              <a:rPr lang="en-IN" dirty="0" smtClean="0"/>
+              <a:rPr lang="en-IN" dirty="0"/>
               <a:t>Design of hard wired control</a:t>
             </a:r>
           </a:p>
           <a:p>
             <a:pPr lvl="1"/>
             <a:r>
-              <a:rPr lang="en-IN" dirty="0" smtClean="0"/>
+              <a:rPr lang="en-IN" dirty="0"/>
               <a:t>8 states are required as we have seen. </a:t>
             </a:r>
           </a:p>
           <a:p>
             <a:pPr lvl="1"/>
             <a:r>
-              <a:rPr lang="en-IN" dirty="0" smtClean="0"/>
+              <a:rPr lang="en-IN" dirty="0"/>
               <a:t>So 8 D </a:t>
             </a:r>
             <a:r>
-              <a:rPr lang="en-IN" dirty="0" err="1" smtClean="0"/>
+              <a:rPr lang="en-IN" dirty="0" err="1"/>
               <a:t>flipflops</a:t>
             </a:r>
             <a:r>
-              <a:rPr lang="en-IN" dirty="0" smtClean="0"/>
+              <a:rPr lang="en-IN" dirty="0"/>
               <a:t> used with the following input functions(implemented in decision logic)</a:t>
             </a:r>
           </a:p>
           <a:p>
             <a:pPr lvl="1"/>
             <a:r>
-              <a:rPr lang="en-IN" dirty="0" smtClean="0"/>
+              <a:rPr lang="en-IN" dirty="0"/>
               <a:t>At a time, any of the state will be active and corresponding D </a:t>
             </a:r>
             <a:r>
-              <a:rPr lang="en-IN" dirty="0" err="1" smtClean="0"/>
+              <a:rPr lang="en-IN" dirty="0" err="1"/>
               <a:t>flipflop</a:t>
             </a:r>
             <a:r>
-              <a:rPr lang="en-IN" dirty="0" smtClean="0"/>
+              <a:rPr lang="en-IN" dirty="0"/>
               <a:t> will be activated</a:t>
             </a:r>
           </a:p>
           <a:p>
             <a:pPr lvl="1"/>
             <a:r>
-              <a:rPr lang="en-IN" dirty="0" smtClean="0"/>
+              <a:rPr lang="en-IN" dirty="0"/>
               <a:t>The output signals are generated according to the </a:t>
             </a:r>
             <a:r>
-              <a:rPr lang="en-IN" dirty="0" err="1" smtClean="0"/>
+              <a:rPr lang="en-IN" dirty="0" err="1"/>
               <a:t>booean</a:t>
             </a:r>
             <a:r>
-              <a:rPr lang="en-IN" dirty="0" smtClean="0"/>
+              <a:rPr lang="en-IN" dirty="0"/>
               <a:t> function(in table) using OR gate.</a:t>
             </a:r>
           </a:p>
           <a:p>
-            <a:endParaRPr lang="en-IN" dirty="0" smtClean="0"/>
+            <a:endParaRPr lang="en-IN" dirty="0"/>
           </a:p>
           <a:p>
             <a:endParaRPr lang="en-IN" dirty="0"/>
@@ -4509,7 +4483,7 @@
           <a:blip r:embed="rId2">
             <a:extLst>
               <a:ext uri="{28A0092B-C50C-407E-A947-70E740481C1C}">
-                <a14:useLocalDpi xmlns:a14="http://schemas.microsoft.com/office/drawing/2010/main" xmlns="" val="0"/>
+                <a14:useLocalDpi xmlns:a14="http://schemas.microsoft.com/office/drawing/2010/main" val="0"/>
               </a:ext>
             </a:extLst>
           </a:blip>
@@ -4532,14 +4506,14 @@
           </a:ln>
           <a:extLst>
             <a:ext uri="{909E8E84-426E-40DD-AFC4-6F175D3DCCD1}">
-              <a14:hiddenFill xmlns:a14="http://schemas.microsoft.com/office/drawing/2010/main" xmlns="">
+              <a14:hiddenFill xmlns:a14="http://schemas.microsoft.com/office/drawing/2010/main">
                 <a:solidFill>
                   <a:schemeClr val="accent1"/>
                 </a:solidFill>
               </a14:hiddenFill>
             </a:ext>
             <a:ext uri="{91240B29-F687-4F45-9708-019B960494DF}">
-              <a14:hiddenLine xmlns:a14="http://schemas.microsoft.com/office/drawing/2010/main" xmlns="" w="9525">
+              <a14:hiddenLine xmlns:a14="http://schemas.microsoft.com/office/drawing/2010/main" w="9525">
                 <a:solidFill>
                   <a:schemeClr val="tx1"/>
                 </a:solidFill>
@@ -4554,20 +4528,13 @@
     </p:spTree>
     <p:extLst>
       <p:ext uri="{BB962C8B-B14F-4D97-AF65-F5344CB8AC3E}">
-        <p14:creationId xmlns:p14="http://schemas.microsoft.com/office/powerpoint/2010/main" xmlns="" val="2299130246"/>
+        <p14:creationId xmlns:p14="http://schemas.microsoft.com/office/powerpoint/2010/main" val="2299130246"/>
       </p:ext>
     </p:extLst>
   </p:cSld>
   <p:clrMapOvr>
     <a:masterClrMapping/>
   </p:clrMapOvr>
-  <p:timing>
-    <p:tnLst>
-      <p:par>
-        <p:cTn id="1" dur="indefinite" restart="never" nodeType="tmRoot"/>
-      </p:par>
-    </p:tnLst>
-  </p:timing>
 </p:sld>
 </file>
 
@@ -4604,10 +4571,9 @@
           <a:lstStyle/>
           <a:p>
             <a:r>
-              <a:rPr lang="en-IN" dirty="0" smtClean="0"/>
+              <a:rPr lang="en-IN" dirty="0"/>
               <a:t>2. Sequence register and decoder method</a:t>
             </a:r>
-            <a:endParaRPr lang="en-IN" dirty="0"/>
           </a:p>
         </p:txBody>
       </p:sp>
@@ -4627,16 +4593,15 @@
           <a:lstStyle/>
           <a:p>
             <a:r>
-              <a:rPr lang="en-IN" dirty="0" smtClean="0"/>
+              <a:rPr lang="en-IN" dirty="0"/>
               <a:t>Register: to sequence control states</a:t>
             </a:r>
           </a:p>
           <a:p>
             <a:r>
-              <a:rPr lang="en-IN" dirty="0" smtClean="0"/>
+              <a:rPr lang="en-IN" dirty="0"/>
               <a:t>Register decoded to provide one output for each state	</a:t>
             </a:r>
-            <a:endParaRPr lang="en-IN" dirty="0"/>
           </a:p>
         </p:txBody>
       </p:sp>
@@ -4676,7 +4641,7 @@
           <a:blip r:embed="rId2">
             <a:extLst>
               <a:ext uri="{28A0092B-C50C-407E-A947-70E740481C1C}">
-                <a14:useLocalDpi xmlns:a14="http://schemas.microsoft.com/office/drawing/2010/main" xmlns="" val="0"/>
+                <a14:useLocalDpi xmlns:a14="http://schemas.microsoft.com/office/drawing/2010/main" val="0"/>
               </a:ext>
             </a:extLst>
           </a:blip>
@@ -4699,14 +4664,14 @@
           </a:ln>
           <a:extLst>
             <a:ext uri="{909E8E84-426E-40DD-AFC4-6F175D3DCCD1}">
-              <a14:hiddenFill xmlns:a14="http://schemas.microsoft.com/office/drawing/2010/main" xmlns="">
+              <a14:hiddenFill xmlns:a14="http://schemas.microsoft.com/office/drawing/2010/main">
                 <a:solidFill>
                   <a:schemeClr val="accent1"/>
                 </a:solidFill>
               </a14:hiddenFill>
             </a:ext>
             <a:ext uri="{91240B29-F687-4F45-9708-019B960494DF}">
-              <a14:hiddenLine xmlns:a14="http://schemas.microsoft.com/office/drawing/2010/main" xmlns="" w="9525">
+              <a14:hiddenLine xmlns:a14="http://schemas.microsoft.com/office/drawing/2010/main" w="9525">
                 <a:solidFill>
                   <a:schemeClr val="tx1"/>
                 </a:solidFill>
@@ -4721,20 +4686,13 @@
     </p:spTree>
     <p:extLst>
       <p:ext uri="{BB962C8B-B14F-4D97-AF65-F5344CB8AC3E}">
-        <p14:creationId xmlns:p14="http://schemas.microsoft.com/office/powerpoint/2010/main" xmlns="" val="2945303835"/>
+        <p14:creationId xmlns:p14="http://schemas.microsoft.com/office/powerpoint/2010/main" val="2945303835"/>
       </p:ext>
     </p:extLst>
   </p:cSld>
   <p:clrMapOvr>
     <a:masterClrMapping/>
   </p:clrMapOvr>
-  <p:timing>
-    <p:tnLst>
-      <p:par>
-        <p:cTn id="1" dur="indefinite" restart="never" nodeType="tmRoot"/>
-      </p:par>
-    </p:tnLst>
-  </p:timing>
 </p:sld>
 </file>
 
@@ -4772,18 +4730,13 @@
           <a:p>
             <a:r>
               <a:rPr lang="en-IN" dirty="0"/>
-              <a:t>Example[Hardwired </a:t>
-            </a:r>
-            <a:r>
-              <a:rPr lang="en-IN" dirty="0" smtClean="0"/>
-              <a:t>control-example2]</a:t>
-            </a:r>
-            <a:endParaRPr lang="en-IN" dirty="0"/>
-          </a:p>
-        </p:txBody>
-      </p:sp>
-      <mc:AlternateContent xmlns:mc="http://schemas.openxmlformats.org/markup-compatibility/2006">
-        <mc:Choice xmlns:a14="http://schemas.microsoft.com/office/drawing/2010/main" xmlns="" Requires="a14">
+              <a:t>Example[Hardwired control-example2]</a:t>
+            </a:r>
+          </a:p>
+        </p:txBody>
+      </p:sp>
+      <mc:AlternateContent xmlns:mc="http://schemas.openxmlformats.org/markup-compatibility/2006" xmlns:a14="http://schemas.microsoft.com/office/drawing/2010/main">
+        <mc:Choice Requires="a14">
           <p:sp>
             <p:nvSpPr>
               <p:cNvPr id="3" name="Content Placeholder 2"/>
@@ -4800,7 +4753,7 @@
               <a:lstStyle/>
               <a:p>
                 <a:r>
-                  <a:rPr lang="en-IN" dirty="0" smtClean="0"/>
+                  <a:rPr lang="en-IN" dirty="0"/>
                   <a:t>Problem statement: To design an arithmetic circuit that multiplies two fixed point binary numbers in sign magnitude representation</a:t>
                 </a:r>
               </a:p>
@@ -4820,18 +4773,9 @@
               <a:p>
                 <a:pPr lvl="1"/>
                 <a:r>
-                  <a:rPr lang="en-IN" dirty="0" smtClean="0"/>
-                  <a:t>B</a:t>
+                  <a:rPr lang="en-IN" dirty="0"/>
+                  <a:t>B: to store multiplicand, Q-multiplier, A-partial product</a:t>
                 </a:r>
-                <a:r>
-                  <a:rPr lang="en-IN" dirty="0"/>
-                  <a:t>: </a:t>
-                </a:r>
-                <a:r>
-                  <a:rPr lang="en-IN" dirty="0" smtClean="0"/>
-                  <a:t>to store multiplicand, Q-multiplier, A-partial product</a:t>
-                </a:r>
-                <a:endParaRPr lang="en-IN" dirty="0"/>
               </a:p>
               <a:p>
                 <a:pPr lvl="1"/>
@@ -4841,7 +4785,7 @@
                       <m:sSubPr>
                         <m:ctrlPr>
                           <a:rPr lang="en-IN" i="1">
-                            <a:latin typeface="Cambria Math"/>
+                            <a:latin typeface="Cambria Math" panose="02040503050406030204" pitchFamily="18" charset="0"/>
                           </a:rPr>
                         </m:ctrlPr>
                       </m:sSubPr>
@@ -4872,7 +4816,7 @@
                       <m:sSubPr>
                         <m:ctrlPr>
                           <a:rPr lang="en-IN" i="1">
-                            <a:latin typeface="Cambria Math"/>
+                            <a:latin typeface="Cambria Math" panose="02040503050406030204" pitchFamily="18" charset="0"/>
                           </a:rPr>
                         </m:ctrlPr>
                       </m:sSubPr>
@@ -4896,12 +4840,8 @@
                   </m:oMath>
                 </a14:m>
                 <a:r>
-                  <a:rPr lang="en-IN" dirty="0" smtClean="0"/>
+                  <a:rPr lang="en-IN" dirty="0"/>
                   <a:t>,</a:t>
-                </a:r>
-                <a:r>
-                  <a:rPr lang="en-IN" dirty="0"/>
-                  <a:t/>
                 </a:r>
                 <a14:m>
                   <m:oMath xmlns:m="http://schemas.openxmlformats.org/officeDocument/2006/math">
@@ -4909,7 +4849,7 @@
                       <m:sSubPr>
                         <m:ctrlPr>
                           <a:rPr lang="en-IN" i="1">
-                            <a:latin typeface="Cambria Math"/>
+                            <a:latin typeface="Cambria Math" panose="02040503050406030204" pitchFamily="18" charset="0"/>
                           </a:rPr>
                         </m:ctrlPr>
                       </m:sSubPr>
@@ -4941,13 +4881,8 @@
                 <a:pPr lvl="1"/>
                 <a:r>
                   <a:rPr lang="en-IN" dirty="0"/>
-                  <a:t>P</a:t>
+                  <a:t>P: counter(no of bits in the multiplier, decremented after formation of each partial product)</a:t>
                 </a:r>
-                <a:r>
-                  <a:rPr lang="en-IN" dirty="0" smtClean="0"/>
-                  <a:t>: counter(no of bits in the multiplier, decremented after formation of each partial product)</a:t>
-                </a:r>
-                <a:endParaRPr lang="en-IN" dirty="0"/>
               </a:p>
               <a:p>
                 <a:pPr lvl="1"/>
@@ -4964,7 +4899,7 @@
                       <m:sSubPr>
                         <m:ctrlPr>
                           <a:rPr lang="en-IN" i="1">
-                            <a:latin typeface="Cambria Math"/>
+                            <a:latin typeface="Cambria Math" panose="02040503050406030204" pitchFamily="18" charset="0"/>
                           </a:rPr>
                         </m:ctrlPr>
                       </m:sSubPr>
@@ -4988,12 +4923,8 @@
                   </m:oMath>
                 </a14:m>
                 <a:r>
-                  <a:rPr lang="en-IN" dirty="0" smtClean="0"/>
-                  <a:t>: operation </a:t>
-                </a:r>
-                <a:r>
                   <a:rPr lang="en-IN" dirty="0"/>
-                  <a:t>to be performed</a:t>
+                  <a:t>: operation to be performed</a:t>
                 </a:r>
               </a:p>
               <a:p>
@@ -5011,7 +4942,7 @@
                       <m:sSubPr>
                         <m:ctrlPr>
                           <a:rPr lang="en-IN" i="1">
-                            <a:latin typeface="Cambria Math"/>
+                            <a:latin typeface="Cambria Math" panose="02040503050406030204" pitchFamily="18" charset="0"/>
                           </a:rPr>
                         </m:ctrlPr>
                       </m:sSubPr>
@@ -5036,13 +4967,8 @@
                 </a14:m>
                 <a:r>
                   <a:rPr lang="en-IN" dirty="0"/>
-                  <a:t>: </a:t>
+                  <a:t>: rightmost bit in register Q</a:t>
                 </a:r>
-                <a:r>
-                  <a:rPr lang="en-IN" dirty="0" smtClean="0"/>
-                  <a:t>rightmost bit in register Q</a:t>
-                </a:r>
-                <a:endParaRPr lang="en-IN" dirty="0"/>
               </a:p>
               <a:p>
                 <a:endParaRPr lang="en-IN" dirty="0"/>
@@ -5050,7 +4976,7 @@
             </p:txBody>
           </p:sp>
         </mc:Choice>
-        <mc:Fallback>
+        <mc:Fallback xmlns="">
           <p:sp>
             <p:nvSpPr>
               <p:cNvPr id="3" name="Content Placeholder 2"/>
@@ -5111,20 +5037,13 @@
     </p:spTree>
     <p:extLst>
       <p:ext uri="{BB962C8B-B14F-4D97-AF65-F5344CB8AC3E}">
-        <p14:creationId xmlns:p14="http://schemas.microsoft.com/office/powerpoint/2010/main" xmlns="" val="3886619561"/>
+        <p14:creationId xmlns:p14="http://schemas.microsoft.com/office/powerpoint/2010/main" val="3886619561"/>
       </p:ext>
     </p:extLst>
   </p:cSld>
   <p:clrMapOvr>
     <a:masterClrMapping/>
   </p:clrMapOvr>
-  <p:timing>
-    <p:tnLst>
-      <p:par>
-        <p:cTn id="1" dur="indefinite" restart="never" nodeType="tmRoot"/>
-      </p:par>
-    </p:tnLst>
-  </p:timing>
 </p:sld>
 </file>
 
@@ -5202,7 +5121,7 @@
           <a:blip r:embed="rId2">
             <a:extLst>
               <a:ext uri="{28A0092B-C50C-407E-A947-70E740481C1C}">
-                <a14:useLocalDpi xmlns:a14="http://schemas.microsoft.com/office/drawing/2010/main" xmlns="" val="0"/>
+                <a14:useLocalDpi xmlns:a14="http://schemas.microsoft.com/office/drawing/2010/main" val="0"/>
               </a:ext>
             </a:extLst>
           </a:blip>
@@ -5225,14 +5144,14 @@
           </a:ln>
           <a:extLst>
             <a:ext uri="{909E8E84-426E-40DD-AFC4-6F175D3DCCD1}">
-              <a14:hiddenFill xmlns:a14="http://schemas.microsoft.com/office/drawing/2010/main" xmlns="">
+              <a14:hiddenFill xmlns:a14="http://schemas.microsoft.com/office/drawing/2010/main">
                 <a:solidFill>
                   <a:schemeClr val="accent1"/>
                 </a:solidFill>
               </a14:hiddenFill>
             </a:ext>
             <a:ext uri="{91240B29-F687-4F45-9708-019B960494DF}">
-              <a14:hiddenLine xmlns:a14="http://schemas.microsoft.com/office/drawing/2010/main" xmlns="" w="9525">
+              <a14:hiddenLine xmlns:a14="http://schemas.microsoft.com/office/drawing/2010/main" w="9525">
                 <a:solidFill>
                   <a:schemeClr val="tx1"/>
                 </a:solidFill>
@@ -5247,20 +5166,13 @@
     </p:spTree>
     <p:extLst>
       <p:ext uri="{BB962C8B-B14F-4D97-AF65-F5344CB8AC3E}">
-        <p14:creationId xmlns:p14="http://schemas.microsoft.com/office/powerpoint/2010/main" xmlns="" val="763461793"/>
+        <p14:creationId xmlns:p14="http://schemas.microsoft.com/office/powerpoint/2010/main" val="763461793"/>
       </p:ext>
     </p:extLst>
   </p:cSld>
   <p:clrMapOvr>
     <a:masterClrMapping/>
   </p:clrMapOvr>
-  <p:timing>
-    <p:tnLst>
-      <p:par>
-        <p:cTn id="1" dur="indefinite" restart="never" nodeType="tmRoot"/>
-      </p:par>
-    </p:tnLst>
-  </p:timing>
 </p:sld>
 </file>
 
@@ -5355,7 +5267,7 @@
           <a:blip r:embed="rId2">
             <a:extLst>
               <a:ext uri="{28A0092B-C50C-407E-A947-70E740481C1C}">
-                <a14:useLocalDpi xmlns:a14="http://schemas.microsoft.com/office/drawing/2010/main" xmlns="" val="0"/>
+                <a14:useLocalDpi xmlns:a14="http://schemas.microsoft.com/office/drawing/2010/main" val="0"/>
               </a:ext>
             </a:extLst>
           </a:blip>
@@ -5378,14 +5290,14 @@
           </a:ln>
           <a:extLst>
             <a:ext uri="{909E8E84-426E-40DD-AFC4-6F175D3DCCD1}">
-              <a14:hiddenFill xmlns:a14="http://schemas.microsoft.com/office/drawing/2010/main" xmlns="">
+              <a14:hiddenFill xmlns:a14="http://schemas.microsoft.com/office/drawing/2010/main">
                 <a:solidFill>
                   <a:schemeClr val="accent1"/>
                 </a:solidFill>
               </a14:hiddenFill>
             </a:ext>
             <a:ext uri="{91240B29-F687-4F45-9708-019B960494DF}">
-              <a14:hiddenLine xmlns:a14="http://schemas.microsoft.com/office/drawing/2010/main" xmlns="" w="9525">
+              <a14:hiddenLine xmlns:a14="http://schemas.microsoft.com/office/drawing/2010/main" w="9525">
                 <a:solidFill>
                   <a:schemeClr val="tx1"/>
                 </a:solidFill>
@@ -5400,20 +5312,13 @@
     </p:spTree>
     <p:extLst>
       <p:ext uri="{BB962C8B-B14F-4D97-AF65-F5344CB8AC3E}">
-        <p14:creationId xmlns:p14="http://schemas.microsoft.com/office/powerpoint/2010/main" xmlns="" val="812912646"/>
+        <p14:creationId xmlns:p14="http://schemas.microsoft.com/office/powerpoint/2010/main" val="812912646"/>
       </p:ext>
     </p:extLst>
   </p:cSld>
   <p:clrMapOvr>
     <a:masterClrMapping/>
   </p:clrMapOvr>
-  <p:timing>
-    <p:tnLst>
-      <p:par>
-        <p:cTn id="1" dur="indefinite" restart="never" nodeType="tmRoot"/>
-      </p:par>
-    </p:tnLst>
-  </p:timing>
 </p:sld>
 </file>
 
@@ -5508,7 +5413,7 @@
           <a:blip r:embed="rId2">
             <a:extLst>
               <a:ext uri="{28A0092B-C50C-407E-A947-70E740481C1C}">
-                <a14:useLocalDpi xmlns:a14="http://schemas.microsoft.com/office/drawing/2010/main" xmlns="" val="0"/>
+                <a14:useLocalDpi xmlns:a14="http://schemas.microsoft.com/office/drawing/2010/main" val="0"/>
               </a:ext>
             </a:extLst>
           </a:blip>
@@ -5531,14 +5436,14 @@
           </a:ln>
           <a:extLst>
             <a:ext uri="{909E8E84-426E-40DD-AFC4-6F175D3DCCD1}">
-              <a14:hiddenFill xmlns:a14="http://schemas.microsoft.com/office/drawing/2010/main" xmlns="">
+              <a14:hiddenFill xmlns:a14="http://schemas.microsoft.com/office/drawing/2010/main">
                 <a:solidFill>
                   <a:schemeClr val="accent1"/>
                 </a:solidFill>
               </a14:hiddenFill>
             </a:ext>
             <a:ext uri="{91240B29-F687-4F45-9708-019B960494DF}">
-              <a14:hiddenLine xmlns:a14="http://schemas.microsoft.com/office/drawing/2010/main" xmlns="" w="9525">
+              <a14:hiddenLine xmlns:a14="http://schemas.microsoft.com/office/drawing/2010/main" w="9525">
                 <a:solidFill>
                   <a:schemeClr val="tx1"/>
                 </a:solidFill>
@@ -5553,20 +5458,13 @@
     </p:spTree>
     <p:extLst>
       <p:ext uri="{BB962C8B-B14F-4D97-AF65-F5344CB8AC3E}">
-        <p14:creationId xmlns:p14="http://schemas.microsoft.com/office/powerpoint/2010/main" xmlns="" val="498274625"/>
+        <p14:creationId xmlns:p14="http://schemas.microsoft.com/office/powerpoint/2010/main" val="498274625"/>
       </p:ext>
     </p:extLst>
   </p:cSld>
   <p:clrMapOvr>
     <a:masterClrMapping/>
   </p:clrMapOvr>
-  <p:timing>
-    <p:tnLst>
-      <p:par>
-        <p:cTn id="1" dur="indefinite" restart="never" nodeType="tmRoot"/>
-      </p:par>
-    </p:tnLst>
-  </p:timing>
 </p:sld>
 </file>
 
@@ -5628,83 +5526,82 @@
           </a:bodyPr>
           <a:lstStyle/>
           <a:p>
-            <a:endParaRPr lang="en-IN" dirty="0" smtClean="0"/>
-          </a:p>
-          <a:p>
             <a:endParaRPr lang="en-IN" dirty="0"/>
           </a:p>
           <a:p>
-            <a:endParaRPr lang="en-IN" dirty="0" smtClean="0"/>
-          </a:p>
-          <a:p>
             <a:endParaRPr lang="en-IN" dirty="0"/>
           </a:p>
           <a:p>
-            <a:endParaRPr lang="en-IN" dirty="0" smtClean="0"/>
-          </a:p>
-          <a:p>
             <a:endParaRPr lang="en-IN" dirty="0"/>
           </a:p>
           <a:p>
-            <a:endParaRPr lang="en-IN" dirty="0" smtClean="0"/>
-          </a:p>
-          <a:p>
-            <a:r>
-              <a:rPr lang="en-IN" dirty="0" smtClean="0"/>
+            <a:endParaRPr lang="en-IN" dirty="0"/>
+          </a:p>
+          <a:p>
+            <a:endParaRPr lang="en-IN" dirty="0"/>
+          </a:p>
+          <a:p>
+            <a:endParaRPr lang="en-IN" dirty="0"/>
+          </a:p>
+          <a:p>
+            <a:endParaRPr lang="en-IN" dirty="0"/>
+          </a:p>
+          <a:p>
+            <a:r>
+              <a:rPr lang="en-IN" dirty="0"/>
               <a:t>Output from control logic:</a:t>
             </a:r>
           </a:p>
           <a:p>
             <a:pPr lvl="1"/>
             <a:r>
-              <a:rPr lang="en-IN" b="1" dirty="0" smtClean="0"/>
+              <a:rPr lang="en-IN" b="1" dirty="0"/>
               <a:t>T0</a:t>
             </a:r>
             <a:r>
-              <a:rPr lang="en-IN" dirty="0" smtClean="0"/>
+              <a:rPr lang="en-IN" dirty="0"/>
               <a:t>-indicates that system in initial state</a:t>
             </a:r>
           </a:p>
           <a:p>
             <a:pPr lvl="1"/>
             <a:r>
-              <a:rPr lang="en-IN" b="1" dirty="0" smtClean="0"/>
+              <a:rPr lang="en-IN" b="1" dirty="0"/>
               <a:t>T1</a:t>
             </a:r>
             <a:r>
-              <a:rPr lang="en-IN" dirty="0" smtClean="0"/>
+              <a:rPr lang="en-IN" dirty="0"/>
               <a:t>-loads sign to As and k into P</a:t>
             </a:r>
           </a:p>
           <a:p>
             <a:pPr lvl="1"/>
             <a:r>
-              <a:rPr lang="en-IN" b="1" dirty="0" smtClean="0"/>
+              <a:rPr lang="en-IN" b="1" dirty="0"/>
               <a:t>T2</a:t>
             </a:r>
             <a:r>
-              <a:rPr lang="en-IN" dirty="0" smtClean="0"/>
+              <a:rPr lang="en-IN" dirty="0"/>
               <a:t>-decrements P, </a:t>
             </a:r>
           </a:p>
           <a:p>
             <a:pPr lvl="2"/>
             <a:r>
-              <a:rPr lang="en-IN" dirty="0" smtClean="0"/>
+              <a:rPr lang="en-IN" dirty="0"/>
               <a:t>If Q=1, L generated- loads A (sum)and E</a:t>
             </a:r>
           </a:p>
           <a:p>
             <a:pPr lvl="1"/>
             <a:r>
-              <a:rPr lang="en-IN" b="1" dirty="0" smtClean="0"/>
+              <a:rPr lang="en-IN" b="1" dirty="0"/>
               <a:t>T3</a:t>
             </a:r>
             <a:r>
-              <a:rPr lang="en-IN" dirty="0" smtClean="0"/>
+              <a:rPr lang="en-IN" dirty="0"/>
               <a:t>-Shifts A,Q, clears E</a:t>
             </a:r>
-            <a:endParaRPr lang="en-IN" dirty="0"/>
           </a:p>
         </p:txBody>
       </p:sp>
@@ -5744,7 +5641,7 @@
           <a:blip r:embed="rId2">
             <a:extLst>
               <a:ext uri="{28A0092B-C50C-407E-A947-70E740481C1C}">
-                <a14:useLocalDpi xmlns:a14="http://schemas.microsoft.com/office/drawing/2010/main" xmlns="" val="0"/>
+                <a14:useLocalDpi xmlns:a14="http://schemas.microsoft.com/office/drawing/2010/main" val="0"/>
               </a:ext>
             </a:extLst>
           </a:blip>
@@ -5767,14 +5664,14 @@
           </a:ln>
           <a:extLst>
             <a:ext uri="{909E8E84-426E-40DD-AFC4-6F175D3DCCD1}">
-              <a14:hiddenFill xmlns:a14="http://schemas.microsoft.com/office/drawing/2010/main" xmlns="">
+              <a14:hiddenFill xmlns:a14="http://schemas.microsoft.com/office/drawing/2010/main">
                 <a:solidFill>
                   <a:schemeClr val="accent1"/>
                 </a:solidFill>
               </a14:hiddenFill>
             </a:ext>
             <a:ext uri="{91240B29-F687-4F45-9708-019B960494DF}">
-              <a14:hiddenLine xmlns:a14="http://schemas.microsoft.com/office/drawing/2010/main" xmlns="" w="9525">
+              <a14:hiddenLine xmlns:a14="http://schemas.microsoft.com/office/drawing/2010/main" w="9525">
                 <a:solidFill>
                   <a:schemeClr val="tx1"/>
                 </a:solidFill>
@@ -5798,7 +5695,7 @@
           <a:blip r:embed="rId3">
             <a:extLst>
               <a:ext uri="{28A0092B-C50C-407E-A947-70E740481C1C}">
-                <a14:useLocalDpi xmlns:a14="http://schemas.microsoft.com/office/drawing/2010/main" xmlns="" val="0"/>
+                <a14:useLocalDpi xmlns:a14="http://schemas.microsoft.com/office/drawing/2010/main" val="0"/>
               </a:ext>
             </a:extLst>
           </a:blip>
@@ -5821,14 +5718,14 @@
           </a:ln>
           <a:extLst>
             <a:ext uri="{909E8E84-426E-40DD-AFC4-6F175D3DCCD1}">
-              <a14:hiddenFill xmlns:a14="http://schemas.microsoft.com/office/drawing/2010/main" xmlns="">
+              <a14:hiddenFill xmlns:a14="http://schemas.microsoft.com/office/drawing/2010/main">
                 <a:solidFill>
                   <a:schemeClr val="accent1"/>
                 </a:solidFill>
               </a14:hiddenFill>
             </a:ext>
             <a:ext uri="{91240B29-F687-4F45-9708-019B960494DF}">
-              <a14:hiddenLine xmlns:a14="http://schemas.microsoft.com/office/drawing/2010/main" xmlns="" w="9525">
+              <a14:hiddenLine xmlns:a14="http://schemas.microsoft.com/office/drawing/2010/main" w="9525">
                 <a:solidFill>
                   <a:schemeClr val="tx1"/>
                 </a:solidFill>
@@ -5843,20 +5740,13 @@
     </p:spTree>
     <p:extLst>
       <p:ext uri="{BB962C8B-B14F-4D97-AF65-F5344CB8AC3E}">
-        <p14:creationId xmlns:p14="http://schemas.microsoft.com/office/powerpoint/2010/main" xmlns="" val="1305221283"/>
+        <p14:creationId xmlns:p14="http://schemas.microsoft.com/office/powerpoint/2010/main" val="1305221283"/>
       </p:ext>
     </p:extLst>
   </p:cSld>
   <p:clrMapOvr>
     <a:masterClrMapping/>
   </p:clrMapOvr>
-  <p:timing>
-    <p:tnLst>
-      <p:par>
-        <p:cTn id="1" dur="indefinite" restart="never" nodeType="tmRoot"/>
-      </p:par>
-    </p:tnLst>
-  </p:timing>
 </p:sld>
 </file>
 
@@ -5897,71 +5787,46 @@
           <a:bodyPr/>
           <a:lstStyle/>
           <a:p>
-            <a:endParaRPr lang="en-US" altLang="en-US" dirty="0" smtClean="0"/>
-          </a:p>
-          <a:p>
             <a:endParaRPr lang="en-US" altLang="en-US" dirty="0"/>
           </a:p>
           <a:p>
-            <a:endParaRPr lang="en-US" altLang="en-US" dirty="0" smtClean="0"/>
-          </a:p>
-          <a:p>
-            <a:endParaRPr lang="en-US" altLang="en-US" dirty="0" smtClean="0"/>
-          </a:p>
-          <a:p>
             <a:endParaRPr lang="en-US" altLang="en-US" dirty="0"/>
           </a:p>
           <a:p>
-            <a:endParaRPr lang="en-US" altLang="en-US" dirty="0" smtClean="0"/>
-          </a:p>
-          <a:p>
-            <a:r>
-              <a:rPr lang="en-US" altLang="en-US" dirty="0" smtClean="0"/>
-              <a:t>The control logic initiates all </a:t>
-            </a:r>
-            <a:r>
-              <a:rPr lang="en-US" altLang="en-US" dirty="0" err="1" smtClean="0"/>
-              <a:t>microoperations</a:t>
-            </a:r>
-            <a:r>
-              <a:rPr lang="en-US" altLang="en-US" dirty="0" smtClean="0"/>
-              <a:t> in data processor</a:t>
-            </a:r>
-          </a:p>
-          <a:p>
-            <a:r>
-              <a:rPr lang="en-US" altLang="en-US" dirty="0" smtClean="0"/>
-              <a:t>To </a:t>
-            </a:r>
+            <a:endParaRPr lang="en-US" altLang="en-US" dirty="0"/>
+          </a:p>
+          <a:p>
+            <a:endParaRPr lang="en-US" altLang="en-US" dirty="0"/>
+          </a:p>
+          <a:p>
+            <a:endParaRPr lang="en-US" altLang="en-US" dirty="0"/>
+          </a:p>
+          <a:p>
+            <a:endParaRPr lang="en-US" altLang="en-US" dirty="0"/>
+          </a:p>
+          <a:p>
             <a:r>
               <a:rPr lang="en-US" altLang="en-US" dirty="0"/>
-              <a:t>execute instructions, the processor must have some means of generating the control signals needed in the proper </a:t>
-            </a:r>
-            <a:r>
-              <a:rPr lang="en-US" altLang="en-US" dirty="0" smtClean="0"/>
-              <a:t>sequence</a:t>
-            </a:r>
-          </a:p>
-          <a:p>
-            <a:r>
-              <a:rPr lang="en-US" altLang="en-US" dirty="0" smtClean="0"/>
+              <a:t>The control logic initiates all microoperations in data processor</a:t>
+            </a:r>
+          </a:p>
+          <a:p>
+            <a:r>
+              <a:rPr lang="en-US" altLang="en-US" dirty="0"/>
+              <a:t>To execute instructions, the processor must have some means of generating the control signals needed in the proper sequence</a:t>
+            </a:r>
+          </a:p>
+          <a:p>
+            <a:r>
+              <a:rPr lang="en-US" altLang="en-US" dirty="0"/>
               <a:t>Done using sequential circuit whose internal states dictate the control functions of the system</a:t>
             </a:r>
           </a:p>
           <a:p>
             <a:r>
-              <a:rPr lang="en-US" altLang="en-US" dirty="0" err="1" smtClean="0"/>
-              <a:t>Ie</a:t>
-            </a:r>
-            <a:r>
-              <a:rPr lang="en-US" altLang="en-US" dirty="0" smtClean="0"/>
-              <a:t>, at any time, state of sequential control initiates a set of </a:t>
-            </a:r>
-            <a:r>
-              <a:rPr lang="en-US" altLang="en-US" dirty="0" err="1" smtClean="0"/>
-              <a:t>microoperations</a:t>
-            </a:r>
-            <a:endParaRPr lang="en-US" altLang="en-US" dirty="0"/>
+              <a:rPr lang="en-US" altLang="en-US" dirty="0"/>
+              <a:t>I.e., at any time, state of sequential control initiates a set of microoperations</a:t>
+            </a:r>
           </a:p>
           <a:p>
             <a:endParaRPr lang="en-IN" dirty="0"/>
@@ -6004,7 +5869,7 @@
           <a:blip r:embed="rId2">
             <a:extLst>
               <a:ext uri="{28A0092B-C50C-407E-A947-70E740481C1C}">
-                <a14:useLocalDpi xmlns:a14="http://schemas.microsoft.com/office/drawing/2010/main" xmlns="" val="0"/>
+                <a14:useLocalDpi xmlns:a14="http://schemas.microsoft.com/office/drawing/2010/main" val="0"/>
               </a:ext>
             </a:extLst>
           </a:blip>
@@ -6027,14 +5892,14 @@
           </a:ln>
           <a:extLst>
             <a:ext uri="{909E8E84-426E-40DD-AFC4-6F175D3DCCD1}">
-              <a14:hiddenFill xmlns:a14="http://schemas.microsoft.com/office/drawing/2010/main" xmlns="">
+              <a14:hiddenFill xmlns:a14="http://schemas.microsoft.com/office/drawing/2010/main">
                 <a:solidFill>
                   <a:schemeClr val="accent1"/>
                 </a:solidFill>
               </a14:hiddenFill>
             </a:ext>
             <a:ext uri="{91240B29-F687-4F45-9708-019B960494DF}">
-              <a14:hiddenLine xmlns:a14="http://schemas.microsoft.com/office/drawing/2010/main" xmlns="" w="9525">
+              <a14:hiddenLine xmlns:a14="http://schemas.microsoft.com/office/drawing/2010/main" w="9525">
                 <a:solidFill>
                   <a:schemeClr val="tx1"/>
                 </a:solidFill>
@@ -6049,20 +5914,13 @@
     </p:spTree>
     <p:extLst>
       <p:ext uri="{BB962C8B-B14F-4D97-AF65-F5344CB8AC3E}">
-        <p14:creationId xmlns:p14="http://schemas.microsoft.com/office/powerpoint/2010/main" xmlns="" val="1885774646"/>
+        <p14:creationId xmlns:p14="http://schemas.microsoft.com/office/powerpoint/2010/main" val="1885774646"/>
       </p:ext>
     </p:extLst>
   </p:cSld>
   <p:clrMapOvr>
     <a:masterClrMapping/>
   </p:clrMapOvr>
-  <p:timing>
-    <p:tnLst>
-      <p:par>
-        <p:cTn id="1" dur="indefinite" restart="never" nodeType="tmRoot"/>
-      </p:par>
-    </p:tnLst>
-  </p:timing>
 </p:sld>
 </file>
 
@@ -6104,25 +5962,24 @@
           <a:lstStyle/>
           <a:p>
             <a:r>
-              <a:rPr lang="en-IN" dirty="0" smtClean="0"/>
+              <a:rPr lang="en-IN" dirty="0"/>
               <a:t>Design of hard wired control</a:t>
             </a:r>
           </a:p>
           <a:p>
             <a:pPr lvl="1"/>
             <a:r>
-              <a:rPr lang="en-IN" dirty="0" smtClean="0"/>
+              <a:rPr lang="en-IN" dirty="0"/>
               <a:t>2 JK </a:t>
             </a:r>
             <a:r>
-              <a:rPr lang="en-IN" dirty="0" err="1" smtClean="0"/>
+              <a:rPr lang="en-IN" dirty="0" err="1"/>
               <a:t>flipflops</a:t>
             </a:r>
             <a:r>
-              <a:rPr lang="en-IN" dirty="0" smtClean="0"/>
+              <a:rPr lang="en-IN" dirty="0"/>
               <a:t> and 1 2x4 decoder can be used as there are 4 states</a:t>
             </a:r>
-            <a:endParaRPr lang="en-IN" dirty="0"/>
           </a:p>
         </p:txBody>
       </p:sp>
@@ -6162,7 +6019,7 @@
           <a:blip r:embed="rId2">
             <a:extLst>
               <a:ext uri="{28A0092B-C50C-407E-A947-70E740481C1C}">
-                <a14:useLocalDpi xmlns:a14="http://schemas.microsoft.com/office/drawing/2010/main" xmlns="" val="0"/>
+                <a14:useLocalDpi xmlns:a14="http://schemas.microsoft.com/office/drawing/2010/main" val="0"/>
               </a:ext>
             </a:extLst>
           </a:blip>
@@ -6185,14 +6042,14 @@
           </a:ln>
           <a:extLst>
             <a:ext uri="{909E8E84-426E-40DD-AFC4-6F175D3DCCD1}">
-              <a14:hiddenFill xmlns:a14="http://schemas.microsoft.com/office/drawing/2010/main" xmlns="">
+              <a14:hiddenFill xmlns:a14="http://schemas.microsoft.com/office/drawing/2010/main">
                 <a:solidFill>
                   <a:schemeClr val="accent1"/>
                 </a:solidFill>
               </a14:hiddenFill>
             </a:ext>
             <a:ext uri="{91240B29-F687-4F45-9708-019B960494DF}">
-              <a14:hiddenLine xmlns:a14="http://schemas.microsoft.com/office/drawing/2010/main" xmlns="" w="9525">
+              <a14:hiddenLine xmlns:a14="http://schemas.microsoft.com/office/drawing/2010/main" w="9525">
                 <a:solidFill>
                   <a:schemeClr val="tx1"/>
                 </a:solidFill>
@@ -6216,7 +6073,7 @@
           <a:blip r:embed="rId3">
             <a:extLst>
               <a:ext uri="{28A0092B-C50C-407E-A947-70E740481C1C}">
-                <a14:useLocalDpi xmlns:a14="http://schemas.microsoft.com/office/drawing/2010/main" xmlns="" val="0"/>
+                <a14:useLocalDpi xmlns:a14="http://schemas.microsoft.com/office/drawing/2010/main" val="0"/>
               </a:ext>
             </a:extLst>
           </a:blip>
@@ -6239,14 +6096,14 @@
           </a:ln>
           <a:extLst>
             <a:ext uri="{909E8E84-426E-40DD-AFC4-6F175D3DCCD1}">
-              <a14:hiddenFill xmlns:a14="http://schemas.microsoft.com/office/drawing/2010/main" xmlns="">
+              <a14:hiddenFill xmlns:a14="http://schemas.microsoft.com/office/drawing/2010/main">
                 <a:solidFill>
                   <a:schemeClr val="accent1"/>
                 </a:solidFill>
               </a14:hiddenFill>
             </a:ext>
             <a:ext uri="{91240B29-F687-4F45-9708-019B960494DF}">
-              <a14:hiddenLine xmlns:a14="http://schemas.microsoft.com/office/drawing/2010/main" xmlns="" w="9525">
+              <a14:hiddenLine xmlns:a14="http://schemas.microsoft.com/office/drawing/2010/main" w="9525">
                 <a:solidFill>
                   <a:schemeClr val="tx1"/>
                 </a:solidFill>
@@ -6261,20 +6118,13 @@
     </p:spTree>
     <p:extLst>
       <p:ext uri="{BB962C8B-B14F-4D97-AF65-F5344CB8AC3E}">
-        <p14:creationId xmlns:p14="http://schemas.microsoft.com/office/powerpoint/2010/main" xmlns="" val="590777812"/>
+        <p14:creationId xmlns:p14="http://schemas.microsoft.com/office/powerpoint/2010/main" val="590777812"/>
       </p:ext>
     </p:extLst>
   </p:cSld>
   <p:clrMapOvr>
     <a:masterClrMapping/>
   </p:clrMapOvr>
-  <p:timing>
-    <p:tnLst>
-      <p:par>
-        <p:cTn id="1" dur="indefinite" restart="never" nodeType="tmRoot"/>
-      </p:par>
-    </p:tnLst>
-  </p:timing>
 </p:sld>
 </file>
 
@@ -6369,7 +6219,7 @@
           <a:blip r:embed="rId2">
             <a:extLst>
               <a:ext uri="{28A0092B-C50C-407E-A947-70E740481C1C}">
-                <a14:useLocalDpi xmlns:a14="http://schemas.microsoft.com/office/drawing/2010/main" xmlns="" val="0"/>
+                <a14:useLocalDpi xmlns:a14="http://schemas.microsoft.com/office/drawing/2010/main" val="0"/>
               </a:ext>
             </a:extLst>
           </a:blip>
@@ -6392,14 +6242,14 @@
           </a:ln>
           <a:extLst>
             <a:ext uri="{909E8E84-426E-40DD-AFC4-6F175D3DCCD1}">
-              <a14:hiddenFill xmlns:a14="http://schemas.microsoft.com/office/drawing/2010/main" xmlns="">
+              <a14:hiddenFill xmlns:a14="http://schemas.microsoft.com/office/drawing/2010/main">
                 <a:solidFill>
                   <a:schemeClr val="accent1"/>
                 </a:solidFill>
               </a14:hiddenFill>
             </a:ext>
             <a:ext uri="{91240B29-F687-4F45-9708-019B960494DF}">
-              <a14:hiddenLine xmlns:a14="http://schemas.microsoft.com/office/drawing/2010/main" xmlns="" w="9525">
+              <a14:hiddenLine xmlns:a14="http://schemas.microsoft.com/office/drawing/2010/main" w="9525">
                 <a:solidFill>
                   <a:schemeClr val="tx1"/>
                 </a:solidFill>
@@ -6414,20 +6264,13 @@
     </p:spTree>
     <p:extLst>
       <p:ext uri="{BB962C8B-B14F-4D97-AF65-F5344CB8AC3E}">
-        <p14:creationId xmlns:p14="http://schemas.microsoft.com/office/powerpoint/2010/main" xmlns="" val="1717701050"/>
+        <p14:creationId xmlns:p14="http://schemas.microsoft.com/office/powerpoint/2010/main" val="1717701050"/>
       </p:ext>
     </p:extLst>
   </p:cSld>
   <p:clrMapOvr>
     <a:masterClrMapping/>
   </p:clrMapOvr>
-  <p:timing>
-    <p:tnLst>
-      <p:par>
-        <p:cTn id="1" dur="indefinite" restart="never" nodeType="tmRoot"/>
-      </p:par>
-    </p:tnLst>
-  </p:timing>
 </p:sld>
 </file>
 
@@ -6464,10 +6307,9 @@
           <a:lstStyle/>
           <a:p>
             <a:r>
-              <a:rPr lang="en-IN" dirty="0" smtClean="0"/>
+              <a:rPr lang="en-IN" dirty="0"/>
               <a:t>3. Programmable Logic Array</a:t>
             </a:r>
-            <a:endParaRPr lang="en-IN" dirty="0"/>
           </a:p>
         </p:txBody>
       </p:sp>
@@ -6487,19 +6329,19 @@
           <a:lstStyle/>
           <a:p>
             <a:r>
-              <a:rPr lang="en-IN" dirty="0" smtClean="0"/>
+              <a:rPr lang="en-IN" dirty="0"/>
               <a:t>PLA replaces decoder and decision logic circuits</a:t>
             </a:r>
           </a:p>
           <a:p>
             <a:r>
-              <a:rPr lang="en-IN" dirty="0" smtClean="0"/>
+              <a:rPr lang="en-IN" dirty="0"/>
               <a:t>Internal paths inside PLA are programmed according to program table</a:t>
             </a:r>
           </a:p>
           <a:p>
             <a:r>
-              <a:rPr lang="en-IN" dirty="0" smtClean="0"/>
+              <a:rPr lang="en-IN" dirty="0"/>
               <a:t>Similar to sequence register and decoder method, except that all combinational circuits are implemented with PLA</a:t>
             </a:r>
           </a:p>
@@ -6544,7 +6386,7 @@
           <a:blip r:embed="rId2">
             <a:extLst>
               <a:ext uri="{28A0092B-C50C-407E-A947-70E740481C1C}">
-                <a14:useLocalDpi xmlns:a14="http://schemas.microsoft.com/office/drawing/2010/main" xmlns="" val="0"/>
+                <a14:useLocalDpi xmlns:a14="http://schemas.microsoft.com/office/drawing/2010/main" val="0"/>
               </a:ext>
             </a:extLst>
           </a:blip>
@@ -6567,14 +6409,14 @@
           </a:ln>
           <a:extLst>
             <a:ext uri="{909E8E84-426E-40DD-AFC4-6F175D3DCCD1}">
-              <a14:hiddenFill xmlns:a14="http://schemas.microsoft.com/office/drawing/2010/main" xmlns="">
+              <a14:hiddenFill xmlns:a14="http://schemas.microsoft.com/office/drawing/2010/main">
                 <a:solidFill>
                   <a:schemeClr val="accent1"/>
                 </a:solidFill>
               </a14:hiddenFill>
             </a:ext>
             <a:ext uri="{91240B29-F687-4F45-9708-019B960494DF}">
-              <a14:hiddenLine xmlns:a14="http://schemas.microsoft.com/office/drawing/2010/main" xmlns="" w="9525">
+              <a14:hiddenLine xmlns:a14="http://schemas.microsoft.com/office/drawing/2010/main" w="9525">
                 <a:solidFill>
                   <a:schemeClr val="tx1"/>
                 </a:solidFill>
@@ -6589,20 +6431,13 @@
     </p:spTree>
     <p:extLst>
       <p:ext uri="{BB962C8B-B14F-4D97-AF65-F5344CB8AC3E}">
-        <p14:creationId xmlns:p14="http://schemas.microsoft.com/office/powerpoint/2010/main" xmlns="" val="3000591972"/>
+        <p14:creationId xmlns:p14="http://schemas.microsoft.com/office/powerpoint/2010/main" val="3000591972"/>
       </p:ext>
     </p:extLst>
   </p:cSld>
   <p:clrMapOvr>
     <a:masterClrMapping/>
   </p:clrMapOvr>
-  <p:timing>
-    <p:tnLst>
-      <p:par>
-        <p:cTn id="1" dur="indefinite" restart="never" nodeType="tmRoot"/>
-      </p:par>
-    </p:tnLst>
-  </p:timing>
 </p:sld>
 </file>
 
@@ -6639,41 +6474,40 @@
           <a:lstStyle/>
           <a:p>
             <a:r>
-              <a:rPr lang="en-IN" dirty="0" smtClean="0"/>
+              <a:rPr lang="en-IN" dirty="0"/>
               <a:t>PLA basics</a:t>
             </a:r>
+          </a:p>
+        </p:txBody>
+      </p:sp>
+      <p:sp>
+        <p:nvSpPr>
+          <p:cNvPr id="3" name="Content Placeholder 2"/>
+          <p:cNvSpPr>
+            <a:spLocks noGrp="1"/>
+          </p:cNvSpPr>
+          <p:nvPr>
+            <p:ph idx="1"/>
+          </p:nvPr>
+        </p:nvSpPr>
+        <p:spPr/>
+        <p:txBody>
+          <a:bodyPr/>
+          <a:lstStyle/>
+          <a:p>
             <a:endParaRPr lang="en-IN" dirty="0"/>
           </a:p>
-        </p:txBody>
-      </p:sp>
-      <p:sp>
-        <p:nvSpPr>
-          <p:cNvPr id="3" name="Content Placeholder 2"/>
-          <p:cNvSpPr>
-            <a:spLocks noGrp="1"/>
-          </p:cNvSpPr>
-          <p:nvPr>
-            <p:ph idx="1"/>
-          </p:nvPr>
-        </p:nvSpPr>
-        <p:spPr/>
-        <p:txBody>
-          <a:bodyPr/>
-          <a:lstStyle/>
-          <a:p>
-            <a:endParaRPr lang="en-IN" dirty="0" smtClean="0"/>
-          </a:p>
           <a:p>
             <a:endParaRPr lang="en-IN" dirty="0"/>
           </a:p>
           <a:p>
-            <a:endParaRPr lang="en-IN" dirty="0" smtClean="0"/>
-          </a:p>
-          <a:p>
             <a:endParaRPr lang="en-IN" dirty="0"/>
           </a:p>
           <a:p>
-            <a:endParaRPr lang="en-IN" dirty="0" smtClean="0"/>
+            <a:endParaRPr lang="en-IN" dirty="0"/>
+          </a:p>
+          <a:p>
+            <a:endParaRPr lang="en-IN" dirty="0"/>
           </a:p>
           <a:p>
             <a:r>
@@ -6686,24 +6520,16 @@
             </a:r>
             <a:r>
               <a:rPr lang="en-IN" dirty="0"/>
-              <a:t> OR gates inside the PLA are initially fabricated with the links (fuses) among </a:t>
-            </a:r>
-            <a:r>
-              <a:rPr lang="en-IN" dirty="0" smtClean="0"/>
-              <a:t>them</a:t>
-            </a:r>
-          </a:p>
-          <a:p>
-            <a:endParaRPr lang="en-IN" dirty="0" smtClean="0"/>
-          </a:p>
-          <a:p>
-            <a:r>
-              <a:rPr lang="en-IN" dirty="0" smtClean="0"/>
-              <a:t>The </a:t>
-            </a:r>
+              <a:t> OR gates inside the PLA are initially fabricated with the links (fuses) among them</a:t>
+            </a:r>
+          </a:p>
+          <a:p>
+            <a:endParaRPr lang="en-IN" dirty="0"/>
+          </a:p>
+          <a:p>
             <a:r>
               <a:rPr lang="en-IN" dirty="0"/>
-              <a:t>specific Boolean functions are implemented in sum of products form by opening appropriate links and leaving the desired connections.</a:t>
+              <a:t>The specific Boolean functions are implemented in sum of products form by opening appropriate links and leaving the desired connections.</a:t>
             </a:r>
           </a:p>
         </p:txBody>
@@ -6744,7 +6570,7 @@
           <a:blip r:embed="rId2">
             <a:extLst>
               <a:ext uri="{28A0092B-C50C-407E-A947-70E740481C1C}">
-                <a14:useLocalDpi xmlns:a14="http://schemas.microsoft.com/office/drawing/2010/main" xmlns="" val="0"/>
+                <a14:useLocalDpi xmlns:a14="http://schemas.microsoft.com/office/drawing/2010/main" val="0"/>
               </a:ext>
             </a:extLst>
           </a:blip>
@@ -6767,14 +6593,14 @@
           </a:ln>
           <a:extLst>
             <a:ext uri="{909E8E84-426E-40DD-AFC4-6F175D3DCCD1}">
-              <a14:hiddenFill xmlns:a14="http://schemas.microsoft.com/office/drawing/2010/main" xmlns="">
+              <a14:hiddenFill xmlns:a14="http://schemas.microsoft.com/office/drawing/2010/main">
                 <a:solidFill>
                   <a:schemeClr val="accent1"/>
                 </a:solidFill>
               </a14:hiddenFill>
             </a:ext>
             <a:ext uri="{91240B29-F687-4F45-9708-019B960494DF}">
-              <a14:hiddenLine xmlns:a14="http://schemas.microsoft.com/office/drawing/2010/main" xmlns="" w="9525">
+              <a14:hiddenLine xmlns:a14="http://schemas.microsoft.com/office/drawing/2010/main" w="9525">
                 <a:solidFill>
                   <a:schemeClr val="tx1"/>
                 </a:solidFill>
@@ -6789,20 +6615,13 @@
     </p:spTree>
     <p:extLst>
       <p:ext uri="{BB962C8B-B14F-4D97-AF65-F5344CB8AC3E}">
-        <p14:creationId xmlns:p14="http://schemas.microsoft.com/office/powerpoint/2010/main" xmlns="" val="2048486916"/>
+        <p14:creationId xmlns:p14="http://schemas.microsoft.com/office/powerpoint/2010/main" val="2048486916"/>
       </p:ext>
     </p:extLst>
   </p:cSld>
   <p:clrMapOvr>
     <a:masterClrMapping/>
   </p:clrMapOvr>
-  <p:timing>
-    <p:tnLst>
-      <p:par>
-        <p:cTn id="1" dur="indefinite" restart="never" nodeType="tmRoot"/>
-      </p:par>
-    </p:tnLst>
-  </p:timing>
 </p:sld>
 </file>
 
@@ -6897,7 +6716,7 @@
           <a:blip r:embed="rId2">
             <a:extLst>
               <a:ext uri="{28A0092B-C50C-407E-A947-70E740481C1C}">
-                <a14:useLocalDpi xmlns:a14="http://schemas.microsoft.com/office/drawing/2010/main" xmlns="" val="0"/>
+                <a14:useLocalDpi xmlns:a14="http://schemas.microsoft.com/office/drawing/2010/main" val="0"/>
               </a:ext>
             </a:extLst>
           </a:blip>
@@ -6920,14 +6739,14 @@
           </a:ln>
           <a:extLst>
             <a:ext uri="{909E8E84-426E-40DD-AFC4-6F175D3DCCD1}">
-              <a14:hiddenFill xmlns:a14="http://schemas.microsoft.com/office/drawing/2010/main" xmlns="">
+              <a14:hiddenFill xmlns:a14="http://schemas.microsoft.com/office/drawing/2010/main">
                 <a:solidFill>
                   <a:schemeClr val="accent1"/>
                 </a:solidFill>
               </a14:hiddenFill>
             </a:ext>
             <a:ext uri="{91240B29-F687-4F45-9708-019B960494DF}">
-              <a14:hiddenLine xmlns:a14="http://schemas.microsoft.com/office/drawing/2010/main" xmlns="" w="9525">
+              <a14:hiddenLine xmlns:a14="http://schemas.microsoft.com/office/drawing/2010/main" w="9525">
                 <a:solidFill>
                   <a:schemeClr val="tx1"/>
                 </a:solidFill>
@@ -6942,7 +6761,7 @@
     </p:spTree>
     <p:extLst>
       <p:ext uri="{BB962C8B-B14F-4D97-AF65-F5344CB8AC3E}">
-        <p14:creationId xmlns:p14="http://schemas.microsoft.com/office/powerpoint/2010/main" xmlns="" val="297009966"/>
+        <p14:creationId xmlns:p14="http://schemas.microsoft.com/office/powerpoint/2010/main" val="297009966"/>
       </p:ext>
     </p:extLst>
   </p:cSld>
@@ -6985,10 +6804,9 @@
           <a:lstStyle/>
           <a:p>
             <a:r>
-              <a:rPr lang="en-IN" dirty="0" smtClean="0"/>
+              <a:rPr lang="en-IN" dirty="0"/>
               <a:t>Example(section 10.7)</a:t>
             </a:r>
-            <a:endParaRPr lang="en-IN" dirty="0"/>
           </a:p>
         </p:txBody>
       </p:sp>
@@ -7012,14 +6830,14 @@
           <a:bodyPr/>
           <a:lstStyle/>
           <a:p>
-            <a:endParaRPr lang="en-IN" dirty="0" smtClean="0"/>
-          </a:p>
-          <a:p>
             <a:endParaRPr lang="en-IN" dirty="0"/>
           </a:p>
           <a:p>
-            <a:r>
-              <a:rPr lang="en-IN" dirty="0" smtClean="0"/>
+            <a:endParaRPr lang="en-IN" dirty="0"/>
+          </a:p>
+          <a:p>
+            <a:r>
+              <a:rPr lang="en-IN" dirty="0"/>
               <a:t>Design steps:</a:t>
             </a:r>
           </a:p>
@@ -7032,7 +6850,7 @@
               <a:buAutoNum type="arabicPeriod"/>
             </a:pPr>
             <a:r>
-              <a:rPr lang="en-IN" dirty="0" smtClean="0"/>
+              <a:rPr lang="en-IN" dirty="0"/>
               <a:t>Obtain state table for controller</a:t>
             </a:r>
           </a:p>
@@ -7041,23 +6859,23 @@
               <a:buNone/>
             </a:pPr>
             <a:r>
-              <a:rPr lang="en-IN" dirty="0" smtClean="0"/>
+              <a:rPr lang="en-IN" dirty="0"/>
               <a:t>(No of states determine the number of </a:t>
             </a:r>
             <a:r>
-              <a:rPr lang="en-IN" dirty="0" err="1" smtClean="0"/>
+              <a:rPr lang="en-IN" dirty="0" err="1"/>
               <a:t>flipflops</a:t>
             </a:r>
             <a:r>
-              <a:rPr lang="en-IN" dirty="0" smtClean="0"/>
+              <a:rPr lang="en-IN" dirty="0"/>
               <a:t> for sequence </a:t>
             </a:r>
             <a:r>
-              <a:rPr lang="en-IN" dirty="0" err="1" smtClean="0"/>
+              <a:rPr lang="en-IN" dirty="0" err="1"/>
               <a:t>reg</a:t>
             </a:r>
             <a:r>
-              <a:rPr lang="en-IN" dirty="0" smtClean="0"/>
+              <a:rPr lang="en-IN" dirty="0"/>
               <a:t>)</a:t>
             </a:r>
           </a:p>
@@ -7073,7 +6891,7 @@
               <a:buAutoNum type="arabicPeriod"/>
             </a:pPr>
             <a:r>
-              <a:rPr lang="en-IN" dirty="0" smtClean="0"/>
+              <a:rPr lang="en-IN" dirty="0"/>
               <a:t>Connect PLA to sequence register and to input and output variables </a:t>
             </a:r>
           </a:p>
@@ -7082,10 +6900,9 @@
               <a:buNone/>
             </a:pPr>
             <a:r>
-              <a:rPr lang="en-IN" dirty="0" smtClean="0"/>
+              <a:rPr lang="en-IN" dirty="0"/>
               <a:t>PLA program table obtained from state table</a:t>
             </a:r>
-            <a:endParaRPr lang="en-IN" dirty="0"/>
           </a:p>
         </p:txBody>
       </p:sp>
@@ -7116,7 +6933,7 @@
     </p:spTree>
     <p:extLst>
       <p:ext uri="{BB962C8B-B14F-4D97-AF65-F5344CB8AC3E}">
-        <p14:creationId xmlns:p14="http://schemas.microsoft.com/office/powerpoint/2010/main" xmlns="" val="4167980089"/>
+        <p14:creationId xmlns:p14="http://schemas.microsoft.com/office/powerpoint/2010/main" val="4167980089"/>
       </p:ext>
     </p:extLst>
   </p:cSld>
@@ -7228,7 +7045,7 @@
           <a:blip r:embed="rId2">
             <a:extLst>
               <a:ext uri="{28A0092B-C50C-407E-A947-70E740481C1C}">
-                <a14:useLocalDpi xmlns:a14="http://schemas.microsoft.com/office/drawing/2010/main" xmlns="" val="0"/>
+                <a14:useLocalDpi xmlns:a14="http://schemas.microsoft.com/office/drawing/2010/main" val="0"/>
               </a:ext>
             </a:extLst>
           </a:blip>
@@ -7251,14 +7068,14 @@
           </a:ln>
           <a:extLst>
             <a:ext uri="{909E8E84-426E-40DD-AFC4-6F175D3DCCD1}">
-              <a14:hiddenFill xmlns:a14="http://schemas.microsoft.com/office/drawing/2010/main" xmlns="">
+              <a14:hiddenFill xmlns:a14="http://schemas.microsoft.com/office/drawing/2010/main">
                 <a:solidFill>
                   <a:schemeClr val="accent1"/>
                 </a:solidFill>
               </a14:hiddenFill>
             </a:ext>
             <a:ext uri="{91240B29-F687-4F45-9708-019B960494DF}">
-              <a14:hiddenLine xmlns:a14="http://schemas.microsoft.com/office/drawing/2010/main" xmlns="" w="9525">
+              <a14:hiddenLine xmlns:a14="http://schemas.microsoft.com/office/drawing/2010/main" w="9525">
                 <a:solidFill>
                   <a:schemeClr val="tx1"/>
                 </a:solidFill>
@@ -7282,7 +7099,7 @@
           <a:blip r:embed="rId3">
             <a:extLst>
               <a:ext uri="{28A0092B-C50C-407E-A947-70E740481C1C}">
-                <a14:useLocalDpi xmlns:a14="http://schemas.microsoft.com/office/drawing/2010/main" xmlns="" val="0"/>
+                <a14:useLocalDpi xmlns:a14="http://schemas.microsoft.com/office/drawing/2010/main" val="0"/>
               </a:ext>
             </a:extLst>
           </a:blip>
@@ -7305,14 +7122,14 @@
           </a:ln>
           <a:extLst>
             <a:ext uri="{909E8E84-426E-40DD-AFC4-6F175D3DCCD1}">
-              <a14:hiddenFill xmlns:a14="http://schemas.microsoft.com/office/drawing/2010/main" xmlns="">
+              <a14:hiddenFill xmlns:a14="http://schemas.microsoft.com/office/drawing/2010/main">
                 <a:solidFill>
                   <a:schemeClr val="accent1"/>
                 </a:solidFill>
               </a14:hiddenFill>
             </a:ext>
             <a:ext uri="{91240B29-F687-4F45-9708-019B960494DF}">
-              <a14:hiddenLine xmlns:a14="http://schemas.microsoft.com/office/drawing/2010/main" xmlns="" w="9525">
+              <a14:hiddenLine xmlns:a14="http://schemas.microsoft.com/office/drawing/2010/main" w="9525">
                 <a:solidFill>
                   <a:schemeClr val="tx1"/>
                 </a:solidFill>
@@ -7327,7 +7144,7 @@
     </p:spTree>
     <p:extLst>
       <p:ext uri="{BB962C8B-B14F-4D97-AF65-F5344CB8AC3E}">
-        <p14:creationId xmlns:p14="http://schemas.microsoft.com/office/powerpoint/2010/main" xmlns="" val="3936682855"/>
+        <p14:creationId xmlns:p14="http://schemas.microsoft.com/office/powerpoint/2010/main" val="3936682855"/>
       </p:ext>
     </p:extLst>
   </p:cSld>
@@ -7395,83 +7212,82 @@
           </a:bodyPr>
           <a:lstStyle/>
           <a:p>
-            <a:endParaRPr lang="en-IN" dirty="0" smtClean="0"/>
-          </a:p>
-          <a:p>
             <a:endParaRPr lang="en-IN" dirty="0"/>
           </a:p>
           <a:p>
-            <a:endParaRPr lang="en-IN" dirty="0" smtClean="0"/>
-          </a:p>
-          <a:p>
             <a:endParaRPr lang="en-IN" dirty="0"/>
           </a:p>
           <a:p>
-            <a:endParaRPr lang="en-IN" dirty="0" smtClean="0"/>
-          </a:p>
-          <a:p>
             <a:endParaRPr lang="en-IN" dirty="0"/>
           </a:p>
           <a:p>
-            <a:endParaRPr lang="en-IN" dirty="0" smtClean="0"/>
-          </a:p>
-          <a:p>
-            <a:r>
-              <a:rPr lang="en-IN" dirty="0" smtClean="0"/>
+            <a:endParaRPr lang="en-IN" dirty="0"/>
+          </a:p>
+          <a:p>
+            <a:endParaRPr lang="en-IN" dirty="0"/>
+          </a:p>
+          <a:p>
+            <a:endParaRPr lang="en-IN" dirty="0"/>
+          </a:p>
+          <a:p>
+            <a:endParaRPr lang="en-IN" dirty="0"/>
+          </a:p>
+          <a:p>
+            <a:r>
+              <a:rPr lang="en-IN" dirty="0"/>
               <a:t>Output from control logic:</a:t>
             </a:r>
           </a:p>
           <a:p>
             <a:pPr lvl="1"/>
             <a:r>
-              <a:rPr lang="en-IN" b="1" dirty="0" smtClean="0"/>
+              <a:rPr lang="en-IN" b="1" dirty="0"/>
               <a:t>T0</a:t>
             </a:r>
             <a:r>
-              <a:rPr lang="en-IN" dirty="0" smtClean="0"/>
+              <a:rPr lang="en-IN" dirty="0"/>
               <a:t>-indicates that system in initial state</a:t>
             </a:r>
           </a:p>
           <a:p>
             <a:pPr lvl="1"/>
             <a:r>
-              <a:rPr lang="en-IN" b="1" dirty="0" smtClean="0"/>
+              <a:rPr lang="en-IN" b="1" dirty="0"/>
               <a:t>T1</a:t>
             </a:r>
             <a:r>
-              <a:rPr lang="en-IN" dirty="0" smtClean="0"/>
+              <a:rPr lang="en-IN" dirty="0"/>
               <a:t>-loads sign to As and k into P</a:t>
             </a:r>
           </a:p>
           <a:p>
             <a:pPr lvl="1"/>
             <a:r>
-              <a:rPr lang="en-IN" b="1" dirty="0" smtClean="0"/>
+              <a:rPr lang="en-IN" b="1" dirty="0"/>
               <a:t>T2</a:t>
             </a:r>
             <a:r>
-              <a:rPr lang="en-IN" dirty="0" smtClean="0"/>
+              <a:rPr lang="en-IN" dirty="0"/>
               <a:t>-decrements P, </a:t>
             </a:r>
           </a:p>
           <a:p>
             <a:pPr lvl="2"/>
             <a:r>
-              <a:rPr lang="en-IN" dirty="0" smtClean="0"/>
+              <a:rPr lang="en-IN" dirty="0"/>
               <a:t>If Q=1, L generated- loads A (sum)and E</a:t>
             </a:r>
           </a:p>
           <a:p>
             <a:pPr lvl="1"/>
             <a:r>
-              <a:rPr lang="en-IN" b="1" dirty="0" smtClean="0"/>
+              <a:rPr lang="en-IN" b="1" dirty="0"/>
               <a:t>T3</a:t>
             </a:r>
             <a:r>
-              <a:rPr lang="en-IN" dirty="0" smtClean="0"/>
+              <a:rPr lang="en-IN" dirty="0"/>
               <a:t>-Shifts A,Q, clears E</a:t>
             </a:r>
-            <a:endParaRPr lang="en-IN" dirty="0"/>
           </a:p>
         </p:txBody>
       </p:sp>
@@ -7511,7 +7327,7 @@
           <a:blip r:embed="rId2">
             <a:extLst>
               <a:ext uri="{28A0092B-C50C-407E-A947-70E740481C1C}">
-                <a14:useLocalDpi xmlns:a14="http://schemas.microsoft.com/office/drawing/2010/main" xmlns="" val="0"/>
+                <a14:useLocalDpi xmlns:a14="http://schemas.microsoft.com/office/drawing/2010/main" val="0"/>
               </a:ext>
             </a:extLst>
           </a:blip>
@@ -7534,14 +7350,14 @@
           </a:ln>
           <a:extLst>
             <a:ext uri="{909E8E84-426E-40DD-AFC4-6F175D3DCCD1}">
-              <a14:hiddenFill xmlns:a14="http://schemas.microsoft.com/office/drawing/2010/main" xmlns="">
+              <a14:hiddenFill xmlns:a14="http://schemas.microsoft.com/office/drawing/2010/main">
                 <a:solidFill>
                   <a:schemeClr val="accent1"/>
                 </a:solidFill>
               </a14:hiddenFill>
             </a:ext>
             <a:ext uri="{91240B29-F687-4F45-9708-019B960494DF}">
-              <a14:hiddenLine xmlns:a14="http://schemas.microsoft.com/office/drawing/2010/main" xmlns="" w="9525">
+              <a14:hiddenLine xmlns:a14="http://schemas.microsoft.com/office/drawing/2010/main" w="9525">
                 <a:solidFill>
                   <a:schemeClr val="tx1"/>
                 </a:solidFill>
@@ -7565,7 +7381,7 @@
           <a:blip r:embed="rId3">
             <a:extLst>
               <a:ext uri="{28A0092B-C50C-407E-A947-70E740481C1C}">
-                <a14:useLocalDpi xmlns:a14="http://schemas.microsoft.com/office/drawing/2010/main" xmlns="" val="0"/>
+                <a14:useLocalDpi xmlns:a14="http://schemas.microsoft.com/office/drawing/2010/main" val="0"/>
               </a:ext>
             </a:extLst>
           </a:blip>
@@ -7588,14 +7404,14 @@
           </a:ln>
           <a:extLst>
             <a:ext uri="{909E8E84-426E-40DD-AFC4-6F175D3DCCD1}">
-              <a14:hiddenFill xmlns:a14="http://schemas.microsoft.com/office/drawing/2010/main" xmlns="">
+              <a14:hiddenFill xmlns:a14="http://schemas.microsoft.com/office/drawing/2010/main">
                 <a:solidFill>
                   <a:schemeClr val="accent1"/>
                 </a:solidFill>
               </a14:hiddenFill>
             </a:ext>
             <a:ext uri="{91240B29-F687-4F45-9708-019B960494DF}">
-              <a14:hiddenLine xmlns:a14="http://schemas.microsoft.com/office/drawing/2010/main" xmlns="" w="9525">
+              <a14:hiddenLine xmlns:a14="http://schemas.microsoft.com/office/drawing/2010/main" w="9525">
                 <a:solidFill>
                   <a:schemeClr val="tx1"/>
                 </a:solidFill>
@@ -7610,20 +7426,13 @@
     </p:spTree>
     <p:extLst>
       <p:ext uri="{BB962C8B-B14F-4D97-AF65-F5344CB8AC3E}">
-        <p14:creationId xmlns:p14="http://schemas.microsoft.com/office/powerpoint/2010/main" xmlns="" val="2769515720"/>
+        <p14:creationId xmlns:p14="http://schemas.microsoft.com/office/powerpoint/2010/main" val="2769515720"/>
       </p:ext>
     </p:extLst>
   </p:cSld>
   <p:clrMapOvr>
     <a:masterClrMapping/>
   </p:clrMapOvr>
-  <p:timing>
-    <p:tnLst>
-      <p:par>
-        <p:cTn id="1" dur="indefinite" restart="never" nodeType="tmRoot"/>
-      </p:par>
-    </p:tnLst>
-  </p:timing>
 </p:sld>
 </file>
 
@@ -7678,67 +7487,67 @@
           <a:bodyPr/>
           <a:lstStyle/>
           <a:p>
-            <a:endParaRPr lang="en-IN" dirty="0" smtClean="0"/>
-          </a:p>
-          <a:p>
             <a:endParaRPr lang="en-IN" dirty="0"/>
           </a:p>
           <a:p>
-            <a:endParaRPr lang="en-IN" dirty="0" smtClean="0"/>
+            <a:endParaRPr lang="en-IN" dirty="0"/>
+          </a:p>
+          <a:p>
+            <a:endParaRPr lang="en-IN" dirty="0"/>
           </a:p>
           <a:p>
             <a:pPr marL="114300" indent="0">
               <a:buNone/>
             </a:pPr>
-            <a:endParaRPr lang="en-IN" dirty="0" smtClean="0"/>
+            <a:endParaRPr lang="en-IN" dirty="0"/>
           </a:p>
           <a:p>
             <a:pPr marL="114300" indent="0">
               <a:buNone/>
             </a:pPr>
-            <a:endParaRPr lang="en-IN" dirty="0" smtClean="0"/>
-          </a:p>
-          <a:p>
-            <a:r>
-              <a:rPr lang="en-IN" b="1" dirty="0" smtClean="0"/>
+            <a:endParaRPr lang="en-IN" dirty="0"/>
+          </a:p>
+          <a:p>
+            <a:r>
+              <a:rPr lang="en-IN" b="1" dirty="0"/>
               <a:t>G1 and G2 </a:t>
             </a:r>
             <a:r>
-              <a:rPr lang="en-IN" dirty="0" smtClean="0"/>
+              <a:rPr lang="en-IN" dirty="0"/>
               <a:t>–</a:t>
             </a:r>
             <a:r>
-              <a:rPr lang="en-IN" dirty="0" err="1" smtClean="0"/>
+              <a:rPr lang="en-IN" dirty="0" err="1"/>
               <a:t>flipflops</a:t>
             </a:r>
             <a:r>
-              <a:rPr lang="en-IN" dirty="0" smtClean="0"/>
+              <a:rPr lang="en-IN" dirty="0"/>
               <a:t>(sequence </a:t>
             </a:r>
             <a:r>
-              <a:rPr lang="en-IN" dirty="0" err="1" smtClean="0"/>
+              <a:rPr lang="en-IN" dirty="0" err="1"/>
               <a:t>reg</a:t>
             </a:r>
             <a:r>
-              <a:rPr lang="en-IN" dirty="0" smtClean="0"/>
+              <a:rPr lang="en-IN" dirty="0"/>
               <a:t>)</a:t>
             </a:r>
           </a:p>
           <a:p>
             <a:r>
-              <a:rPr lang="en-IN" b="1" dirty="0" smtClean="0"/>
+              <a:rPr lang="en-IN" b="1" dirty="0"/>
               <a:t>Input to PLA- </a:t>
             </a:r>
             <a:r>
-              <a:rPr lang="en-IN" dirty="0" smtClean="0"/>
+              <a:rPr lang="en-IN" dirty="0"/>
               <a:t>value of present state and 3 </a:t>
             </a:r>
             <a:r>
-              <a:rPr lang="en-IN" dirty="0" err="1" smtClean="0"/>
+              <a:rPr lang="en-IN" dirty="0" err="1"/>
               <a:t>ext</a:t>
             </a:r>
             <a:r>
-              <a:rPr lang="en-IN" dirty="0" smtClean="0"/>
+              <a:rPr lang="en-IN" dirty="0"/>
               <a:t> input</a:t>
             </a:r>
           </a:p>
@@ -7783,7 +7592,7 @@
           <a:blip r:embed="rId2">
             <a:extLst>
               <a:ext uri="{28A0092B-C50C-407E-A947-70E740481C1C}">
-                <a14:useLocalDpi xmlns:a14="http://schemas.microsoft.com/office/drawing/2010/main" xmlns="" val="0"/>
+                <a14:useLocalDpi xmlns:a14="http://schemas.microsoft.com/office/drawing/2010/main" val="0"/>
               </a:ext>
             </a:extLst>
           </a:blip>
@@ -7806,14 +7615,14 @@
           </a:ln>
           <a:extLst>
             <a:ext uri="{909E8E84-426E-40DD-AFC4-6F175D3DCCD1}">
-              <a14:hiddenFill xmlns:a14="http://schemas.microsoft.com/office/drawing/2010/main" xmlns="">
+              <a14:hiddenFill xmlns:a14="http://schemas.microsoft.com/office/drawing/2010/main">
                 <a:solidFill>
                   <a:schemeClr val="accent1"/>
                 </a:solidFill>
               </a14:hiddenFill>
             </a:ext>
             <a:ext uri="{91240B29-F687-4F45-9708-019B960494DF}">
-              <a14:hiddenLine xmlns:a14="http://schemas.microsoft.com/office/drawing/2010/main" xmlns="" w="9525">
+              <a14:hiddenLine xmlns:a14="http://schemas.microsoft.com/office/drawing/2010/main" w="9525">
                 <a:solidFill>
                   <a:schemeClr val="tx1"/>
                 </a:solidFill>
@@ -7837,7 +7646,7 @@
           <a:blip r:embed="rId3">
             <a:extLst>
               <a:ext uri="{28A0092B-C50C-407E-A947-70E740481C1C}">
-                <a14:useLocalDpi xmlns:a14="http://schemas.microsoft.com/office/drawing/2010/main" xmlns="" val="0"/>
+                <a14:useLocalDpi xmlns:a14="http://schemas.microsoft.com/office/drawing/2010/main" val="0"/>
               </a:ext>
             </a:extLst>
           </a:blip>
@@ -7860,14 +7669,14 @@
           </a:ln>
           <a:extLst>
             <a:ext uri="{909E8E84-426E-40DD-AFC4-6F175D3DCCD1}">
-              <a14:hiddenFill xmlns:a14="http://schemas.microsoft.com/office/drawing/2010/main" xmlns="">
+              <a14:hiddenFill xmlns:a14="http://schemas.microsoft.com/office/drawing/2010/main">
                 <a:solidFill>
                   <a:schemeClr val="accent1"/>
                 </a:solidFill>
               </a14:hiddenFill>
             </a:ext>
             <a:ext uri="{91240B29-F687-4F45-9708-019B960494DF}">
-              <a14:hiddenLine xmlns:a14="http://schemas.microsoft.com/office/drawing/2010/main" xmlns="" w="9525">
+              <a14:hiddenLine xmlns:a14="http://schemas.microsoft.com/office/drawing/2010/main" w="9525">
                 <a:solidFill>
                   <a:schemeClr val="tx1"/>
                 </a:solidFill>
@@ -7882,7 +7691,7 @@
     </p:spTree>
     <p:extLst>
       <p:ext uri="{BB962C8B-B14F-4D97-AF65-F5344CB8AC3E}">
-        <p14:creationId xmlns:p14="http://schemas.microsoft.com/office/powerpoint/2010/main" xmlns="" val="1076225735"/>
+        <p14:creationId xmlns:p14="http://schemas.microsoft.com/office/powerpoint/2010/main" val="1076225735"/>
       </p:ext>
     </p:extLst>
   </p:cSld>
@@ -7926,7 +7735,7 @@
           <a:p>
             <a:pPr eaLnBrk="1" hangingPunct="1"/>
             <a:r>
-              <a:rPr lang="en-US" altLang="en-US" smtClean="0"/>
+              <a:rPr lang="en-US" altLang="en-US"/>
               <a:t>Microprogrammed Control</a:t>
             </a:r>
           </a:p>
@@ -7958,14 +7767,14 @@
               </a:lnSpc>
             </a:pPr>
             <a:r>
-              <a:rPr lang="en-US" altLang="en-US" sz="1900" dirty="0" smtClean="0"/>
+              <a:rPr lang="en-US" altLang="en-US" sz="1900" dirty="0"/>
               <a:t>Control unit initiate a series of sequential steps of </a:t>
             </a:r>
             <a:r>
-              <a:rPr lang="en-US" altLang="en-US" sz="1900" dirty="0" err="1" smtClean="0"/>
+              <a:rPr lang="en-US" altLang="en-US" sz="1900" dirty="0" err="1"/>
               <a:t>microoperations</a:t>
             </a:r>
-            <a:endParaRPr lang="en-US" altLang="en-US" sz="1900" dirty="0" smtClean="0"/>
+            <a:endParaRPr lang="en-US" altLang="en-US" sz="1900" dirty="0"/>
           </a:p>
           <a:p>
             <a:pPr eaLnBrk="1" hangingPunct="1">
@@ -7982,7 +7791,7 @@
               </a:lnSpc>
             </a:pPr>
             <a:r>
-              <a:rPr lang="en-US" altLang="en-US" sz="1900" dirty="0" smtClean="0"/>
+              <a:rPr lang="en-US" altLang="en-US" sz="1900" dirty="0"/>
               <a:t>At any time certain operations are to be initiated and others idle</a:t>
             </a:r>
           </a:p>
@@ -7992,7 +7801,7 @@
                 <a:spcPct val="80000"/>
               </a:lnSpc>
             </a:pPr>
-            <a:endParaRPr lang="en-US" altLang="en-US" sz="1900" dirty="0" smtClean="0"/>
+            <a:endParaRPr lang="en-US" altLang="en-US" sz="1900" dirty="0"/>
           </a:p>
           <a:p>
             <a:pPr eaLnBrk="1" hangingPunct="1">
@@ -8001,7 +7810,7 @@
               </a:lnSpc>
             </a:pPr>
             <a:r>
-              <a:rPr lang="en-US" altLang="en-US" sz="1900" dirty="0" smtClean="0"/>
+              <a:rPr lang="en-US" altLang="en-US" sz="1900" dirty="0"/>
               <a:t>So represented as series of 1’s and 0’s -&gt;control word</a:t>
             </a:r>
           </a:p>
@@ -8011,7 +7820,7 @@
                 <a:spcPct val="80000"/>
               </a:lnSpc>
             </a:pPr>
-            <a:endParaRPr lang="en-US" altLang="en-US" sz="1900" dirty="0" smtClean="0"/>
+            <a:endParaRPr lang="en-US" altLang="en-US" sz="1900" dirty="0"/>
           </a:p>
           <a:p>
             <a:pPr eaLnBrk="1" hangingPunct="1">
@@ -8020,7 +7829,7 @@
               </a:lnSpc>
             </a:pPr>
             <a:r>
-              <a:rPr lang="en-US" altLang="en-US" sz="1900" dirty="0" smtClean="0"/>
+              <a:rPr lang="en-US" altLang="en-US" sz="1900" dirty="0"/>
               <a:t>Microprogrammed-&gt; CU whose control variables are stored in memory</a:t>
             </a:r>
           </a:p>
@@ -8030,7 +7839,7 @@
                 <a:spcPct val="80000"/>
               </a:lnSpc>
             </a:pPr>
-            <a:endParaRPr lang="en-US" altLang="en-US" sz="1900" dirty="0" smtClean="0"/>
+            <a:endParaRPr lang="en-US" altLang="en-US" sz="1900" dirty="0"/>
           </a:p>
           <a:p>
             <a:pPr eaLnBrk="1" hangingPunct="1">
@@ -8039,7 +7848,7 @@
               </a:lnSpc>
             </a:pPr>
             <a:r>
-              <a:rPr lang="en-US" altLang="en-US" sz="1900" b="1" dirty="0" smtClean="0"/>
+              <a:rPr lang="en-US" altLang="en-US" sz="1900" b="1" dirty="0"/>
               <a:t>Microinstruction</a:t>
             </a:r>
           </a:p>
@@ -8050,7 +7859,7 @@
               </a:lnSpc>
             </a:pPr>
             <a:r>
-              <a:rPr lang="en-US" altLang="en-US" sz="1900" b="1" dirty="0" smtClean="0"/>
+              <a:rPr lang="en-US" altLang="en-US" sz="1900" b="1" dirty="0"/>
               <a:t>Microprogram</a:t>
             </a:r>
           </a:p>
@@ -8069,7 +7878,7 @@
               </a:lnSpc>
             </a:pPr>
             <a:r>
-              <a:rPr lang="en-US" altLang="en-US" sz="1900" b="1" dirty="0" smtClean="0"/>
+              <a:rPr lang="en-US" altLang="en-US" sz="1900" b="1" dirty="0"/>
               <a:t>Control memory</a:t>
             </a:r>
           </a:p>
@@ -8079,27 +7888,20 @@
                 <a:spcPct val="80000"/>
               </a:lnSpc>
             </a:pPr>
-            <a:endParaRPr lang="en-US" altLang="en-US" sz="1900" dirty="0" smtClean="0"/>
+            <a:endParaRPr lang="en-US" altLang="en-US" sz="1900" dirty="0"/>
           </a:p>
         </p:txBody>
       </p:sp>
     </p:spTree>
     <p:extLst>
       <p:ext uri="{BB962C8B-B14F-4D97-AF65-F5344CB8AC3E}">
-        <p14:creationId xmlns:p14="http://schemas.microsoft.com/office/powerpoint/2010/main" xmlns="" val="3889877500"/>
+        <p14:creationId xmlns:p14="http://schemas.microsoft.com/office/powerpoint/2010/main" val="3889877500"/>
       </p:ext>
     </p:extLst>
   </p:cSld>
   <p:clrMapOvr>
     <a:masterClrMapping/>
   </p:clrMapOvr>
-  <p:timing>
-    <p:tnLst>
-      <p:par>
-        <p:cTn id="1" dur="indefinite" restart="never" nodeType="tmRoot"/>
-      </p:par>
-    </p:tnLst>
-  </p:timing>
 </p:sld>
 </file>
 
@@ -8136,29 +7938,28 @@
           <a:lstStyle/>
           <a:p>
             <a:r>
-              <a:rPr lang="en-IN" dirty="0" smtClean="0"/>
+              <a:rPr lang="en-IN" dirty="0"/>
               <a:t>Control organization</a:t>
             </a:r>
+          </a:p>
+        </p:txBody>
+      </p:sp>
+      <p:sp>
+        <p:nvSpPr>
+          <p:cNvPr id="3" name="Content Placeholder 2"/>
+          <p:cNvSpPr>
+            <a:spLocks noGrp="1"/>
+          </p:cNvSpPr>
+          <p:nvPr>
+            <p:ph idx="1"/>
+          </p:nvPr>
+        </p:nvSpPr>
+        <p:spPr/>
+        <p:txBody>
+          <a:bodyPr/>
+          <a:lstStyle/>
+          <a:p>
             <a:endParaRPr lang="en-IN" dirty="0"/>
-          </a:p>
-        </p:txBody>
-      </p:sp>
-      <p:sp>
-        <p:nvSpPr>
-          <p:cNvPr id="3" name="Content Placeholder 2"/>
-          <p:cNvSpPr>
-            <a:spLocks noGrp="1"/>
-          </p:cNvSpPr>
-          <p:nvPr>
-            <p:ph idx="1"/>
-          </p:nvPr>
-        </p:nvSpPr>
-        <p:spPr/>
-        <p:txBody>
-          <a:bodyPr/>
-          <a:lstStyle/>
-          <a:p>
-            <a:endParaRPr lang="en-IN" dirty="0" smtClean="0"/>
           </a:p>
           <a:p>
             <a:pPr marL="571500" indent="-457200">
@@ -8166,7 +7967,7 @@
               <a:buAutoNum type="arabicPeriod"/>
             </a:pPr>
             <a:r>
-              <a:rPr lang="en-IN" dirty="0" smtClean="0"/>
+              <a:rPr lang="en-IN" dirty="0"/>
               <a:t>Hardwired control </a:t>
             </a:r>
           </a:p>
@@ -8176,30 +7977,9 @@
               <a:buAutoNum type="arabicPeriod"/>
             </a:pPr>
             <a:r>
-              <a:rPr lang="en-IN" dirty="0" smtClean="0"/>
-              <a:t>One </a:t>
-            </a:r>
-            <a:r>
-              <a:rPr lang="en-IN" dirty="0" err="1" smtClean="0"/>
-              <a:t>flipflop</a:t>
-            </a:r>
-            <a:r>
-              <a:rPr lang="en-IN" dirty="0" smtClean="0"/>
-              <a:t> per stage </a:t>
-            </a:r>
-            <a:r>
-              <a:rPr lang="en-IN" smtClean="0"/>
-              <a:t>method (aka </a:t>
-            </a:r>
-            <a:r>
-              <a:rPr lang="en-IN" dirty="0" smtClean="0"/>
-              <a:t>Ring </a:t>
-            </a:r>
-            <a:r>
-              <a:rPr lang="en-IN" smtClean="0"/>
-              <a:t>counter controller)</a:t>
-            </a:r>
-            <a:endParaRPr lang="en-IN" dirty="0" smtClean="0"/>
+              <a:rPr lang="en-IN" dirty="0"/>
+              <a:t>One flip flop per stage method (aka Ring counter controller)</a:t>
+            </a:r>
           </a:p>
           <a:p>
             <a:pPr marL="868680" lvl="1" indent="-457200">
@@ -8207,21 +7987,16 @@
               <a:buAutoNum type="arabicPeriod"/>
             </a:pPr>
             <a:r>
-              <a:rPr lang="en-IN" dirty="0" smtClean="0"/>
-              <a:t>Sequence register and decoder </a:t>
-            </a:r>
-            <a:r>
-              <a:rPr lang="en-IN" dirty="0" smtClean="0"/>
-              <a:t>method (aka counter decoder method)</a:t>
-            </a:r>
-            <a:endParaRPr lang="en-IN" dirty="0" smtClean="0"/>
+              <a:rPr lang="en-IN" dirty="0"/>
+              <a:t>Sequence register and decoder method (aka counter decoder method)</a:t>
+            </a:r>
           </a:p>
           <a:p>
             <a:pPr marL="868680" lvl="1" indent="-457200">
               <a:buFont typeface="+mj-lt"/>
               <a:buAutoNum type="arabicPeriod"/>
             </a:pPr>
-            <a:endParaRPr lang="en-IN" dirty="0" smtClean="0"/>
+            <a:endParaRPr lang="en-IN" dirty="0"/>
           </a:p>
           <a:p>
             <a:pPr marL="571500" indent="-457200">
@@ -8229,7 +8004,7 @@
               <a:buAutoNum type="arabicPeriod"/>
             </a:pPr>
             <a:r>
-              <a:rPr lang="en-IN" dirty="0" smtClean="0"/>
+              <a:rPr lang="en-IN" dirty="0"/>
               <a:t>PLA control</a:t>
             </a:r>
           </a:p>
@@ -8239,7 +8014,7 @@
               <a:buAutoNum type="arabicPeriod"/>
             </a:pPr>
             <a:r>
-              <a:rPr lang="en-IN" dirty="0" smtClean="0"/>
+              <a:rPr lang="en-IN" dirty="0"/>
               <a:t>Microprogrammed control</a:t>
             </a:r>
           </a:p>
@@ -8278,20 +8053,13 @@
     </p:spTree>
     <p:extLst>
       <p:ext uri="{BB962C8B-B14F-4D97-AF65-F5344CB8AC3E}">
-        <p14:creationId xmlns:p14="http://schemas.microsoft.com/office/powerpoint/2010/main" xmlns="" val="2536776835"/>
+        <p14:creationId xmlns:p14="http://schemas.microsoft.com/office/powerpoint/2010/main" val="2536776835"/>
       </p:ext>
     </p:extLst>
   </p:cSld>
   <p:clrMapOvr>
     <a:masterClrMapping/>
   </p:clrMapOvr>
-  <p:timing>
-    <p:tnLst>
-      <p:par>
-        <p:cTn id="1" dur="indefinite" restart="never" nodeType="tmRoot"/>
-      </p:par>
-    </p:tnLst>
-  </p:timing>
 </p:sld>
 </file>
 
@@ -8386,7 +8154,7 @@
           <a:blip r:embed="rId2">
             <a:extLst>
               <a:ext uri="{28A0092B-C50C-407E-A947-70E740481C1C}">
-                <a14:useLocalDpi xmlns:a14="http://schemas.microsoft.com/office/drawing/2010/main" xmlns="" val="0"/>
+                <a14:useLocalDpi xmlns:a14="http://schemas.microsoft.com/office/drawing/2010/main" val="0"/>
               </a:ext>
             </a:extLst>
           </a:blip>
@@ -8409,14 +8177,14 @@
           </a:ln>
           <a:extLst>
             <a:ext uri="{909E8E84-426E-40DD-AFC4-6F175D3DCCD1}">
-              <a14:hiddenFill xmlns:a14="http://schemas.microsoft.com/office/drawing/2010/main" xmlns="">
+              <a14:hiddenFill xmlns:a14="http://schemas.microsoft.com/office/drawing/2010/main">
                 <a:solidFill>
                   <a:schemeClr val="accent1"/>
                 </a:solidFill>
               </a14:hiddenFill>
             </a:ext>
             <a:ext uri="{91240B29-F687-4F45-9708-019B960494DF}">
-              <a14:hiddenLine xmlns:a14="http://schemas.microsoft.com/office/drawing/2010/main" xmlns="" w="9525">
+              <a14:hiddenLine xmlns:a14="http://schemas.microsoft.com/office/drawing/2010/main" w="9525">
                 <a:solidFill>
                   <a:schemeClr val="tx1"/>
                 </a:solidFill>
@@ -8431,7 +8199,7 @@
     </p:spTree>
     <p:extLst>
       <p:ext uri="{BB962C8B-B14F-4D97-AF65-F5344CB8AC3E}">
-        <p14:creationId xmlns:p14="http://schemas.microsoft.com/office/powerpoint/2010/main" xmlns="" val="3295417083"/>
+        <p14:creationId xmlns:p14="http://schemas.microsoft.com/office/powerpoint/2010/main" val="3295417083"/>
       </p:ext>
     </p:extLst>
   </p:cSld>
@@ -8474,47 +8242,46 @@
           <a:lstStyle/>
           <a:p>
             <a:r>
-              <a:rPr lang="en-IN" dirty="0" smtClean="0"/>
+              <a:rPr lang="en-IN" dirty="0"/>
               <a:t>Example(section 10.4)</a:t>
             </a:r>
+          </a:p>
+        </p:txBody>
+      </p:sp>
+      <p:sp>
+        <p:nvSpPr>
+          <p:cNvPr id="3" name="Content Placeholder 2"/>
+          <p:cNvSpPr>
+            <a:spLocks noGrp="1"/>
+          </p:cNvSpPr>
+          <p:nvPr>
+            <p:ph idx="1"/>
+          </p:nvPr>
+        </p:nvSpPr>
+        <p:spPr/>
+        <p:txBody>
+          <a:bodyPr/>
+          <a:lstStyle/>
+          <a:p>
             <a:endParaRPr lang="en-IN" dirty="0"/>
           </a:p>
-        </p:txBody>
-      </p:sp>
-      <p:sp>
-        <p:nvSpPr>
-          <p:cNvPr id="3" name="Content Placeholder 2"/>
-          <p:cNvSpPr>
-            <a:spLocks noGrp="1"/>
-          </p:cNvSpPr>
-          <p:nvPr>
-            <p:ph idx="1"/>
-          </p:nvPr>
-        </p:nvSpPr>
-        <p:spPr/>
-        <p:txBody>
-          <a:bodyPr/>
-          <a:lstStyle/>
-          <a:p>
-            <a:endParaRPr lang="en-IN" dirty="0" smtClean="0"/>
-          </a:p>
           <a:p>
             <a:endParaRPr lang="en-IN" dirty="0"/>
           </a:p>
           <a:p>
-            <a:endParaRPr lang="en-IN" dirty="0" smtClean="0"/>
-          </a:p>
-          <a:p>
-            <a:r>
-              <a:rPr lang="en-IN" dirty="0" smtClean="0"/>
+            <a:endParaRPr lang="en-IN" dirty="0"/>
+          </a:p>
+          <a:p>
+            <a:r>
+              <a:rPr lang="en-IN" dirty="0"/>
               <a:t>Problem statement:  To design control logic for sign magnitude adder </a:t>
             </a:r>
             <a:r>
-              <a:rPr lang="en-IN" dirty="0" err="1" smtClean="0"/>
+              <a:rPr lang="en-IN" dirty="0" err="1"/>
               <a:t>subtractor</a:t>
             </a:r>
             <a:r>
-              <a:rPr lang="en-IN" dirty="0" smtClean="0"/>
+              <a:rPr lang="en-IN" dirty="0"/>
               <a:t> using microprogram control</a:t>
             </a:r>
           </a:p>
@@ -8523,10 +8290,9 @@
           </a:p>
           <a:p>
             <a:r>
-              <a:rPr lang="en-IN" dirty="0" smtClean="0"/>
+              <a:rPr lang="en-IN" dirty="0"/>
               <a:t>State in control memory- address of microinstruction</a:t>
             </a:r>
-            <a:endParaRPr lang="en-IN" dirty="0"/>
           </a:p>
         </p:txBody>
       </p:sp>
@@ -8557,7 +8323,7 @@
     </p:spTree>
     <p:extLst>
       <p:ext uri="{BB962C8B-B14F-4D97-AF65-F5344CB8AC3E}">
-        <p14:creationId xmlns:p14="http://schemas.microsoft.com/office/powerpoint/2010/main" xmlns="" val="109723394"/>
+        <p14:creationId xmlns:p14="http://schemas.microsoft.com/office/powerpoint/2010/main" val="109723394"/>
       </p:ext>
     </p:extLst>
   </p:cSld>
@@ -8605,10 +8371,9 @@
           <a:lstStyle/>
           <a:p>
             <a:r>
-              <a:rPr lang="en-IN" dirty="0" smtClean="0"/>
+              <a:rPr lang="en-IN" dirty="0"/>
               <a:t>Control state diagram</a:t>
             </a:r>
-            <a:endParaRPr lang="en-IN" dirty="0"/>
           </a:p>
         </p:txBody>
       </p:sp>
@@ -8648,7 +8413,7 @@
           <a:blip r:embed="rId2">
             <a:extLst>
               <a:ext uri="{28A0092B-C50C-407E-A947-70E740481C1C}">
-                <a14:useLocalDpi xmlns:a14="http://schemas.microsoft.com/office/drawing/2010/main" xmlns="" val="0"/>
+                <a14:useLocalDpi xmlns:a14="http://schemas.microsoft.com/office/drawing/2010/main" val="0"/>
               </a:ext>
             </a:extLst>
           </a:blip>
@@ -8671,14 +8436,14 @@
           </a:ln>
           <a:extLst>
             <a:ext uri="{909E8E84-426E-40DD-AFC4-6F175D3DCCD1}">
-              <a14:hiddenFill xmlns:a14="http://schemas.microsoft.com/office/drawing/2010/main" xmlns="">
+              <a14:hiddenFill xmlns:a14="http://schemas.microsoft.com/office/drawing/2010/main">
                 <a:solidFill>
                   <a:schemeClr val="accent1"/>
                 </a:solidFill>
               </a14:hiddenFill>
             </a:ext>
             <a:ext uri="{91240B29-F687-4F45-9708-019B960494DF}">
-              <a14:hiddenLine xmlns:a14="http://schemas.microsoft.com/office/drawing/2010/main" xmlns="" w="9525">
+              <a14:hiddenLine xmlns:a14="http://schemas.microsoft.com/office/drawing/2010/main" w="9525">
                 <a:solidFill>
                   <a:schemeClr val="tx1"/>
                 </a:solidFill>
@@ -8693,20 +8458,13 @@
     </p:spTree>
     <p:extLst>
       <p:ext uri="{BB962C8B-B14F-4D97-AF65-F5344CB8AC3E}">
-        <p14:creationId xmlns:p14="http://schemas.microsoft.com/office/powerpoint/2010/main" xmlns="" val="4266147797"/>
+        <p14:creationId xmlns:p14="http://schemas.microsoft.com/office/powerpoint/2010/main" val="4266147797"/>
       </p:ext>
     </p:extLst>
   </p:cSld>
   <p:clrMapOvr>
     <a:masterClrMapping/>
   </p:clrMapOvr>
-  <p:timing>
-    <p:tnLst>
-      <p:par>
-        <p:cTn id="1" dur="indefinite" restart="never" nodeType="tmRoot"/>
-      </p:par>
-    </p:tnLst>
-  </p:timing>
 </p:sld>
 </file>
 
@@ -8801,7 +8559,7 @@
           <a:blip r:embed="rId2">
             <a:extLst>
               <a:ext uri="{28A0092B-C50C-407E-A947-70E740481C1C}">
-                <a14:useLocalDpi xmlns:a14="http://schemas.microsoft.com/office/drawing/2010/main" xmlns="" val="0"/>
+                <a14:useLocalDpi xmlns:a14="http://schemas.microsoft.com/office/drawing/2010/main" val="0"/>
               </a:ext>
             </a:extLst>
           </a:blip>
@@ -8824,14 +8582,14 @@
           </a:ln>
           <a:extLst>
             <a:ext uri="{909E8E84-426E-40DD-AFC4-6F175D3DCCD1}">
-              <a14:hiddenFill xmlns:a14="http://schemas.microsoft.com/office/drawing/2010/main" xmlns="">
+              <a14:hiddenFill xmlns:a14="http://schemas.microsoft.com/office/drawing/2010/main">
                 <a:solidFill>
                   <a:schemeClr val="accent1"/>
                 </a:solidFill>
               </a14:hiddenFill>
             </a:ext>
             <a:ext uri="{91240B29-F687-4F45-9708-019B960494DF}">
-              <a14:hiddenLine xmlns:a14="http://schemas.microsoft.com/office/drawing/2010/main" xmlns="" w="9525">
+              <a14:hiddenLine xmlns:a14="http://schemas.microsoft.com/office/drawing/2010/main" w="9525">
                 <a:solidFill>
                   <a:schemeClr val="tx1"/>
                 </a:solidFill>
@@ -8846,20 +8604,13 @@
     </p:spTree>
     <p:extLst>
       <p:ext uri="{BB962C8B-B14F-4D97-AF65-F5344CB8AC3E}">
-        <p14:creationId xmlns:p14="http://schemas.microsoft.com/office/powerpoint/2010/main" xmlns="" val="25785599"/>
+        <p14:creationId xmlns:p14="http://schemas.microsoft.com/office/powerpoint/2010/main" val="25785599"/>
       </p:ext>
     </p:extLst>
   </p:cSld>
   <p:clrMapOvr>
     <a:masterClrMapping/>
   </p:clrMapOvr>
-  <p:timing>
-    <p:tnLst>
-      <p:par>
-        <p:cTn id="1" dur="indefinite" restart="never" nodeType="tmRoot"/>
-      </p:par>
-    </p:tnLst>
-  </p:timing>
 </p:sld>
 </file>
 
@@ -8954,7 +8705,7 @@
           <a:blip r:embed="rId2">
             <a:extLst>
               <a:ext uri="{28A0092B-C50C-407E-A947-70E740481C1C}">
-                <a14:useLocalDpi xmlns:a14="http://schemas.microsoft.com/office/drawing/2010/main" xmlns="" val="0"/>
+                <a14:useLocalDpi xmlns:a14="http://schemas.microsoft.com/office/drawing/2010/main" val="0"/>
               </a:ext>
             </a:extLst>
           </a:blip>
@@ -8977,14 +8728,14 @@
           </a:ln>
           <a:extLst>
             <a:ext uri="{909E8E84-426E-40DD-AFC4-6F175D3DCCD1}">
-              <a14:hiddenFill xmlns:a14="http://schemas.microsoft.com/office/drawing/2010/main" xmlns="">
+              <a14:hiddenFill xmlns:a14="http://schemas.microsoft.com/office/drawing/2010/main">
                 <a:solidFill>
                   <a:schemeClr val="accent1"/>
                 </a:solidFill>
               </a14:hiddenFill>
             </a:ext>
             <a:ext uri="{91240B29-F687-4F45-9708-019B960494DF}">
-              <a14:hiddenLine xmlns:a14="http://schemas.microsoft.com/office/drawing/2010/main" xmlns="" w="9525">
+              <a14:hiddenLine xmlns:a14="http://schemas.microsoft.com/office/drawing/2010/main" w="9525">
                 <a:solidFill>
                   <a:schemeClr val="tx1"/>
                 </a:solidFill>
@@ -8999,7 +8750,7 @@
     </p:spTree>
     <p:extLst>
       <p:ext uri="{BB962C8B-B14F-4D97-AF65-F5344CB8AC3E}">
-        <p14:creationId xmlns:p14="http://schemas.microsoft.com/office/powerpoint/2010/main" xmlns="" val="3906633773"/>
+        <p14:creationId xmlns:p14="http://schemas.microsoft.com/office/powerpoint/2010/main" val="3906633773"/>
       </p:ext>
     </p:extLst>
   </p:cSld>
@@ -9100,7 +8851,7 @@
           <a:blip r:embed="rId2">
             <a:extLst>
               <a:ext uri="{28A0092B-C50C-407E-A947-70E740481C1C}">
-                <a14:useLocalDpi xmlns:a14="http://schemas.microsoft.com/office/drawing/2010/main" xmlns="" val="0"/>
+                <a14:useLocalDpi xmlns:a14="http://schemas.microsoft.com/office/drawing/2010/main" val="0"/>
               </a:ext>
             </a:extLst>
           </a:blip>
@@ -9123,14 +8874,14 @@
           </a:ln>
           <a:extLst>
             <a:ext uri="{909E8E84-426E-40DD-AFC4-6F175D3DCCD1}">
-              <a14:hiddenFill xmlns:a14="http://schemas.microsoft.com/office/drawing/2010/main" xmlns="">
+              <a14:hiddenFill xmlns:a14="http://schemas.microsoft.com/office/drawing/2010/main">
                 <a:solidFill>
                   <a:schemeClr val="accent1"/>
                 </a:solidFill>
               </a14:hiddenFill>
             </a:ext>
             <a:ext uri="{91240B29-F687-4F45-9708-019B960494DF}">
-              <a14:hiddenLine xmlns:a14="http://schemas.microsoft.com/office/drawing/2010/main" xmlns="" w="9525">
+              <a14:hiddenLine xmlns:a14="http://schemas.microsoft.com/office/drawing/2010/main" w="9525">
                 <a:solidFill>
                   <a:schemeClr val="tx1"/>
                 </a:solidFill>
@@ -9145,7 +8896,7 @@
     </p:spTree>
     <p:extLst>
       <p:ext uri="{BB962C8B-B14F-4D97-AF65-F5344CB8AC3E}">
-        <p14:creationId xmlns:p14="http://schemas.microsoft.com/office/powerpoint/2010/main" xmlns="" val="2104253924"/>
+        <p14:creationId xmlns:p14="http://schemas.microsoft.com/office/powerpoint/2010/main" val="2104253924"/>
       </p:ext>
     </p:extLst>
   </p:cSld>
@@ -9246,7 +8997,7 @@
           <a:blip r:embed="rId2">
             <a:extLst>
               <a:ext uri="{28A0092B-C50C-407E-A947-70E740481C1C}">
-                <a14:useLocalDpi xmlns:a14="http://schemas.microsoft.com/office/drawing/2010/main" xmlns="" val="0"/>
+                <a14:useLocalDpi xmlns:a14="http://schemas.microsoft.com/office/drawing/2010/main" val="0"/>
               </a:ext>
             </a:extLst>
           </a:blip>
@@ -9269,14 +9020,14 @@
           </a:ln>
           <a:extLst>
             <a:ext uri="{909E8E84-426E-40DD-AFC4-6F175D3DCCD1}">
-              <a14:hiddenFill xmlns:a14="http://schemas.microsoft.com/office/drawing/2010/main" xmlns="">
+              <a14:hiddenFill xmlns:a14="http://schemas.microsoft.com/office/drawing/2010/main">
                 <a:solidFill>
                   <a:schemeClr val="accent1"/>
                 </a:solidFill>
               </a14:hiddenFill>
             </a:ext>
             <a:ext uri="{91240B29-F687-4F45-9708-019B960494DF}">
-              <a14:hiddenLine xmlns:a14="http://schemas.microsoft.com/office/drawing/2010/main" xmlns="" w="9525">
+              <a14:hiddenLine xmlns:a14="http://schemas.microsoft.com/office/drawing/2010/main" w="9525">
                 <a:solidFill>
                   <a:schemeClr val="tx1"/>
                 </a:solidFill>
@@ -9291,7 +9042,7 @@
     </p:spTree>
     <p:extLst>
       <p:ext uri="{BB962C8B-B14F-4D97-AF65-F5344CB8AC3E}">
-        <p14:creationId xmlns:p14="http://schemas.microsoft.com/office/powerpoint/2010/main" xmlns="" val="380120884"/>
+        <p14:creationId xmlns:p14="http://schemas.microsoft.com/office/powerpoint/2010/main" val="380120884"/>
       </p:ext>
     </p:extLst>
   </p:cSld>
@@ -9334,10 +9085,9 @@
           <a:lstStyle/>
           <a:p>
             <a:r>
-              <a:rPr lang="en-IN" dirty="0" smtClean="0"/>
+              <a:rPr lang="en-IN" dirty="0"/>
               <a:t>Control of processor unit</a:t>
             </a:r>
-            <a:endParaRPr lang="en-IN" dirty="0"/>
           </a:p>
         </p:txBody>
       </p:sp>
@@ -9396,7 +9146,7 @@
           <a:blip r:embed="rId2">
             <a:extLst>
               <a:ext uri="{28A0092B-C50C-407E-A947-70E740481C1C}">
-                <a14:useLocalDpi xmlns:a14="http://schemas.microsoft.com/office/drawing/2010/main" xmlns="" val="0"/>
+                <a14:useLocalDpi xmlns:a14="http://schemas.microsoft.com/office/drawing/2010/main" val="0"/>
               </a:ext>
             </a:extLst>
           </a:blip>
@@ -9419,14 +9169,14 @@
           </a:ln>
           <a:extLst>
             <a:ext uri="{909E8E84-426E-40DD-AFC4-6F175D3DCCD1}">
-              <a14:hiddenFill xmlns:a14="http://schemas.microsoft.com/office/drawing/2010/main" xmlns="">
+              <a14:hiddenFill xmlns:a14="http://schemas.microsoft.com/office/drawing/2010/main">
                 <a:solidFill>
                   <a:schemeClr val="accent1"/>
                 </a:solidFill>
               </a14:hiddenFill>
             </a:ext>
             <a:ext uri="{91240B29-F687-4F45-9708-019B960494DF}">
-              <a14:hiddenLine xmlns:a14="http://schemas.microsoft.com/office/drawing/2010/main" xmlns="" w="9525">
+              <a14:hiddenLine xmlns:a14="http://schemas.microsoft.com/office/drawing/2010/main" w="9525">
                 <a:solidFill>
                   <a:schemeClr val="tx1"/>
                 </a:solidFill>
@@ -9441,20 +9191,13 @@
     </p:spTree>
     <p:extLst>
       <p:ext uri="{BB962C8B-B14F-4D97-AF65-F5344CB8AC3E}">
-        <p14:creationId xmlns:p14="http://schemas.microsoft.com/office/powerpoint/2010/main" xmlns="" val="1121850928"/>
+        <p14:creationId xmlns:p14="http://schemas.microsoft.com/office/powerpoint/2010/main" val="1121850928"/>
       </p:ext>
     </p:extLst>
   </p:cSld>
   <p:clrMapOvr>
     <a:masterClrMapping/>
   </p:clrMapOvr>
-  <p:timing>
-    <p:tnLst>
-      <p:par>
-        <p:cTn id="1" dur="indefinite" restart="never" nodeType="tmRoot"/>
-      </p:par>
-    </p:tnLst>
-  </p:timing>
 </p:sld>
 </file>
 
@@ -9496,10 +9239,9 @@
           <a:lstStyle/>
           <a:p>
             <a:r>
-              <a:rPr lang="en-IN" dirty="0" smtClean="0"/>
+              <a:rPr lang="en-IN" dirty="0"/>
               <a:t>Example2</a:t>
             </a:r>
-            <a:endParaRPr lang="en-IN" dirty="0"/>
           </a:p>
         </p:txBody>
       </p:sp>
@@ -9524,16 +9266,15 @@
           <a:lstStyle/>
           <a:p>
             <a:r>
-              <a:rPr lang="en-IN" dirty="0" smtClean="0"/>
+              <a:rPr lang="en-IN" dirty="0"/>
               <a:t>Problem: counting no of 1’s in register R1</a:t>
             </a:r>
           </a:p>
           <a:p>
             <a:r>
-              <a:rPr lang="en-IN" dirty="0" smtClean="0"/>
+              <a:rPr lang="en-IN" dirty="0"/>
               <a:t>Algorithm:</a:t>
             </a:r>
-            <a:endParaRPr lang="en-IN" dirty="0"/>
           </a:p>
         </p:txBody>
       </p:sp>
@@ -9573,7 +9314,7 @@
           <a:blip r:embed="rId2">
             <a:extLst>
               <a:ext uri="{28A0092B-C50C-407E-A947-70E740481C1C}">
-                <a14:useLocalDpi xmlns:a14="http://schemas.microsoft.com/office/drawing/2010/main" xmlns="" val="0"/>
+                <a14:useLocalDpi xmlns:a14="http://schemas.microsoft.com/office/drawing/2010/main" val="0"/>
               </a:ext>
             </a:extLst>
           </a:blip>
@@ -9596,14 +9337,14 @@
           </a:ln>
           <a:extLst>
             <a:ext uri="{909E8E84-426E-40DD-AFC4-6F175D3DCCD1}">
-              <a14:hiddenFill xmlns:a14="http://schemas.microsoft.com/office/drawing/2010/main" xmlns="">
+              <a14:hiddenFill xmlns:a14="http://schemas.microsoft.com/office/drawing/2010/main">
                 <a:solidFill>
                   <a:schemeClr val="accent1"/>
                 </a:solidFill>
               </a14:hiddenFill>
             </a:ext>
             <a:ext uri="{91240B29-F687-4F45-9708-019B960494DF}">
-              <a14:hiddenLine xmlns:a14="http://schemas.microsoft.com/office/drawing/2010/main" xmlns="" w="9525">
+              <a14:hiddenLine xmlns:a14="http://schemas.microsoft.com/office/drawing/2010/main" w="9525">
                 <a:solidFill>
                   <a:schemeClr val="tx1"/>
                 </a:solidFill>
@@ -9618,7 +9359,7 @@
     </p:spTree>
     <p:extLst>
       <p:ext uri="{BB962C8B-B14F-4D97-AF65-F5344CB8AC3E}">
-        <p14:creationId xmlns:p14="http://schemas.microsoft.com/office/powerpoint/2010/main" xmlns="" val="3621802306"/>
+        <p14:creationId xmlns:p14="http://schemas.microsoft.com/office/powerpoint/2010/main" val="3621802306"/>
       </p:ext>
     </p:extLst>
   </p:cSld>
@@ -9719,7 +9460,7 @@
           <a:blip r:embed="rId2">
             <a:extLst>
               <a:ext uri="{28A0092B-C50C-407E-A947-70E740481C1C}">
-                <a14:useLocalDpi xmlns:a14="http://schemas.microsoft.com/office/drawing/2010/main" xmlns="" val="0"/>
+                <a14:useLocalDpi xmlns:a14="http://schemas.microsoft.com/office/drawing/2010/main" val="0"/>
               </a:ext>
             </a:extLst>
           </a:blip>
@@ -9742,14 +9483,14 @@
           </a:ln>
           <a:extLst>
             <a:ext uri="{909E8E84-426E-40DD-AFC4-6F175D3DCCD1}">
-              <a14:hiddenFill xmlns:a14="http://schemas.microsoft.com/office/drawing/2010/main" xmlns="">
+              <a14:hiddenFill xmlns:a14="http://schemas.microsoft.com/office/drawing/2010/main">
                 <a:solidFill>
                   <a:schemeClr val="accent1"/>
                 </a:solidFill>
               </a14:hiddenFill>
             </a:ext>
             <a:ext uri="{91240B29-F687-4F45-9708-019B960494DF}">
-              <a14:hiddenLine xmlns:a14="http://schemas.microsoft.com/office/drawing/2010/main" xmlns="" w="9525">
+              <a14:hiddenLine xmlns:a14="http://schemas.microsoft.com/office/drawing/2010/main" w="9525">
                 <a:solidFill>
                   <a:schemeClr val="tx1"/>
                 </a:solidFill>
@@ -9764,7 +9505,7 @@
     </p:spTree>
     <p:extLst>
       <p:ext uri="{BB962C8B-B14F-4D97-AF65-F5344CB8AC3E}">
-        <p14:creationId xmlns:p14="http://schemas.microsoft.com/office/powerpoint/2010/main" xmlns="" val="3390224003"/>
+        <p14:creationId xmlns:p14="http://schemas.microsoft.com/office/powerpoint/2010/main" val="3390224003"/>
       </p:ext>
     </p:extLst>
   </p:cSld>
@@ -9812,10 +9553,9 @@
           <a:lstStyle/>
           <a:p>
             <a:r>
-              <a:rPr lang="en-IN" dirty="0" smtClean="0"/>
+              <a:rPr lang="en-IN" dirty="0"/>
               <a:t>Hard wired control</a:t>
             </a:r>
-            <a:endParaRPr lang="en-IN" dirty="0"/>
           </a:p>
         </p:txBody>
       </p:sp>
@@ -9865,20 +9605,13 @@
     </p:spTree>
     <p:extLst>
       <p:ext uri="{BB962C8B-B14F-4D97-AF65-F5344CB8AC3E}">
-        <p14:creationId xmlns:p14="http://schemas.microsoft.com/office/powerpoint/2010/main" xmlns="" val="1047826679"/>
+        <p14:creationId xmlns:p14="http://schemas.microsoft.com/office/powerpoint/2010/main" val="1047826679"/>
       </p:ext>
     </p:extLst>
   </p:cSld>
   <p:clrMapOvr>
     <a:masterClrMapping/>
   </p:clrMapOvr>
-  <p:timing>
-    <p:tnLst>
-      <p:par>
-        <p:cTn id="1" dur="indefinite" restart="never" nodeType="tmRoot"/>
-      </p:par>
-    </p:tnLst>
-  </p:timing>
 </p:sld>
 </file>
 
@@ -9915,10 +9648,9 @@
           <a:lstStyle/>
           <a:p>
             <a:r>
-              <a:rPr lang="en-IN" dirty="0" smtClean="0"/>
+              <a:rPr lang="en-IN" dirty="0"/>
               <a:t>Microprogram sequencer</a:t>
             </a:r>
-            <a:endParaRPr lang="en-IN" dirty="0"/>
           </a:p>
         </p:txBody>
       </p:sp>
@@ -9940,34 +9672,34 @@
           <a:lstStyle/>
           <a:p>
             <a:r>
-              <a:rPr lang="en-IN" dirty="0" smtClean="0"/>
+              <a:rPr lang="en-IN" dirty="0"/>
               <a:t>Microprogram CU                        control memory</a:t>
             </a:r>
           </a:p>
           <a:p>
-            <a:endParaRPr lang="en-IN" dirty="0" smtClean="0"/>
+            <a:endParaRPr lang="en-IN" dirty="0"/>
           </a:p>
           <a:p>
             <a:pPr marL="2103120" lvl="8" indent="0">
               <a:buNone/>
             </a:pPr>
             <a:r>
-              <a:rPr lang="en-IN" sz="2200" dirty="0" smtClean="0"/>
+              <a:rPr lang="en-IN" sz="2200" dirty="0"/>
               <a:t>                    Next address generator</a:t>
             </a:r>
           </a:p>
           <a:p>
             <a:r>
-              <a:rPr lang="en-IN" dirty="0" smtClean="0"/>
+              <a:rPr lang="en-IN" dirty="0"/>
               <a:t>Address generation part- sequencer</a:t>
             </a:r>
           </a:p>
           <a:p>
-            <a:endParaRPr lang="en-IN" dirty="0" smtClean="0"/>
-          </a:p>
-          <a:p>
-            <a:r>
-              <a:rPr lang="en-IN" dirty="0" smtClean="0"/>
+            <a:endParaRPr lang="en-IN" dirty="0"/>
+          </a:p>
+          <a:p>
+            <a:r>
+              <a:rPr lang="en-IN" dirty="0"/>
               <a:t>Sequencer provide the following capabilities</a:t>
             </a:r>
           </a:p>
@@ -9977,7 +9709,7 @@
               <a:buAutoNum type="arabicPeriod"/>
             </a:pPr>
             <a:r>
-              <a:rPr lang="en-IN" dirty="0" smtClean="0"/>
+              <a:rPr lang="en-IN" dirty="0"/>
               <a:t>Increments the present address</a:t>
             </a:r>
           </a:p>
@@ -9987,7 +9719,7 @@
               <a:buAutoNum type="arabicPeriod"/>
             </a:pPr>
             <a:r>
-              <a:rPr lang="en-IN" dirty="0" smtClean="0"/>
+              <a:rPr lang="en-IN" dirty="0"/>
               <a:t>Branches to address specified in address field of microinstruction</a:t>
             </a:r>
           </a:p>
@@ -9997,7 +9729,7 @@
               <a:buAutoNum type="arabicPeriod"/>
             </a:pPr>
             <a:r>
-              <a:rPr lang="en-IN" dirty="0" smtClean="0"/>
+              <a:rPr lang="en-IN" dirty="0"/>
               <a:t>Branches to address if specified status bit is 1</a:t>
             </a:r>
           </a:p>
@@ -10007,7 +9739,7 @@
               <a:buAutoNum type="arabicPeriod"/>
             </a:pPr>
             <a:r>
-              <a:rPr lang="en-IN" dirty="0" smtClean="0"/>
+              <a:rPr lang="en-IN" dirty="0"/>
               <a:t>Transfers to new address specified by external source</a:t>
             </a:r>
           </a:p>
@@ -10017,13 +9749,12 @@
               <a:buAutoNum type="arabicPeriod"/>
             </a:pPr>
             <a:r>
-              <a:rPr lang="en-IN" dirty="0" smtClean="0"/>
+              <a:rPr lang="en-IN" dirty="0"/>
               <a:t>Has facility for subroutine calls and return</a:t>
             </a:r>
+          </a:p>
+          <a:p>
             <a:endParaRPr lang="en-IN" dirty="0"/>
-          </a:p>
-          <a:p>
-            <a:endParaRPr lang="en-IN" dirty="0" smtClean="0"/>
           </a:p>
           <a:p>
             <a:endParaRPr lang="en-IN" dirty="0"/>
@@ -10129,20 +9860,13 @@
     </p:spTree>
     <p:extLst>
       <p:ext uri="{BB962C8B-B14F-4D97-AF65-F5344CB8AC3E}">
-        <p14:creationId xmlns:p14="http://schemas.microsoft.com/office/powerpoint/2010/main" xmlns="" val="211380490"/>
+        <p14:creationId xmlns:p14="http://schemas.microsoft.com/office/powerpoint/2010/main" val="211380490"/>
       </p:ext>
     </p:extLst>
   </p:cSld>
   <p:clrMapOvr>
     <a:masterClrMapping/>
   </p:clrMapOvr>
-  <p:timing>
-    <p:tnLst>
-      <p:par>
-        <p:cTn id="1" dur="indefinite" restart="never" nodeType="tmRoot"/>
-      </p:par>
-    </p:tnLst>
-  </p:timing>
 </p:sld>
 </file>
 
@@ -10237,7 +9961,7 @@
           <a:blip r:embed="rId2">
             <a:extLst>
               <a:ext uri="{28A0092B-C50C-407E-A947-70E740481C1C}">
-                <a14:useLocalDpi xmlns:a14="http://schemas.microsoft.com/office/drawing/2010/main" xmlns="" val="0"/>
+                <a14:useLocalDpi xmlns:a14="http://schemas.microsoft.com/office/drawing/2010/main" val="0"/>
               </a:ext>
             </a:extLst>
           </a:blip>
@@ -10260,14 +9984,14 @@
           </a:ln>
           <a:extLst>
             <a:ext uri="{909E8E84-426E-40DD-AFC4-6F175D3DCCD1}">
-              <a14:hiddenFill xmlns:a14="http://schemas.microsoft.com/office/drawing/2010/main" xmlns="">
+              <a14:hiddenFill xmlns:a14="http://schemas.microsoft.com/office/drawing/2010/main">
                 <a:solidFill>
                   <a:schemeClr val="accent1"/>
                 </a:solidFill>
               </a14:hiddenFill>
             </a:ext>
             <a:ext uri="{91240B29-F687-4F45-9708-019B960494DF}">
-              <a14:hiddenLine xmlns:a14="http://schemas.microsoft.com/office/drawing/2010/main" xmlns="" w="9525">
+              <a14:hiddenLine xmlns:a14="http://schemas.microsoft.com/office/drawing/2010/main" w="9525">
                 <a:solidFill>
                   <a:schemeClr val="tx1"/>
                 </a:solidFill>
@@ -10291,7 +10015,7 @@
           <a:blip r:embed="rId3">
             <a:extLst>
               <a:ext uri="{28A0092B-C50C-407E-A947-70E740481C1C}">
-                <a14:useLocalDpi xmlns:a14="http://schemas.microsoft.com/office/drawing/2010/main" xmlns="" val="0"/>
+                <a14:useLocalDpi xmlns:a14="http://schemas.microsoft.com/office/drawing/2010/main" val="0"/>
               </a:ext>
             </a:extLst>
           </a:blip>
@@ -10314,14 +10038,14 @@
           </a:ln>
           <a:extLst>
             <a:ext uri="{909E8E84-426E-40DD-AFC4-6F175D3DCCD1}">
-              <a14:hiddenFill xmlns:a14="http://schemas.microsoft.com/office/drawing/2010/main" xmlns="">
+              <a14:hiddenFill xmlns:a14="http://schemas.microsoft.com/office/drawing/2010/main">
                 <a:solidFill>
                   <a:schemeClr val="accent1"/>
                 </a:solidFill>
               </a14:hiddenFill>
             </a:ext>
             <a:ext uri="{91240B29-F687-4F45-9708-019B960494DF}">
-              <a14:hiddenLine xmlns:a14="http://schemas.microsoft.com/office/drawing/2010/main" xmlns="" w="9525">
+              <a14:hiddenLine xmlns:a14="http://schemas.microsoft.com/office/drawing/2010/main" w="9525">
                 <a:solidFill>
                   <a:schemeClr val="tx1"/>
                 </a:solidFill>
@@ -10336,20 +10060,13 @@
     </p:spTree>
     <p:extLst>
       <p:ext uri="{BB962C8B-B14F-4D97-AF65-F5344CB8AC3E}">
-        <p14:creationId xmlns:p14="http://schemas.microsoft.com/office/powerpoint/2010/main" xmlns="" val="811423953"/>
+        <p14:creationId xmlns:p14="http://schemas.microsoft.com/office/powerpoint/2010/main" val="811423953"/>
       </p:ext>
     </p:extLst>
   </p:cSld>
   <p:clrMapOvr>
     <a:masterClrMapping/>
   </p:clrMapOvr>
-  <p:timing>
-    <p:tnLst>
-      <p:par>
-        <p:cTn id="1" dur="indefinite" restart="never" nodeType="tmRoot"/>
-      </p:par>
-    </p:tnLst>
-  </p:timing>
 </p:sld>
 </file>
 
@@ -10370,8 +10087,8 @@
           <a:chExt cx="0" cy="0"/>
         </a:xfrm>
       </p:grpSpPr>
-      <mc:AlternateContent xmlns:mc="http://schemas.openxmlformats.org/markup-compatibility/2006">
-        <mc:Choice xmlns:a14="http://schemas.microsoft.com/office/drawing/2010/main" xmlns="" Requires="a14">
+      <mc:AlternateContent xmlns:mc="http://schemas.openxmlformats.org/markup-compatibility/2006" xmlns:a14="http://schemas.microsoft.com/office/drawing/2010/main">
+        <mc:Choice Requires="a14">
           <p:sp>
             <p:nvSpPr>
               <p:cNvPr id="3" name="Content Placeholder 2"/>
@@ -10395,7 +10112,7 @@
               <a:lstStyle/>
               <a:p>
                 <a:r>
-                  <a:rPr lang="en-IN" dirty="0" smtClean="0"/>
+                  <a:rPr lang="en-IN" dirty="0"/>
                   <a:t>Output from CAR- address of control memory</a:t>
                 </a:r>
               </a:p>
@@ -10406,7 +10123,7 @@
                       <m:sSubPr>
                         <m:ctrlPr>
                           <a:rPr lang="en-IN" i="1">
-                            <a:latin typeface="Cambria Math"/>
+                            <a:latin typeface="Cambria Math" panose="02040503050406030204" pitchFamily="18" charset="0"/>
                           </a:rPr>
                         </m:ctrlPr>
                       </m:sSubPr>
@@ -10430,7 +10147,7 @@
                   </m:oMath>
                 </a14:m>
                 <a:r>
-                  <a:rPr lang="en-IN" dirty="0" smtClean="0"/>
+                  <a:rPr lang="en-IN" dirty="0"/>
                   <a:t>,T have no effect when </a:t>
                 </a:r>
                 <a14:m>
@@ -10439,7 +10156,7 @@
                       <m:sSubPr>
                         <m:ctrlPr>
                           <a:rPr lang="en-IN" i="1" smtClean="0">
-                            <a:latin typeface="Cambria Math"/>
+                            <a:latin typeface="Cambria Math" panose="02040503050406030204" pitchFamily="18" charset="0"/>
                           </a:rPr>
                         </m:ctrlPr>
                       </m:sSubPr>
@@ -10460,19 +10177,11 @@
                         </m:r>
                       </m:sub>
                     </m:sSub>
-                  </m:oMath>
-                </a14:m>
-                <a:r>
-                  <a:rPr lang="en-IN" dirty="0"/>
-                  <a:t/>
-                </a:r>
-                <a14:m>
-                  <m:oMath xmlns:m="http://schemas.openxmlformats.org/officeDocument/2006/math">
                     <m:sSub>
                       <m:sSubPr>
                         <m:ctrlPr>
                           <a:rPr lang="en-IN" i="1">
-                            <a:latin typeface="Cambria Math"/>
+                            <a:latin typeface="Cambria Math" panose="02040503050406030204" pitchFamily="18" charset="0"/>
                           </a:rPr>
                         </m:ctrlPr>
                       </m:sSubPr>
@@ -10496,19 +10205,19 @@
                   </m:oMath>
                 </a14:m>
                 <a:r>
-                  <a:rPr lang="en-IN" dirty="0" smtClean="0"/>
+                  <a:rPr lang="en-IN" dirty="0"/>
                   <a:t>=00,01,10</a:t>
                 </a:r>
               </a:p>
               <a:p>
                 <a:r>
-                  <a:rPr lang="en-IN" u="sng" dirty="0" smtClean="0"/>
+                  <a:rPr lang="en-IN" u="sng" dirty="0"/>
                   <a:t>Conditional branch operation:</a:t>
                 </a:r>
               </a:p>
               <a:p>
                 <a:r>
-                  <a:rPr lang="en-IN" dirty="0" smtClean="0"/>
+                  <a:rPr lang="en-IN" dirty="0"/>
                   <a:t>When </a:t>
                 </a:r>
                 <a14:m>
@@ -10517,7 +10226,7 @@
                       <m:sSubPr>
                         <m:ctrlPr>
                           <a:rPr lang="en-IN" i="1">
-                            <a:latin typeface="Cambria Math"/>
+                            <a:latin typeface="Cambria Math" panose="02040503050406030204" pitchFamily="18" charset="0"/>
                           </a:rPr>
                         </m:ctrlPr>
                       </m:sSubPr>
@@ -10538,19 +10247,11 @@
                         </m:r>
                       </m:sub>
                     </m:sSub>
-                  </m:oMath>
-                </a14:m>
-                <a:r>
-                  <a:rPr lang="en-IN" dirty="0"/>
-                  <a:t/>
-                </a:r>
-                <a14:m>
-                  <m:oMath xmlns:m="http://schemas.openxmlformats.org/officeDocument/2006/math">
                     <m:sSub>
                       <m:sSubPr>
                         <m:ctrlPr>
                           <a:rPr lang="en-IN" i="1">
-                            <a:latin typeface="Cambria Math"/>
+                            <a:latin typeface="Cambria Math" panose="02040503050406030204" pitchFamily="18" charset="0"/>
                           </a:rPr>
                         </m:ctrlPr>
                       </m:sSubPr>
@@ -10575,11 +10276,7 @@
                 </a14:m>
                 <a:r>
                   <a:rPr lang="en-IN" dirty="0"/>
-                  <a:t>=</a:t>
-                </a:r>
-                <a:r>
-                  <a:rPr lang="en-IN" dirty="0" smtClean="0"/>
-                  <a:t>11, </a:t>
+                  <a:t>=11, </a:t>
                 </a:r>
                 <a14:m>
                   <m:oMath xmlns:m="http://schemas.openxmlformats.org/officeDocument/2006/math">
@@ -10587,7 +10284,7 @@
                       <m:sSubPr>
                         <m:ctrlPr>
                           <a:rPr lang="en-IN" i="1">
-                            <a:latin typeface="Cambria Math"/>
+                            <a:latin typeface="Cambria Math" panose="02040503050406030204" pitchFamily="18" charset="0"/>
                           </a:rPr>
                         </m:ctrlPr>
                       </m:sSubPr>
@@ -10611,43 +10308,34 @@
                   </m:oMath>
                 </a14:m>
                 <a:r>
-                  <a:rPr lang="en-IN" dirty="0" smtClean="0"/>
+                  <a:rPr lang="en-IN" dirty="0"/>
                   <a:t>=0</a:t>
                 </a:r>
               </a:p>
               <a:p>
                 <a:pPr lvl="1"/>
                 <a:r>
-                  <a:rPr lang="en-IN" dirty="0" smtClean="0"/>
+                  <a:rPr lang="en-IN" dirty="0"/>
                   <a:t>If T=1, sequencer branches to BRA(branch address from microinstruction)</a:t>
                 </a:r>
               </a:p>
               <a:p>
                 <a:pPr lvl="1"/>
                 <a:r>
-                  <a:rPr lang="en-IN" dirty="0" smtClean="0"/>
+                  <a:rPr lang="en-IN" dirty="0"/>
                   <a:t>If T=0, increments CAR</a:t>
                 </a:r>
               </a:p>
               <a:p>
                 <a:r>
                   <a:rPr lang="en-IN" u="sng" dirty="0"/>
-                  <a:t>Conditional </a:t>
+                  <a:t>Conditional subroutine call:</a:t>
                 </a:r>
-                <a:r>
-                  <a:rPr lang="en-IN" u="sng" dirty="0" smtClean="0"/>
-                  <a:t>subroutine call:</a:t>
-                </a:r>
-                <a:endParaRPr lang="en-IN" u="sng" dirty="0"/>
               </a:p>
               <a:p>
                 <a:r>
                   <a:rPr lang="en-IN" dirty="0"/>
                   <a:t>When </a:t>
-                </a:r>
-                <a:r>
-                  <a:rPr lang="en-IN" dirty="0" smtClean="0"/>
-                  <a:t/>
                 </a:r>
                 <a14:m>
                   <m:oMath xmlns:m="http://schemas.openxmlformats.org/officeDocument/2006/math">
@@ -10655,7 +10343,7 @@
                       <m:sSubPr>
                         <m:ctrlPr>
                           <a:rPr lang="en-IN" i="1">
-                            <a:latin typeface="Cambria Math"/>
+                            <a:latin typeface="Cambria Math" panose="02040503050406030204" pitchFamily="18" charset="0"/>
                           </a:rPr>
                         </m:ctrlPr>
                       </m:sSubPr>
@@ -10664,7 +10352,7 @@
                           <m:sSubPr>
                             <m:ctrlPr>
                               <a:rPr lang="en-IN" i="1" smtClean="0">
-                                <a:latin typeface="Cambria Math"/>
+                                <a:latin typeface="Cambria Math" panose="02040503050406030204" pitchFamily="18" charset="0"/>
                               </a:rPr>
                             </m:ctrlPr>
                           </m:sSubPr>
@@ -10701,19 +10389,11 @@
                         </m:r>
                       </m:sub>
                     </m:sSub>
-                  </m:oMath>
-                </a14:m>
-                <a:r>
-                  <a:rPr lang="en-IN" dirty="0"/>
-                  <a:t/>
-                </a:r>
-                <a14:m>
-                  <m:oMath xmlns:m="http://schemas.openxmlformats.org/officeDocument/2006/math">
                     <m:sSub>
                       <m:sSubPr>
                         <m:ctrlPr>
                           <a:rPr lang="en-IN" i="1">
-                            <a:latin typeface="Cambria Math"/>
+                            <a:latin typeface="Cambria Math" panose="02040503050406030204" pitchFamily="18" charset="0"/>
                           </a:rPr>
                         </m:ctrlPr>
                       </m:sSubPr>
@@ -10738,41 +10418,23 @@
                 </a14:m>
                 <a:r>
                   <a:rPr lang="en-IN" dirty="0"/>
-                  <a:t>=</a:t>
+                  <a:t>=111</a:t>
                 </a:r>
-                <a:r>
-                  <a:rPr lang="en-IN" dirty="0" smtClean="0"/>
-                  <a:t>111</a:t>
-                </a:r>
-                <a:endParaRPr lang="en-IN" dirty="0"/>
               </a:p>
               <a:p>
                 <a:pPr lvl="1"/>
                 <a:r>
                   <a:rPr lang="en-IN" dirty="0"/>
-                  <a:t>If T=1, </a:t>
+                  <a:t>If T=1, CAR+1 pushed to </a:t>
                 </a:r>
                 <a:r>
-                  <a:rPr lang="en-IN" dirty="0" smtClean="0"/>
-                  <a:t>CAR+1 pushed to </a:t>
-                </a:r>
-                <a:r>
-                  <a:rPr lang="en-IN" dirty="0" err="1" smtClean="0"/>
+                  <a:rPr lang="en-IN" dirty="0" err="1"/>
                   <a:t>stack,sequencer</a:t>
                 </a:r>
                 <a:r>
-                  <a:rPr lang="en-IN" dirty="0" smtClean="0"/>
-                  <a:t/>
+                  <a:rPr lang="en-IN" dirty="0"/>
+                  <a:t>branches to BRA</a:t>
                 </a:r>
-                <a:r>
-                  <a:rPr lang="en-IN" dirty="0"/>
-                  <a:t>branches to </a:t>
-                </a:r>
-                <a:r>
-                  <a:rPr lang="en-IN" dirty="0" smtClean="0"/>
-                  <a:t>BRA</a:t>
-                </a:r>
-                <a:endParaRPr lang="en-IN" dirty="0"/>
               </a:p>
               <a:p>
                 <a:pPr lvl="1"/>
@@ -10783,19 +10445,14 @@
               </a:p>
               <a:p>
                 <a:r>
-                  <a:rPr lang="en-IN" u="sng" dirty="0" smtClean="0"/>
+                  <a:rPr lang="en-IN" u="sng" dirty="0"/>
                   <a:t>Return from subroutine:</a:t>
                 </a:r>
-                <a:endParaRPr lang="en-IN" u="sng" dirty="0"/>
               </a:p>
               <a:p>
                 <a:r>
                   <a:rPr lang="en-IN" dirty="0"/>
                   <a:t>When </a:t>
-                </a:r>
-                <a:r>
-                  <a:rPr lang="en-IN" dirty="0"/>
-                  <a:t/>
                 </a:r>
                 <a14:m>
                   <m:oMath xmlns:m="http://schemas.openxmlformats.org/officeDocument/2006/math">
@@ -10803,7 +10460,7 @@
                       <m:sSubPr>
                         <m:ctrlPr>
                           <a:rPr lang="en-IN" i="1">
-                            <a:latin typeface="Cambria Math"/>
+                            <a:latin typeface="Cambria Math" panose="02040503050406030204" pitchFamily="18" charset="0"/>
                           </a:rPr>
                         </m:ctrlPr>
                       </m:sSubPr>
@@ -10824,19 +10481,11 @@
                         </m:r>
                       </m:sub>
                     </m:sSub>
-                  </m:oMath>
-                </a14:m>
-                <a:r>
-                  <a:rPr lang="en-IN" dirty="0"/>
-                  <a:t/>
-                </a:r>
-                <a14:m>
-                  <m:oMath xmlns:m="http://schemas.openxmlformats.org/officeDocument/2006/math">
                     <m:sSub>
                       <m:sSubPr>
                         <m:ctrlPr>
                           <a:rPr lang="en-IN" i="1">
-                            <a:latin typeface="Cambria Math"/>
+                            <a:latin typeface="Cambria Math" panose="02040503050406030204" pitchFamily="18" charset="0"/>
                           </a:rPr>
                         </m:ctrlPr>
                       </m:sSubPr>
@@ -10861,25 +10510,15 @@
                 </a14:m>
                 <a:r>
                   <a:rPr lang="en-IN" dirty="0"/>
-                  <a:t>=</a:t>
+                  <a:t>=01</a:t>
                 </a:r>
-                <a:r>
-                  <a:rPr lang="en-IN" dirty="0"/>
-                  <a:t>0</a:t>
-                </a:r>
-                <a:r>
-                  <a:rPr lang="en-IN" dirty="0" smtClean="0"/>
-                  <a:t>1</a:t>
-                </a:r>
-                <a:endParaRPr lang="en-IN" dirty="0"/>
               </a:p>
               <a:p>
                 <a:pPr lvl="1"/>
                 <a:r>
-                  <a:rPr lang="en-IN" dirty="0" smtClean="0"/>
+                  <a:rPr lang="en-IN" dirty="0"/>
                   <a:t>Pop stack – branch to address on top of stack</a:t>
                 </a:r>
-                <a:endParaRPr lang="en-IN" dirty="0"/>
               </a:p>
               <a:p>
                 <a:pPr lvl="1"/>
@@ -10888,7 +10527,7 @@
             </p:txBody>
           </p:sp>
         </mc:Choice>
-        <mc:Fallback>
+        <mc:Fallback xmlns="">
           <p:sp>
             <p:nvSpPr>
               <p:cNvPr id="3" name="Content Placeholder 2"/>
@@ -10953,7 +10592,7 @@
     </p:spTree>
     <p:extLst>
       <p:ext uri="{BB962C8B-B14F-4D97-AF65-F5344CB8AC3E}">
-        <p14:creationId xmlns:p14="http://schemas.microsoft.com/office/powerpoint/2010/main" xmlns="" val="1696785857"/>
+        <p14:creationId xmlns:p14="http://schemas.microsoft.com/office/powerpoint/2010/main" val="1696785857"/>
       </p:ext>
     </p:extLst>
   </p:cSld>
@@ -11054,7 +10693,7 @@
           <a:blip r:embed="rId2">
             <a:extLst>
               <a:ext uri="{28A0092B-C50C-407E-A947-70E740481C1C}">
-                <a14:useLocalDpi xmlns:a14="http://schemas.microsoft.com/office/drawing/2010/main" xmlns="" val="0"/>
+                <a14:useLocalDpi xmlns:a14="http://schemas.microsoft.com/office/drawing/2010/main" val="0"/>
               </a:ext>
             </a:extLst>
           </a:blip>
@@ -11077,14 +10716,14 @@
           </a:ln>
           <a:extLst>
             <a:ext uri="{909E8E84-426E-40DD-AFC4-6F175D3DCCD1}">
-              <a14:hiddenFill xmlns:a14="http://schemas.microsoft.com/office/drawing/2010/main" xmlns="">
+              <a14:hiddenFill xmlns:a14="http://schemas.microsoft.com/office/drawing/2010/main">
                 <a:solidFill>
                   <a:schemeClr val="accent1"/>
                 </a:solidFill>
               </a14:hiddenFill>
             </a:ext>
             <a:ext uri="{91240B29-F687-4F45-9708-019B960494DF}">
-              <a14:hiddenLine xmlns:a14="http://schemas.microsoft.com/office/drawing/2010/main" xmlns="" w="9525">
+              <a14:hiddenLine xmlns:a14="http://schemas.microsoft.com/office/drawing/2010/main" w="9525">
                 <a:solidFill>
                   <a:schemeClr val="tx1"/>
                 </a:solidFill>
@@ -11099,7 +10738,7 @@
     </p:spTree>
     <p:extLst>
       <p:ext uri="{BB962C8B-B14F-4D97-AF65-F5344CB8AC3E}">
-        <p14:creationId xmlns:p14="http://schemas.microsoft.com/office/powerpoint/2010/main" xmlns="" val="577380391"/>
+        <p14:creationId xmlns:p14="http://schemas.microsoft.com/office/powerpoint/2010/main" val="577380391"/>
       </p:ext>
     </p:extLst>
   </p:cSld>
@@ -11142,10 +10781,9 @@
           <a:lstStyle/>
           <a:p>
             <a:r>
-              <a:rPr lang="en-IN" sz="3600" dirty="0" smtClean="0"/>
+              <a:rPr lang="en-IN" sz="3600" dirty="0"/>
               <a:t>Microprogrammed CPU organization</a:t>
             </a:r>
-            <a:endParaRPr lang="en-IN" sz="3600" dirty="0"/>
           </a:p>
         </p:txBody>
       </p:sp>
@@ -11204,7 +10842,7 @@
           <a:blip r:embed="rId2">
             <a:extLst>
               <a:ext uri="{28A0092B-C50C-407E-A947-70E740481C1C}">
-                <a14:useLocalDpi xmlns:a14="http://schemas.microsoft.com/office/drawing/2010/main" xmlns="" val="0"/>
+                <a14:useLocalDpi xmlns:a14="http://schemas.microsoft.com/office/drawing/2010/main" val="0"/>
               </a:ext>
             </a:extLst>
           </a:blip>
@@ -11227,14 +10865,14 @@
           </a:ln>
           <a:extLst>
             <a:ext uri="{909E8E84-426E-40DD-AFC4-6F175D3DCCD1}">
-              <a14:hiddenFill xmlns:a14="http://schemas.microsoft.com/office/drawing/2010/main" xmlns="">
+              <a14:hiddenFill xmlns:a14="http://schemas.microsoft.com/office/drawing/2010/main">
                 <a:solidFill>
                   <a:schemeClr val="accent1"/>
                 </a:solidFill>
               </a14:hiddenFill>
             </a:ext>
             <a:ext uri="{91240B29-F687-4F45-9708-019B960494DF}">
-              <a14:hiddenLine xmlns:a14="http://schemas.microsoft.com/office/drawing/2010/main" xmlns="" w="9525">
+              <a14:hiddenLine xmlns:a14="http://schemas.microsoft.com/office/drawing/2010/main" w="9525">
                 <a:solidFill>
                   <a:schemeClr val="tx1"/>
                 </a:solidFill>
@@ -11258,7 +10896,7 @@
           <a:blip r:embed="rId3">
             <a:extLst>
               <a:ext uri="{28A0092B-C50C-407E-A947-70E740481C1C}">
-                <a14:useLocalDpi xmlns:a14="http://schemas.microsoft.com/office/drawing/2010/main" xmlns="" val="0"/>
+                <a14:useLocalDpi xmlns:a14="http://schemas.microsoft.com/office/drawing/2010/main" val="0"/>
               </a:ext>
             </a:extLst>
           </a:blip>
@@ -11281,14 +10919,14 @@
           </a:ln>
           <a:extLst>
             <a:ext uri="{909E8E84-426E-40DD-AFC4-6F175D3DCCD1}">
-              <a14:hiddenFill xmlns:a14="http://schemas.microsoft.com/office/drawing/2010/main" xmlns="">
+              <a14:hiddenFill xmlns:a14="http://schemas.microsoft.com/office/drawing/2010/main">
                 <a:solidFill>
                   <a:schemeClr val="accent1"/>
                 </a:solidFill>
               </a14:hiddenFill>
             </a:ext>
             <a:ext uri="{91240B29-F687-4F45-9708-019B960494DF}">
-              <a14:hiddenLine xmlns:a14="http://schemas.microsoft.com/office/drawing/2010/main" xmlns="" w="9525">
+              <a14:hiddenLine xmlns:a14="http://schemas.microsoft.com/office/drawing/2010/main" w="9525">
                 <a:solidFill>
                   <a:schemeClr val="tx1"/>
                 </a:solidFill>
@@ -11303,7 +10941,7 @@
     </p:spTree>
     <p:extLst>
       <p:ext uri="{BB962C8B-B14F-4D97-AF65-F5344CB8AC3E}">
-        <p14:creationId xmlns:p14="http://schemas.microsoft.com/office/powerpoint/2010/main" xmlns="" val="1706752608"/>
+        <p14:creationId xmlns:p14="http://schemas.microsoft.com/office/powerpoint/2010/main" val="1706752608"/>
       </p:ext>
     </p:extLst>
   </p:cSld>
@@ -11346,10 +10984,9 @@
           <a:lstStyle/>
           <a:p>
             <a:r>
-              <a:rPr lang="en-IN" dirty="0" smtClean="0"/>
+              <a:rPr lang="en-IN" dirty="0"/>
               <a:t>1. One flip flop per stage</a:t>
             </a:r>
-            <a:endParaRPr lang="en-IN" dirty="0"/>
           </a:p>
         </p:txBody>
       </p:sp>
@@ -11374,25 +11011,25 @@
           <a:lstStyle/>
           <a:p>
             <a:r>
-              <a:rPr lang="en-IN" dirty="0" smtClean="0"/>
+              <a:rPr lang="en-IN" dirty="0"/>
               <a:t>One flip flop set at a time</a:t>
             </a:r>
           </a:p>
           <a:p>
             <a:r>
-              <a:rPr lang="en-IN" dirty="0" smtClean="0"/>
-              <a:t>Single bit propagates  under the control of design logic</a:t>
-            </a:r>
-          </a:p>
-          <a:p>
-            <a:r>
-              <a:rPr lang="en-IN" dirty="0" smtClean="0"/>
+              <a:rPr lang="en-IN" dirty="0"/>
+              <a:t>Single bit propagates under the control of design logic</a:t>
+            </a:r>
+          </a:p>
+          <a:p>
+            <a:r>
+              <a:rPr lang="en-IN" dirty="0"/>
               <a:t>Each represents a state</a:t>
             </a:r>
           </a:p>
           <a:p>
             <a:r>
-              <a:rPr lang="en-IN" dirty="0" smtClean="0"/>
+              <a:rPr lang="en-IN" dirty="0"/>
               <a:t>Transition: function of </a:t>
             </a:r>
           </a:p>
@@ -11402,21 +11039,16 @@
             </a:pPr>
             <a:r>
               <a:rPr lang="en-IN" dirty="0"/>
-              <a:t> </a:t>
-            </a:r>
-            <a:r>
-              <a:rPr lang="en-IN" dirty="0" smtClean="0"/>
-              <a:t>  input and present </a:t>
-            </a:r>
-            <a:r>
-              <a:rPr lang="en-IN" dirty="0" err="1" smtClean="0"/>
+              <a:t>   input and present </a:t>
+            </a:r>
+            <a:r>
+              <a:rPr lang="en-IN" dirty="0" err="1"/>
               <a:t>Ti</a:t>
             </a:r>
             <a:r>
-              <a:rPr lang="en-IN" dirty="0" smtClean="0"/>
+              <a:rPr lang="en-IN" dirty="0"/>
               <a:t>.</a:t>
             </a:r>
-            <a:endParaRPr lang="en-IN" dirty="0"/>
           </a:p>
         </p:txBody>
       </p:sp>
@@ -11456,7 +11088,7 @@
           <a:blip r:embed="rId2">
             <a:extLst>
               <a:ext uri="{28A0092B-C50C-407E-A947-70E740481C1C}">
-                <a14:useLocalDpi xmlns:a14="http://schemas.microsoft.com/office/drawing/2010/main" xmlns="" val="0"/>
+                <a14:useLocalDpi xmlns:a14="http://schemas.microsoft.com/office/drawing/2010/main" val="0"/>
               </a:ext>
             </a:extLst>
           </a:blip>
@@ -11479,14 +11111,14 @@
           </a:ln>
           <a:extLst>
             <a:ext uri="{909E8E84-426E-40DD-AFC4-6F175D3DCCD1}">
-              <a14:hiddenFill xmlns:a14="http://schemas.microsoft.com/office/drawing/2010/main" xmlns="">
+              <a14:hiddenFill xmlns:a14="http://schemas.microsoft.com/office/drawing/2010/main">
                 <a:solidFill>
                   <a:schemeClr val="accent1"/>
                 </a:solidFill>
               </a14:hiddenFill>
             </a:ext>
             <a:ext uri="{91240B29-F687-4F45-9708-019B960494DF}">
-              <a14:hiddenLine xmlns:a14="http://schemas.microsoft.com/office/drawing/2010/main" xmlns="" w="9525">
+              <a14:hiddenLine xmlns:a14="http://schemas.microsoft.com/office/drawing/2010/main" w="9525">
                 <a:solidFill>
                   <a:schemeClr val="tx1"/>
                 </a:solidFill>
@@ -11501,20 +11133,13 @@
     </p:spTree>
     <p:extLst>
       <p:ext uri="{BB962C8B-B14F-4D97-AF65-F5344CB8AC3E}">
-        <p14:creationId xmlns:p14="http://schemas.microsoft.com/office/powerpoint/2010/main" xmlns="" val="3304240117"/>
+        <p14:creationId xmlns:p14="http://schemas.microsoft.com/office/powerpoint/2010/main" val="3304240117"/>
       </p:ext>
     </p:extLst>
   </p:cSld>
   <p:clrMapOvr>
     <a:masterClrMapping/>
   </p:clrMapOvr>
-  <p:timing>
-    <p:tnLst>
-      <p:par>
-        <p:cTn id="1" dur="indefinite" restart="never" nodeType="tmRoot"/>
-      </p:par>
-    </p:tnLst>
-  </p:timing>
 </p:sld>
 </file>
 
@@ -11551,10 +11176,9 @@
           <a:lstStyle/>
           <a:p>
             <a:r>
-              <a:rPr lang="en-IN" dirty="0" smtClean="0"/>
+              <a:rPr lang="en-IN" dirty="0"/>
               <a:t>Example[Hardwired control-example1]</a:t>
             </a:r>
-            <a:endParaRPr lang="en-IN" dirty="0"/>
           </a:p>
         </p:txBody>
       </p:sp>
@@ -11580,11 +11204,11 @@
           </a:bodyPr>
           <a:lstStyle/>
           <a:p>
-            <a:endParaRPr lang="en-IN" dirty="0" smtClean="0"/>
-          </a:p>
-          <a:p>
-            <a:r>
-              <a:rPr lang="en-IN" dirty="0" smtClean="0"/>
+            <a:endParaRPr lang="en-IN" dirty="0"/>
+          </a:p>
+          <a:p>
+            <a:r>
+              <a:rPr lang="en-IN" dirty="0"/>
               <a:t>Design carried out with 5 steps:</a:t>
             </a:r>
           </a:p>
@@ -11594,7 +11218,7 @@
               <a:buAutoNum type="arabicPeriod"/>
             </a:pPr>
             <a:r>
-              <a:rPr lang="en-IN" dirty="0" smtClean="0"/>
+              <a:rPr lang="en-IN" dirty="0"/>
               <a:t>Problem statement</a:t>
             </a:r>
           </a:p>
@@ -11604,7 +11228,7 @@
               <a:buAutoNum type="arabicPeriod"/>
             </a:pPr>
             <a:r>
-              <a:rPr lang="en-IN" dirty="0" smtClean="0"/>
+              <a:rPr lang="en-IN" dirty="0"/>
               <a:t>Initial equipment configuration</a:t>
             </a:r>
           </a:p>
@@ -11614,7 +11238,7 @@
               <a:buAutoNum type="arabicPeriod"/>
             </a:pPr>
             <a:r>
-              <a:rPr lang="en-IN" dirty="0" smtClean="0"/>
+              <a:rPr lang="en-IN" dirty="0"/>
               <a:t>Algorithm formulation</a:t>
             </a:r>
           </a:p>
@@ -11624,7 +11248,7 @@
               <a:buAutoNum type="arabicPeriod"/>
             </a:pPr>
             <a:r>
-              <a:rPr lang="en-IN" dirty="0" smtClean="0"/>
+              <a:rPr lang="en-IN" dirty="0"/>
               <a:t>Data processor part specification</a:t>
             </a:r>
           </a:p>
@@ -11634,25 +11258,25 @@
               <a:buAutoNum type="arabicPeriod"/>
             </a:pPr>
             <a:r>
-              <a:rPr lang="en-IN" dirty="0" smtClean="0"/>
+              <a:rPr lang="en-IN" dirty="0"/>
               <a:t>Design of control logic</a:t>
             </a:r>
           </a:p>
           <a:p>
-            <a:endParaRPr lang="en-IN" dirty="0" smtClean="0"/>
-          </a:p>
-          <a:p>
-            <a:r>
-              <a:rPr lang="en-IN" dirty="0" smtClean="0"/>
+            <a:endParaRPr lang="en-IN" dirty="0"/>
+          </a:p>
+          <a:p>
+            <a:r>
+              <a:rPr lang="en-IN" dirty="0"/>
               <a:t>Problem statement: Addition and subtraction of binary fixed point numbers, negative numbers in sign’s 2 complement form</a:t>
             </a:r>
           </a:p>
           <a:p>
-            <a:endParaRPr lang="en-IN" dirty="0" smtClean="0"/>
+            <a:endParaRPr lang="en-IN" dirty="0"/>
           </a:p>
           <a:p>
             <a:pPr lvl="1"/>
-            <a:endParaRPr lang="en-IN" dirty="0" smtClean="0"/>
+            <a:endParaRPr lang="en-IN" dirty="0"/>
           </a:p>
         </p:txBody>
       </p:sp>
@@ -11683,20 +11307,13 @@
     </p:spTree>
     <p:extLst>
       <p:ext uri="{BB962C8B-B14F-4D97-AF65-F5344CB8AC3E}">
-        <p14:creationId xmlns:p14="http://schemas.microsoft.com/office/powerpoint/2010/main" xmlns="" val="1239831266"/>
+        <p14:creationId xmlns:p14="http://schemas.microsoft.com/office/powerpoint/2010/main" val="1239831266"/>
       </p:ext>
     </p:extLst>
   </p:cSld>
   <p:clrMapOvr>
     <a:masterClrMapping/>
   </p:clrMapOvr>
-  <p:timing>
-    <p:tnLst>
-      <p:par>
-        <p:cTn id="1" dur="indefinite" restart="never" nodeType="tmRoot"/>
-      </p:par>
-    </p:tnLst>
-  </p:timing>
 </p:sld>
 </file>
 
@@ -11718,7 +11335,7 @@
         </a:xfrm>
       </p:grpSpPr>
       <mc:AlternateContent xmlns:mc="http://schemas.openxmlformats.org/markup-compatibility/2006">
-        <mc:Choice xmlns:a14="http://schemas.microsoft.com/office/drawing/2010/main" xmlns="" Requires="a14">
+        <mc:Choice xmlns:a14="http://schemas.microsoft.com/office/drawing/2010/main" Requires="a14">
           <p:sp>
             <p:nvSpPr>
               <p:cNvPr id="3" name="Content Placeholder 2"/>
@@ -11740,7 +11357,7 @@
               <a:lstStyle/>
               <a:p>
                 <a:r>
-                  <a:rPr lang="en-IN" dirty="0" smtClean="0"/>
+                  <a:rPr lang="en-IN" dirty="0"/>
                   <a:t>Equipment configuration:</a:t>
                 </a:r>
               </a:p>
@@ -11771,7 +11388,7 @@
                       <m:sSubPr>
                         <m:ctrlPr>
                           <a:rPr lang="en-IN" i="1">
-                            <a:latin typeface="Cambria Math"/>
+                            <a:latin typeface="Cambria Math" panose="02040503050406030204" pitchFamily="18" charset="0"/>
                           </a:rPr>
                         </m:ctrlPr>
                       </m:sSubPr>
@@ -11802,7 +11419,7 @@
                       <m:sSubPr>
                         <m:ctrlPr>
                           <a:rPr lang="en-IN" i="1">
-                            <a:latin typeface="Cambria Math"/>
+                            <a:latin typeface="Cambria Math" panose="02040503050406030204" pitchFamily="18" charset="0"/>
                           </a:rPr>
                         </m:ctrlPr>
                       </m:sSubPr>
@@ -11840,7 +11457,7 @@
               <a:p>
                 <a:pPr lvl="1"/>
                 <a:r>
-                  <a:rPr lang="en-IN" u="sng" dirty="0" smtClean="0"/>
+                  <a:rPr lang="en-IN" u="sng" dirty="0"/>
                   <a:t>Input signals to control logic</a:t>
                 </a:r>
               </a:p>
@@ -11852,7 +11469,7 @@
                       <m:sSubPr>
                         <m:ctrlPr>
                           <a:rPr lang="en-IN" i="1" smtClean="0">
-                            <a:latin typeface="Cambria Math"/>
+                            <a:latin typeface="Cambria Math" panose="02040503050406030204" pitchFamily="18" charset="0"/>
                           </a:rPr>
                         </m:ctrlPr>
                       </m:sSubPr>
@@ -11876,7 +11493,7 @@
                   </m:oMath>
                 </a14:m>
                 <a:r>
-                  <a:rPr lang="en-IN" dirty="0" smtClean="0"/>
+                  <a:rPr lang="en-IN" dirty="0"/>
                   <a:t> and </a:t>
                 </a:r>
                 <a14:m>
@@ -11885,7 +11502,7 @@
                       <m:sSubPr>
                         <m:ctrlPr>
                           <a:rPr lang="en-IN" i="1">
-                            <a:latin typeface="Cambria Math"/>
+                            <a:latin typeface="Cambria Math" panose="02040503050406030204" pitchFamily="18" charset="0"/>
                           </a:rPr>
                         </m:ctrlPr>
                       </m:sSubPr>
@@ -11900,33 +11517,32 @@
                       <m:sub>
                         <m:r>
                           <a:rPr lang="en-IN" b="0" i="1" smtClean="0">
-                            <a:latin typeface="Cambria Math"/>
+                            <a:latin typeface="Cambria Math" panose="02040503050406030204" pitchFamily="18" charset="0"/>
                           </a:rPr>
-                          <m:t>𝑏</m:t>
+                          <m:t>𝑠</m:t>
                         </m:r>
                       </m:sub>
                     </m:sSub>
                   </m:oMath>
                 </a14:m>
                 <a:r>
-                  <a:rPr lang="en-IN" dirty="0" smtClean="0"/>
+                  <a:rPr lang="en-IN" dirty="0"/>
                   <a:t>: add/subtract operation to be performed</a:t>
                 </a:r>
               </a:p>
               <a:p>
                 <a:pPr lvl="1"/>
                 <a:r>
-                  <a:rPr lang="en-IN" u="sng" dirty="0" smtClean="0"/>
+                  <a:rPr lang="en-IN" u="sng" dirty="0"/>
                   <a:t>Output signal</a:t>
                 </a:r>
               </a:p>
               <a:p>
                 <a:pPr lvl="1"/>
                 <a:r>
-                  <a:rPr lang="en-IN" dirty="0" smtClean="0"/>
+                  <a:rPr lang="en-IN" dirty="0"/>
                   <a:t>x : indicates end of operation</a:t>
                 </a:r>
-                <a:endParaRPr lang="en-IN" dirty="0"/>
               </a:p>
             </p:txBody>
           </p:sp>
@@ -11947,10 +11563,10 @@
                 <a:off x="335545" y="320588"/>
                 <a:ext cx="7620000" cy="4800600"/>
               </a:xfrm>
-              <a:blipFill rotWithShape="1">
+              <a:blipFill>
                 <a:blip r:embed="rId2"/>
                 <a:stretch>
-                  <a:fillRect t="-762"/>
+                  <a:fillRect t="-889"/>
                 </a:stretch>
               </a:blipFill>
             </p:spPr>
@@ -12005,7 +11621,7 @@
           <a:blip r:embed="rId3">
             <a:extLst>
               <a:ext uri="{28A0092B-C50C-407E-A947-70E740481C1C}">
-                <a14:useLocalDpi xmlns:a14="http://schemas.microsoft.com/office/drawing/2010/main" xmlns="" val="0"/>
+                <a14:useLocalDpi xmlns:a14="http://schemas.microsoft.com/office/drawing/2010/main" val="0"/>
               </a:ext>
             </a:extLst>
           </a:blip>
@@ -12028,14 +11644,14 @@
           </a:ln>
           <a:extLst>
             <a:ext uri="{909E8E84-426E-40DD-AFC4-6F175D3DCCD1}">
-              <a14:hiddenFill xmlns:a14="http://schemas.microsoft.com/office/drawing/2010/main" xmlns="">
+              <a14:hiddenFill xmlns:a14="http://schemas.microsoft.com/office/drawing/2010/main">
                 <a:solidFill>
                   <a:schemeClr val="accent1"/>
                 </a:solidFill>
               </a14:hiddenFill>
             </a:ext>
             <a:ext uri="{91240B29-F687-4F45-9708-019B960494DF}">
-              <a14:hiddenLine xmlns:a14="http://schemas.microsoft.com/office/drawing/2010/main" xmlns="" w="9525">
+              <a14:hiddenLine xmlns:a14="http://schemas.microsoft.com/office/drawing/2010/main" w="9525">
                 <a:solidFill>
                   <a:schemeClr val="tx1"/>
                 </a:solidFill>
@@ -12050,20 +11666,13 @@
     </p:spTree>
     <p:extLst>
       <p:ext uri="{BB962C8B-B14F-4D97-AF65-F5344CB8AC3E}">
-        <p14:creationId xmlns:p14="http://schemas.microsoft.com/office/powerpoint/2010/main" xmlns="" val="2522246017"/>
+        <p14:creationId xmlns:p14="http://schemas.microsoft.com/office/powerpoint/2010/main" val="2522246017"/>
       </p:ext>
     </p:extLst>
   </p:cSld>
   <p:clrMapOvr>
     <a:masterClrMapping/>
   </p:clrMapOvr>
-  <p:timing>
-    <p:tnLst>
-      <p:par>
-        <p:cTn id="1" dur="indefinite" restart="never" nodeType="tmRoot"/>
-      </p:par>
-    </p:tnLst>
-  </p:timing>
 </p:sld>
 </file>
 
@@ -12155,7 +11764,7 @@
           <a:blip r:embed="rId2">
             <a:extLst>
               <a:ext uri="{28A0092B-C50C-407E-A947-70E740481C1C}">
-                <a14:useLocalDpi xmlns:a14="http://schemas.microsoft.com/office/drawing/2010/main" xmlns="" val="0"/>
+                <a14:useLocalDpi xmlns:a14="http://schemas.microsoft.com/office/drawing/2010/main" val="0"/>
               </a:ext>
             </a:extLst>
           </a:blip>
@@ -12178,14 +11787,14 @@
           </a:ln>
           <a:extLst>
             <a:ext uri="{909E8E84-426E-40DD-AFC4-6F175D3DCCD1}">
-              <a14:hiddenFill xmlns:a14="http://schemas.microsoft.com/office/drawing/2010/main" xmlns="">
+              <a14:hiddenFill xmlns:a14="http://schemas.microsoft.com/office/drawing/2010/main">
                 <a:solidFill>
                   <a:schemeClr val="accent1"/>
                 </a:solidFill>
               </a14:hiddenFill>
             </a:ext>
             <a:ext uri="{91240B29-F687-4F45-9708-019B960494DF}">
-              <a14:hiddenLine xmlns:a14="http://schemas.microsoft.com/office/drawing/2010/main" xmlns="" w="9525">
+              <a14:hiddenLine xmlns:a14="http://schemas.microsoft.com/office/drawing/2010/main" w="9525">
                 <a:solidFill>
                   <a:schemeClr val="tx1"/>
                 </a:solidFill>
@@ -12200,20 +11809,13 @@
     </p:spTree>
     <p:extLst>
       <p:ext uri="{BB962C8B-B14F-4D97-AF65-F5344CB8AC3E}">
-        <p14:creationId xmlns:p14="http://schemas.microsoft.com/office/powerpoint/2010/main" xmlns="" val="3674176749"/>
+        <p14:creationId xmlns:p14="http://schemas.microsoft.com/office/powerpoint/2010/main" val="3674176749"/>
       </p:ext>
     </p:extLst>
   </p:cSld>
   <p:clrMapOvr>
     <a:masterClrMapping/>
   </p:clrMapOvr>
-  <p:timing>
-    <p:tnLst>
-      <p:par>
-        <p:cTn id="1" dur="indefinite" restart="never" nodeType="tmRoot"/>
-      </p:par>
-    </p:tnLst>
-  </p:timing>
 </p:sld>
 </file>
 
@@ -12308,7 +11910,7 @@
           <a:blip r:embed="rId2">
             <a:extLst>
               <a:ext uri="{28A0092B-C50C-407E-A947-70E740481C1C}">
-                <a14:useLocalDpi xmlns:a14="http://schemas.microsoft.com/office/drawing/2010/main" xmlns="" val="0"/>
+                <a14:useLocalDpi xmlns:a14="http://schemas.microsoft.com/office/drawing/2010/main" val="0"/>
               </a:ext>
             </a:extLst>
           </a:blip>
@@ -12331,14 +11933,14 @@
           </a:ln>
           <a:extLst>
             <a:ext uri="{909E8E84-426E-40DD-AFC4-6F175D3DCCD1}">
-              <a14:hiddenFill xmlns:a14="http://schemas.microsoft.com/office/drawing/2010/main" xmlns="">
+              <a14:hiddenFill xmlns:a14="http://schemas.microsoft.com/office/drawing/2010/main">
                 <a:solidFill>
                   <a:schemeClr val="accent1"/>
                 </a:solidFill>
               </a14:hiddenFill>
             </a:ext>
             <a:ext uri="{91240B29-F687-4F45-9708-019B960494DF}">
-              <a14:hiddenLine xmlns:a14="http://schemas.microsoft.com/office/drawing/2010/main" xmlns="" w="9525">
+              <a14:hiddenLine xmlns:a14="http://schemas.microsoft.com/office/drawing/2010/main" w="9525">
                 <a:solidFill>
                   <a:schemeClr val="tx1"/>
                 </a:solidFill>
@@ -12353,20 +11955,13 @@
     </p:spTree>
     <p:extLst>
       <p:ext uri="{BB962C8B-B14F-4D97-AF65-F5344CB8AC3E}">
-        <p14:creationId xmlns:p14="http://schemas.microsoft.com/office/powerpoint/2010/main" xmlns="" val="2654579697"/>
+        <p14:creationId xmlns:p14="http://schemas.microsoft.com/office/powerpoint/2010/main" val="2654579697"/>
       </p:ext>
     </p:extLst>
   </p:cSld>
   <p:clrMapOvr>
     <a:masterClrMapping/>
   </p:clrMapOvr>
-  <p:timing>
-    <p:tnLst>
-      <p:par>
-        <p:cTn id="1" dur="indefinite" restart="never" nodeType="tmRoot"/>
-      </p:par>
-    </p:tnLst>
-  </p:timing>
 </p:sld>
 </file>
 

</xml_diff>

<commit_message>
Corrected spelling mistakes in ppt, added bookmarks in Morris Mano COA
</commit_message>
<xml_diff>
--- a/S4/02. COA/Notes & PPTs/Module 6.1 - Control logic design.pptx
+++ b/S4/02. COA/Notes & PPTs/Module 6.1 - Control logic design.pptx
@@ -4398,45 +4398,21 @@
             <a:pPr lvl="1"/>
             <a:r>
               <a:rPr lang="en-IN" dirty="0"/>
-              <a:t>So 8 D </a:t>
-            </a:r>
-            <a:r>
-              <a:rPr lang="en-IN" dirty="0" err="1"/>
-              <a:t>flipflops</a:t>
-            </a:r>
+              <a:t>So 8 D flip-flops used with the following input functions (implemented in decision logic). </a:t>
+            </a:r>
+          </a:p>
+          <a:p>
+            <a:pPr lvl="1"/>
             <a:r>
               <a:rPr lang="en-IN" dirty="0"/>
-              <a:t> used with the following input functions(implemented in decision logic)</a:t>
+              <a:t>At a time, any of the state will be active and corresponding D flipflop will be activated. </a:t>
             </a:r>
           </a:p>
           <a:p>
             <a:pPr lvl="1"/>
             <a:r>
               <a:rPr lang="en-IN" dirty="0"/>
-              <a:t>At a time, any of the state will be active and corresponding D </a:t>
-            </a:r>
-            <a:r>
-              <a:rPr lang="en-IN" dirty="0" err="1"/>
-              <a:t>flipflop</a:t>
-            </a:r>
-            <a:r>
-              <a:rPr lang="en-IN" dirty="0"/>
-              <a:t> will be activated</a:t>
-            </a:r>
-          </a:p>
-          <a:p>
-            <a:pPr lvl="1"/>
-            <a:r>
-              <a:rPr lang="en-IN" dirty="0"/>
-              <a:t>The output signals are generated according to the </a:t>
-            </a:r>
-            <a:r>
-              <a:rPr lang="en-IN" dirty="0" err="1"/>
-              <a:t>booean</a:t>
-            </a:r>
-            <a:r>
-              <a:rPr lang="en-IN" dirty="0"/>
-              <a:t> function(in table) using OR gate.</a:t>
+              <a:t>The output signals are generated according to the Boolean function (in table) using OR gate.</a:t>
             </a:r>
           </a:p>
           <a:p>
@@ -7514,15 +7490,7 @@
             </a:r>
             <a:r>
               <a:rPr lang="en-IN" dirty="0"/>
-              <a:t>–</a:t>
-            </a:r>
-            <a:r>
-              <a:rPr lang="en-IN" dirty="0" err="1"/>
-              <a:t>flipflops</a:t>
-            </a:r>
-            <a:r>
-              <a:rPr lang="en-IN" dirty="0"/>
-              <a:t>(sequence </a:t>
+              <a:t>–flip-flops (sequence </a:t>
             </a:r>
             <a:r>
               <a:rPr lang="en-IN" dirty="0" err="1"/>
@@ -7547,9 +7515,10 @@
               <a:t>ext</a:t>
             </a:r>
             <a:r>
-              <a:rPr lang="en-IN" dirty="0"/>
-              <a:t> input</a:t>
-            </a:r>
+              <a:rPr lang="en-IN"/>
+              <a:t> inputs</a:t>
+            </a:r>
+            <a:endParaRPr lang="en-IN" dirty="0"/>
           </a:p>
           <a:p>
             <a:endParaRPr lang="en-IN" dirty="0"/>
@@ -11334,8 +11303,8 @@
           <a:chExt cx="0" cy="0"/>
         </a:xfrm>
       </p:grpSpPr>
-      <mc:AlternateContent xmlns:mc="http://schemas.openxmlformats.org/markup-compatibility/2006">
-        <mc:Choice xmlns:a14="http://schemas.microsoft.com/office/drawing/2010/main" Requires="a14">
+      <mc:AlternateContent xmlns:mc="http://schemas.openxmlformats.org/markup-compatibility/2006" xmlns:a14="http://schemas.microsoft.com/office/drawing/2010/main">
+        <mc:Choice Requires="a14">
           <p:sp>
             <p:nvSpPr>
               <p:cNvPr id="3" name="Content Placeholder 2"/>
@@ -11547,7 +11516,7 @@
             </p:txBody>
           </p:sp>
         </mc:Choice>
-        <mc:Fallback>
+        <mc:Fallback xmlns="">
           <p:sp>
             <p:nvSpPr>
               <p:cNvPr id="3" name="Content Placeholder 2"/>

</xml_diff>

<commit_message>
Modified OODP PPTs and highlighted portions of the text
</commit_message>
<xml_diff>
--- a/S4/02. COA/Notes & PPTs/Module 6.1 - Control logic design.pptx
+++ b/S4/02. COA/Notes & PPTs/Module 6.1 - Control logic design.pptx
@@ -252,7 +252,7 @@
             <a:fld id="{9AD71B5D-8126-4DA1-8243-A3CB3F98DD4B}" type="datetimeFigureOut">
               <a:rPr lang="en-IN" smtClean="0"/>
               <a:pPr/>
-              <a:t>23-05-2019</a:t>
+              <a:t>24-05-2019</a:t>
             </a:fld>
             <a:endParaRPr lang="en-IN"/>
           </a:p>
@@ -964,7 +964,7 @@
             <a:fld id="{04AF466F-BDA4-4F18-9C7B-FF0A9A1B0E80}" type="datetime1">
               <a:rPr lang="en-US" smtClean="0"/>
               <a:pPr/>
-              <a:t>5/23/2019</a:t>
+              <a:t>5/24/2019</a:t>
             </a:fld>
             <a:endParaRPr lang="en-US"/>
           </a:p>
@@ -1129,7 +1129,7 @@
             <a:fld id="{58FB4290-6522-4139-852E-05BD9E7F0D2E}" type="datetime1">
               <a:rPr lang="en-US" smtClean="0"/>
               <a:pPr/>
-              <a:t>5/23/2019</a:t>
+              <a:t>5/24/2019</a:t>
             </a:fld>
             <a:endParaRPr lang="en-US"/>
           </a:p>
@@ -1305,7 +1305,7 @@
             <a:fld id="{AAB955F9-81EA-47C5-8059-9E5C2B437C70}" type="datetime1">
               <a:rPr lang="en-US" smtClean="0"/>
               <a:pPr/>
-              <a:t>5/23/2019</a:t>
+              <a:t>5/24/2019</a:t>
             </a:fld>
             <a:endParaRPr lang="en-US"/>
           </a:p>
@@ -1470,7 +1470,7 @@
             <a:fld id="{1CEF607B-A47E-422C-9BEF-122CCDB7C526}" type="datetime1">
               <a:rPr lang="en-US" smtClean="0"/>
               <a:pPr/>
-              <a:t>5/23/2019</a:t>
+              <a:t>5/24/2019</a:t>
             </a:fld>
             <a:endParaRPr lang="en-US"/>
           </a:p>
@@ -1713,7 +1713,7 @@
             <a:fld id="{63A9A7CB-BEE6-4F99-898E-913F06E8E125}" type="datetime1">
               <a:rPr lang="en-US" smtClean="0"/>
               <a:pPr/>
-              <a:t>5/23/2019</a:t>
+              <a:t>5/24/2019</a:t>
             </a:fld>
             <a:endParaRPr lang="en-US"/>
           </a:p>
@@ -1997,7 +1997,7 @@
             <a:fld id="{B6EE300C-6FC5-4FC3-AF1A-075E4F50620D}" type="datetime1">
               <a:rPr lang="en-US" smtClean="0"/>
               <a:pPr/>
-              <a:t>5/23/2019</a:t>
+              <a:t>5/24/2019</a:t>
             </a:fld>
             <a:endParaRPr lang="en-US"/>
           </a:p>
@@ -2426,7 +2426,7 @@
             <a:fld id="{F50D295D-4A77-4DEB-B04C-9F4282A8BC04}" type="datetime1">
               <a:rPr lang="en-US" smtClean="0"/>
               <a:pPr/>
-              <a:t>5/23/2019</a:t>
+              <a:t>5/24/2019</a:t>
             </a:fld>
             <a:endParaRPr lang="en-US"/>
           </a:p>
@@ -2540,7 +2540,7 @@
             <a:fld id="{02B28685-4D0C-42D5-8013-B5904CD1FCBC}" type="datetime1">
               <a:rPr lang="en-US" smtClean="0"/>
               <a:pPr/>
-              <a:t>5/23/2019</a:t>
+              <a:t>5/24/2019</a:t>
             </a:fld>
             <a:endParaRPr lang="en-US"/>
           </a:p>
@@ -2632,7 +2632,7 @@
             <a:fld id="{FDF226C0-9885-4BA9-BBFA-A52CBFEBB775}" type="datetime1">
               <a:rPr lang="en-US" smtClean="0"/>
               <a:pPr/>
-              <a:t>5/23/2019</a:t>
+              <a:t>5/24/2019</a:t>
             </a:fld>
             <a:endParaRPr lang="en-US"/>
           </a:p>
@@ -2823,7 +2823,7 @@
             <a:fld id="{EBEE1B38-C5EB-4D66-9137-0AFE9CDEDE8F}" type="datetime1">
               <a:rPr lang="en-US" smtClean="0"/>
               <a:pPr/>
-              <a:t>5/23/2019</a:t>
+              <a:t>5/24/2019</a:t>
             </a:fld>
             <a:endParaRPr lang="en-US"/>
           </a:p>
@@ -3142,7 +3142,7 @@
             <a:fld id="{327B613C-1AD7-49D3-885D-F654C5CDBAA6}" type="datetime1">
               <a:rPr lang="en-US" smtClean="0"/>
               <a:pPr/>
-              <a:t>5/23/2019</a:t>
+              <a:t>5/24/2019</a:t>
             </a:fld>
             <a:endParaRPr lang="en-US" dirty="0"/>
           </a:p>
@@ -3524,7 +3524,7 @@
             <a:fld id="{327B613C-1AD7-49D3-885D-F654C5CDBAA6}" type="datetime1">
               <a:rPr lang="en-US" smtClean="0"/>
               <a:pPr/>
-              <a:t>5/23/2019</a:t>
+              <a:t>5/24/2019</a:t>
             </a:fld>
             <a:endParaRPr lang="en-US" dirty="0"/>
           </a:p>
@@ -7737,13 +7737,8 @@
             </a:pPr>
             <a:r>
               <a:rPr lang="en-US" altLang="en-US" sz="1900" dirty="0"/>
-              <a:t>Control unit initiate a series of sequential steps of </a:t>
-            </a:r>
-            <a:r>
-              <a:rPr lang="en-US" altLang="en-US" sz="1900" dirty="0" err="1"/>
-              <a:t>microoperations</a:t>
-            </a:r>
-            <a:endParaRPr lang="en-US" altLang="en-US" sz="1900" dirty="0"/>
+              <a:t>Control unit initiate a series of sequential steps of micro-operations</a:t>
+            </a:r>
           </a:p>
           <a:p>
             <a:pPr eaLnBrk="1" hangingPunct="1">
@@ -8243,15 +8238,7 @@
           <a:p>
             <a:r>
               <a:rPr lang="en-IN" dirty="0"/>
-              <a:t>Problem statement:  To design control logic for sign magnitude adder </a:t>
-            </a:r>
-            <a:r>
-              <a:rPr lang="en-IN" dirty="0" err="1"/>
-              <a:t>subtractor</a:t>
-            </a:r>
-            <a:r>
-              <a:rPr lang="en-IN" dirty="0"/>
-              <a:t> using microprogram control</a:t>
+              <a:t>Problem statement:  To design control logic for sign magnitude adder/subtractor using microprogram control</a:t>
             </a:r>
           </a:p>
           <a:p>

</xml_diff>